<commit_message>
Added more slides to XDATA slides.
</commit_message>
<xml_diff>
--- a/XDATA_Sep2016_klevin_slides.pptx
+++ b/XDATA_Sep2016_klevin_slides.pptx
@@ -12,6 +12,9 @@
     <p:sldId id="257" r:id="rId6"/>
     <p:sldId id="258" r:id="rId7"/>
     <p:sldId id="259" r:id="rId8"/>
+    <p:sldId id="260" r:id="rId9"/>
+    <p:sldId id="261" r:id="rId10"/>
+    <p:sldId id="262" r:id="rId11"/>
   </p:sldIdLst>
   <p:sldSz cy="6858000" cx="9144000"/>
   <p:notesSz cx="6858000" cy="9144000"/>
@@ -1520,6 +1523,414 @@
       <p:sp>
         <p:nvSpPr>
           <p:cNvPr id="154" name="Shape 154"/>
+          <p:cNvSpPr txBox="1"/>
+          <p:nvPr>
+            <p:ph idx="12" type="sldNum"/>
+          </p:nvPr>
+        </p:nvSpPr>
+        <p:spPr>
+          <a:xfrm>
+            <a:off x="3884612" y="8685213"/>
+            <a:ext cx="2971800" cy="457200"/>
+          </a:xfrm>
+          <a:prstGeom prst="rect">
+            <a:avLst/>
+          </a:prstGeom>
+        </p:spPr>
+        <p:txBody>
+          <a:bodyPr anchorCtr="0" anchor="b" bIns="45700" lIns="91425" rIns="91425" tIns="45700">
+            <a:noAutofit/>
+          </a:bodyPr>
+          <a:lstStyle/>
+          <a:p>
+            <a:pPr lvl="0" rtl="0">
+              <a:spcBef>
+                <a:spcPts val="0"/>
+              </a:spcBef>
+              <a:buClr>
+                <a:srgbClr val="000000"/>
+              </a:buClr>
+              <a:buSzPct val="25000"/>
+              <a:buFont typeface="Arial"/>
+              <a:buNone/>
+            </a:pPr>
+            <a:fld id="{00000000-1234-1234-1234-123412341234}" type="slidenum">
+              <a:rPr lang="en-US"/>
+              <a:t>‹#›</a:t>
+            </a:fld>
+          </a:p>
+        </p:txBody>
+      </p:sp>
+    </p:spTree>
+  </p:cSld>
+  <p:clrMapOvr>
+    <a:masterClrMapping/>
+  </p:clrMapOvr>
+</p:notes>
+</file>
+
+<file path=ppt/notesSlides/notesSlide5.xml><?xml version="1.0" encoding="utf-8"?>
+<p:notes xmlns:a="http://schemas.openxmlformats.org/drawingml/2006/main" xmlns:r="http://schemas.openxmlformats.org/officeDocument/2006/relationships" xmlns:mc="http://schemas.openxmlformats.org/markup-compatibility/2006" xmlns:mv="urn:schemas-microsoft-com:mac:vml" xmlns:p="http://schemas.openxmlformats.org/presentationml/2006/main" xmlns:c="http://schemas.openxmlformats.org/drawingml/2006/chart" xmlns:dgm="http://schemas.openxmlformats.org/drawingml/2006/diagram" xmlns:o="urn:schemas-microsoft-com:office:office" xmlns:v="urn:schemas-microsoft-com:vml" xmlns:pvml="urn:schemas-microsoft-com:office:powerpoint" xmlns:com="http://schemas.openxmlformats.org/drawingml/2006/compatibility" xmlns:p14="http://schemas.microsoft.com/office/powerpoint/2010/main" showMasterPhAnim="0" showMasterSp="0">
+  <p:cSld>
+    <p:spTree>
+      <p:nvGrpSpPr>
+        <p:cNvPr id="158" name="Shape 158"/>
+        <p:cNvGrpSpPr/>
+        <p:nvPr/>
+      </p:nvGrpSpPr>
+      <p:grpSpPr>
+        <a:xfrm>
+          <a:off x="0" y="0"/>
+          <a:ext cx="0" cy="0"/>
+          <a:chOff x="0" y="0"/>
+          <a:chExt cx="0" cy="0"/>
+        </a:xfrm>
+      </p:grpSpPr>
+      <p:sp>
+        <p:nvSpPr>
+          <p:cNvPr id="159" name="Shape 159"/>
+          <p:cNvSpPr/>
+          <p:nvPr>
+            <p:ph idx="2" type="sldImg"/>
+          </p:nvPr>
+        </p:nvSpPr>
+        <p:spPr>
+          <a:xfrm>
+            <a:off x="1143000" y="685800"/>
+            <a:ext cx="4572000" cy="3429000"/>
+          </a:xfrm>
+          <a:custGeom>
+            <a:pathLst>
+              <a:path extrusionOk="0" h="120000" w="120000">
+                <a:moveTo>
+                  <a:pt x="0" y="0"/>
+                </a:moveTo>
+                <a:lnTo>
+                  <a:pt x="120000" y="0"/>
+                </a:lnTo>
+                <a:lnTo>
+                  <a:pt x="120000" y="120000"/>
+                </a:lnTo>
+                <a:lnTo>
+                  <a:pt x="0" y="120000"/>
+                </a:lnTo>
+                <a:close/>
+              </a:path>
+            </a:pathLst>
+          </a:custGeom>
+        </p:spPr>
+      </p:sp>
+      <p:sp>
+        <p:nvSpPr>
+          <p:cNvPr id="160" name="Shape 160"/>
+          <p:cNvSpPr txBox="1"/>
+          <p:nvPr>
+            <p:ph idx="1" type="body"/>
+          </p:nvPr>
+        </p:nvSpPr>
+        <p:spPr>
+          <a:xfrm>
+            <a:off x="685800" y="4343400"/>
+            <a:ext cx="5486400" cy="4114800"/>
+          </a:xfrm>
+          <a:prstGeom prst="rect">
+            <a:avLst/>
+          </a:prstGeom>
+        </p:spPr>
+        <p:txBody>
+          <a:bodyPr anchorCtr="0" anchor="t" bIns="91425" lIns="91425" rIns="91425" tIns="91425">
+            <a:noAutofit/>
+          </a:bodyPr>
+          <a:lstStyle/>
+          <a:p>
+            <a:pPr lvl="0" rtl="0">
+              <a:spcBef>
+                <a:spcPts val="0"/>
+              </a:spcBef>
+              <a:buNone/>
+            </a:pPr>
+            <a:r>
+              <a:t/>
+            </a:r>
+            <a:endParaRPr/>
+          </a:p>
+        </p:txBody>
+      </p:sp>
+      <p:sp>
+        <p:nvSpPr>
+          <p:cNvPr id="161" name="Shape 161"/>
+          <p:cNvSpPr txBox="1"/>
+          <p:nvPr>
+            <p:ph idx="12" type="sldNum"/>
+          </p:nvPr>
+        </p:nvSpPr>
+        <p:spPr>
+          <a:xfrm>
+            <a:off x="3884612" y="8685213"/>
+            <a:ext cx="2971800" cy="457200"/>
+          </a:xfrm>
+          <a:prstGeom prst="rect">
+            <a:avLst/>
+          </a:prstGeom>
+        </p:spPr>
+        <p:txBody>
+          <a:bodyPr anchorCtr="0" anchor="b" bIns="45700" lIns="91425" rIns="91425" tIns="45700">
+            <a:noAutofit/>
+          </a:bodyPr>
+          <a:lstStyle/>
+          <a:p>
+            <a:pPr lvl="0" rtl="0">
+              <a:spcBef>
+                <a:spcPts val="0"/>
+              </a:spcBef>
+              <a:buClr>
+                <a:srgbClr val="000000"/>
+              </a:buClr>
+              <a:buSzPct val="25000"/>
+              <a:buFont typeface="Arial"/>
+              <a:buNone/>
+            </a:pPr>
+            <a:fld id="{00000000-1234-1234-1234-123412341234}" type="slidenum">
+              <a:rPr lang="en-US"/>
+              <a:t>‹#›</a:t>
+            </a:fld>
+          </a:p>
+        </p:txBody>
+      </p:sp>
+    </p:spTree>
+  </p:cSld>
+  <p:clrMapOvr>
+    <a:masterClrMapping/>
+  </p:clrMapOvr>
+</p:notes>
+</file>
+
+<file path=ppt/notesSlides/notesSlide6.xml><?xml version="1.0" encoding="utf-8"?>
+<p:notes xmlns:a="http://schemas.openxmlformats.org/drawingml/2006/main" xmlns:r="http://schemas.openxmlformats.org/officeDocument/2006/relationships" xmlns:mc="http://schemas.openxmlformats.org/markup-compatibility/2006" xmlns:mv="urn:schemas-microsoft-com:mac:vml" xmlns:p="http://schemas.openxmlformats.org/presentationml/2006/main" xmlns:c="http://schemas.openxmlformats.org/drawingml/2006/chart" xmlns:dgm="http://schemas.openxmlformats.org/drawingml/2006/diagram" xmlns:o="urn:schemas-microsoft-com:office:office" xmlns:v="urn:schemas-microsoft-com:vml" xmlns:pvml="urn:schemas-microsoft-com:office:powerpoint" xmlns:com="http://schemas.openxmlformats.org/drawingml/2006/compatibility" xmlns:p14="http://schemas.microsoft.com/office/powerpoint/2010/main" showMasterPhAnim="0" showMasterSp="0">
+  <p:cSld>
+    <p:spTree>
+      <p:nvGrpSpPr>
+        <p:cNvPr id="165" name="Shape 165"/>
+        <p:cNvGrpSpPr/>
+        <p:nvPr/>
+      </p:nvGrpSpPr>
+      <p:grpSpPr>
+        <a:xfrm>
+          <a:off x="0" y="0"/>
+          <a:ext cx="0" cy="0"/>
+          <a:chOff x="0" y="0"/>
+          <a:chExt cx="0" cy="0"/>
+        </a:xfrm>
+      </p:grpSpPr>
+      <p:sp>
+        <p:nvSpPr>
+          <p:cNvPr id="166" name="Shape 166"/>
+          <p:cNvSpPr/>
+          <p:nvPr>
+            <p:ph idx="2" type="sldImg"/>
+          </p:nvPr>
+        </p:nvSpPr>
+        <p:spPr>
+          <a:xfrm>
+            <a:off x="1143000" y="685800"/>
+            <a:ext cx="4572000" cy="3429000"/>
+          </a:xfrm>
+          <a:custGeom>
+            <a:pathLst>
+              <a:path extrusionOk="0" h="120000" w="120000">
+                <a:moveTo>
+                  <a:pt x="0" y="0"/>
+                </a:moveTo>
+                <a:lnTo>
+                  <a:pt x="120000" y="0"/>
+                </a:lnTo>
+                <a:lnTo>
+                  <a:pt x="120000" y="120000"/>
+                </a:lnTo>
+                <a:lnTo>
+                  <a:pt x="0" y="120000"/>
+                </a:lnTo>
+                <a:close/>
+              </a:path>
+            </a:pathLst>
+          </a:custGeom>
+        </p:spPr>
+      </p:sp>
+      <p:sp>
+        <p:nvSpPr>
+          <p:cNvPr id="167" name="Shape 167"/>
+          <p:cNvSpPr txBox="1"/>
+          <p:nvPr>
+            <p:ph idx="1" type="body"/>
+          </p:nvPr>
+        </p:nvSpPr>
+        <p:spPr>
+          <a:xfrm>
+            <a:off x="685800" y="4343400"/>
+            <a:ext cx="5486400" cy="4114800"/>
+          </a:xfrm>
+          <a:prstGeom prst="rect">
+            <a:avLst/>
+          </a:prstGeom>
+        </p:spPr>
+        <p:txBody>
+          <a:bodyPr anchorCtr="0" anchor="t" bIns="91425" lIns="91425" rIns="91425" tIns="91425">
+            <a:noAutofit/>
+          </a:bodyPr>
+          <a:lstStyle/>
+          <a:p>
+            <a:pPr lvl="0" rtl="0">
+              <a:spcBef>
+                <a:spcPts val="0"/>
+              </a:spcBef>
+              <a:buNone/>
+            </a:pPr>
+            <a:r>
+              <a:t/>
+            </a:r>
+            <a:endParaRPr/>
+          </a:p>
+        </p:txBody>
+      </p:sp>
+      <p:sp>
+        <p:nvSpPr>
+          <p:cNvPr id="168" name="Shape 168"/>
+          <p:cNvSpPr txBox="1"/>
+          <p:nvPr>
+            <p:ph idx="12" type="sldNum"/>
+          </p:nvPr>
+        </p:nvSpPr>
+        <p:spPr>
+          <a:xfrm>
+            <a:off x="3884612" y="8685213"/>
+            <a:ext cx="2971800" cy="457200"/>
+          </a:xfrm>
+          <a:prstGeom prst="rect">
+            <a:avLst/>
+          </a:prstGeom>
+        </p:spPr>
+        <p:txBody>
+          <a:bodyPr anchorCtr="0" anchor="b" bIns="45700" lIns="91425" rIns="91425" tIns="45700">
+            <a:noAutofit/>
+          </a:bodyPr>
+          <a:lstStyle/>
+          <a:p>
+            <a:pPr lvl="0" rtl="0">
+              <a:spcBef>
+                <a:spcPts val="0"/>
+              </a:spcBef>
+              <a:buClr>
+                <a:srgbClr val="000000"/>
+              </a:buClr>
+              <a:buSzPct val="25000"/>
+              <a:buFont typeface="Arial"/>
+              <a:buNone/>
+            </a:pPr>
+            <a:fld id="{00000000-1234-1234-1234-123412341234}" type="slidenum">
+              <a:rPr lang="en-US"/>
+              <a:t>‹#›</a:t>
+            </a:fld>
+          </a:p>
+        </p:txBody>
+      </p:sp>
+    </p:spTree>
+  </p:cSld>
+  <p:clrMapOvr>
+    <a:masterClrMapping/>
+  </p:clrMapOvr>
+</p:notes>
+</file>
+
+<file path=ppt/notesSlides/notesSlide7.xml><?xml version="1.0" encoding="utf-8"?>
+<p:notes xmlns:a="http://schemas.openxmlformats.org/drawingml/2006/main" xmlns:r="http://schemas.openxmlformats.org/officeDocument/2006/relationships" xmlns:mc="http://schemas.openxmlformats.org/markup-compatibility/2006" xmlns:mv="urn:schemas-microsoft-com:mac:vml" xmlns:p="http://schemas.openxmlformats.org/presentationml/2006/main" xmlns:c="http://schemas.openxmlformats.org/drawingml/2006/chart" xmlns:dgm="http://schemas.openxmlformats.org/drawingml/2006/diagram" xmlns:o="urn:schemas-microsoft-com:office:office" xmlns:v="urn:schemas-microsoft-com:vml" xmlns:pvml="urn:schemas-microsoft-com:office:powerpoint" xmlns:com="http://schemas.openxmlformats.org/drawingml/2006/compatibility" xmlns:p14="http://schemas.microsoft.com/office/powerpoint/2010/main" showMasterPhAnim="0" showMasterSp="0">
+  <p:cSld>
+    <p:spTree>
+      <p:nvGrpSpPr>
+        <p:cNvPr id="172" name="Shape 172"/>
+        <p:cNvGrpSpPr/>
+        <p:nvPr/>
+      </p:nvGrpSpPr>
+      <p:grpSpPr>
+        <a:xfrm>
+          <a:off x="0" y="0"/>
+          <a:ext cx="0" cy="0"/>
+          <a:chOff x="0" y="0"/>
+          <a:chExt cx="0" cy="0"/>
+        </a:xfrm>
+      </p:grpSpPr>
+      <p:sp>
+        <p:nvSpPr>
+          <p:cNvPr id="173" name="Shape 173"/>
+          <p:cNvSpPr/>
+          <p:nvPr>
+            <p:ph idx="2" type="sldImg"/>
+          </p:nvPr>
+        </p:nvSpPr>
+        <p:spPr>
+          <a:xfrm>
+            <a:off x="1143000" y="685800"/>
+            <a:ext cx="4572000" cy="3429000"/>
+          </a:xfrm>
+          <a:custGeom>
+            <a:pathLst>
+              <a:path extrusionOk="0" h="120000" w="120000">
+                <a:moveTo>
+                  <a:pt x="0" y="0"/>
+                </a:moveTo>
+                <a:lnTo>
+                  <a:pt x="120000" y="0"/>
+                </a:lnTo>
+                <a:lnTo>
+                  <a:pt x="120000" y="120000"/>
+                </a:lnTo>
+                <a:lnTo>
+                  <a:pt x="0" y="120000"/>
+                </a:lnTo>
+                <a:close/>
+              </a:path>
+            </a:pathLst>
+          </a:custGeom>
+        </p:spPr>
+      </p:sp>
+      <p:sp>
+        <p:nvSpPr>
+          <p:cNvPr id="174" name="Shape 174"/>
+          <p:cNvSpPr txBox="1"/>
+          <p:nvPr>
+            <p:ph idx="1" type="body"/>
+          </p:nvPr>
+        </p:nvSpPr>
+        <p:spPr>
+          <a:xfrm>
+            <a:off x="685800" y="4343400"/>
+            <a:ext cx="5486400" cy="4114800"/>
+          </a:xfrm>
+          <a:prstGeom prst="rect">
+            <a:avLst/>
+          </a:prstGeom>
+        </p:spPr>
+        <p:txBody>
+          <a:bodyPr anchorCtr="0" anchor="t" bIns="91425" lIns="91425" rIns="91425" tIns="91425">
+            <a:noAutofit/>
+          </a:bodyPr>
+          <a:lstStyle/>
+          <a:p>
+            <a:pPr lvl="0" rtl="0">
+              <a:spcBef>
+                <a:spcPts val="0"/>
+              </a:spcBef>
+              <a:buNone/>
+            </a:pPr>
+            <a:r>
+              <a:t/>
+            </a:r>
+            <a:endParaRPr/>
+          </a:p>
+        </p:txBody>
+      </p:sp>
+      <p:sp>
+        <p:nvSpPr>
+          <p:cNvPr id="175" name="Shape 175"/>
           <p:cNvSpPr txBox="1"/>
           <p:nvPr>
             <p:ph idx="12" type="sldNum"/>
@@ -13285,7 +13696,7 @@
         <p:spPr>
           <a:xfrm>
             <a:off x="457200" y="1600200"/>
-            <a:ext cx="8229600" cy="3617700"/>
+            <a:ext cx="8229600" cy="3992100"/>
           </a:xfrm>
           <a:prstGeom prst="rect">
             <a:avLst/>
@@ -13381,7 +13792,19 @@
             </a:pPr>
             <a:r>
               <a:rPr lang="en-US" sz="2400"/>
-              <a:t>Training data already exists: Examiner citations</a:t>
+              <a:t>Link prediction</a:t>
+            </a:r>
+          </a:p>
+          <a:p>
+            <a:pPr indent="-381000" lvl="0" marL="914400" rtl="0">
+              <a:spcBef>
+                <a:spcPts val="0"/>
+              </a:spcBef>
+              <a:buSzPct val="100000"/>
+            </a:pPr>
+            <a:r>
+              <a:rPr lang="en-US" sz="2400"/>
+              <a:t>Positive examples already exist: Examiner citations</a:t>
             </a:r>
           </a:p>
           <a:p>
@@ -13406,7 +13829,765 @@
 </p:sld>
 </file>
 
+<file path=ppt/slides/slide5.xml><?xml version="1.0" encoding="utf-8"?>
+<p:sld xmlns:a="http://schemas.openxmlformats.org/drawingml/2006/main" xmlns:r="http://schemas.openxmlformats.org/officeDocument/2006/relationships" xmlns:mc="http://schemas.openxmlformats.org/markup-compatibility/2006" xmlns:mv="urn:schemas-microsoft-com:mac:vml" xmlns:p="http://schemas.openxmlformats.org/presentationml/2006/main" xmlns:c="http://schemas.openxmlformats.org/drawingml/2006/chart" xmlns:dgm="http://schemas.openxmlformats.org/drawingml/2006/diagram" xmlns:o="urn:schemas-microsoft-com:office:office" xmlns:v="urn:schemas-microsoft-com:vml" xmlns:pvml="urn:schemas-microsoft-com:office:powerpoint" xmlns:com="http://schemas.openxmlformats.org/drawingml/2006/compatibility" xmlns:p14="http://schemas.microsoft.com/office/powerpoint/2010/main">
+  <p:cSld>
+    <p:spTree>
+      <p:nvGrpSpPr>
+        <p:cNvPr id="162" name="Shape 162"/>
+        <p:cNvGrpSpPr/>
+        <p:nvPr/>
+      </p:nvGrpSpPr>
+      <p:grpSpPr>
+        <a:xfrm>
+          <a:off x="0" y="0"/>
+          <a:ext cx="0" cy="0"/>
+          <a:chOff x="0" y="0"/>
+          <a:chExt cx="0" cy="0"/>
+        </a:xfrm>
+      </p:grpSpPr>
+      <p:sp>
+        <p:nvSpPr>
+          <p:cNvPr id="163" name="Shape 163"/>
+          <p:cNvSpPr txBox="1"/>
+          <p:nvPr>
+            <p:ph type="title"/>
+          </p:nvPr>
+        </p:nvSpPr>
+        <p:spPr>
+          <a:xfrm>
+            <a:off x="990600" y="46037"/>
+            <a:ext cx="7696200" cy="1143000"/>
+          </a:xfrm>
+          <a:prstGeom prst="rect">
+            <a:avLst/>
+          </a:prstGeom>
+        </p:spPr>
+        <p:txBody>
+          <a:bodyPr anchorCtr="0" anchor="ctr" bIns="91425" lIns="91425" rIns="91425" tIns="91425">
+            <a:noAutofit/>
+          </a:bodyPr>
+          <a:lstStyle/>
+          <a:p>
+            <a:pPr lvl="0" rtl="0">
+              <a:spcBef>
+                <a:spcPts val="0"/>
+              </a:spcBef>
+              <a:buNone/>
+            </a:pPr>
+            <a:r>
+              <a:rPr lang="en-US"/>
+              <a:t>Issue: Data Wrangling</a:t>
+            </a:r>
+          </a:p>
+        </p:txBody>
+      </p:sp>
+      <p:sp>
+        <p:nvSpPr>
+          <p:cNvPr id="164" name="Shape 164"/>
+          <p:cNvSpPr txBox="1"/>
+          <p:nvPr>
+            <p:ph idx="1" type="body"/>
+          </p:nvPr>
+        </p:nvSpPr>
+        <p:spPr>
+          <a:xfrm>
+            <a:off x="457200" y="1600200"/>
+            <a:ext cx="8229600" cy="3617700"/>
+          </a:xfrm>
+          <a:prstGeom prst="rect">
+            <a:avLst/>
+          </a:prstGeom>
+        </p:spPr>
+        <p:txBody>
+          <a:bodyPr anchorCtr="0" anchor="t" bIns="91425" lIns="91425" rIns="91425" tIns="91425">
+            <a:noAutofit/>
+          </a:bodyPr>
+          <a:lstStyle/>
+          <a:p>
+            <a:pPr indent="0" lvl="0" marL="0" rtl="0">
+              <a:spcBef>
+                <a:spcPts val="0"/>
+              </a:spcBef>
+              <a:buNone/>
+            </a:pPr>
+            <a:r>
+              <a:rPr lang="en-US" sz="3000"/>
+              <a:t>Messy data!</a:t>
+            </a:r>
+          </a:p>
+          <a:p>
+            <a:pPr indent="-381000" lvl="0" marL="914400" rtl="0">
+              <a:spcBef>
+                <a:spcPts val="0"/>
+              </a:spcBef>
+              <a:buSzPct val="100000"/>
+            </a:pPr>
+            <a:r>
+              <a:rPr lang="en-US" sz="2400"/>
+              <a:t>Numbers can appear with/without punctuation</a:t>
+            </a:r>
+          </a:p>
+          <a:p>
+            <a:pPr indent="-381000" lvl="0" marL="914400" rtl="0">
+              <a:spcBef>
+                <a:spcPts val="0"/>
+              </a:spcBef>
+              <a:buSzPct val="100000"/>
+            </a:pPr>
+            <a:r>
+              <a:rPr lang="en-US" sz="2400"/>
+              <a:t>Collisions between different national systems</a:t>
+            </a:r>
+          </a:p>
+          <a:p>
+            <a:pPr indent="-381000" lvl="0" marL="914400" rtl="0">
+              <a:spcBef>
+                <a:spcPts val="0"/>
+              </a:spcBef>
+              <a:buSzPct val="100000"/>
+            </a:pPr>
+            <a:r>
+              <a:rPr lang="en-US" sz="2400"/>
+              <a:t>Many missing fields</a:t>
+            </a:r>
+          </a:p>
+          <a:p>
+            <a:pPr indent="0" lvl="0" marL="0" rtl="0">
+              <a:spcBef>
+                <a:spcPts val="0"/>
+              </a:spcBef>
+              <a:buNone/>
+            </a:pPr>
+            <a:r>
+              <a:rPr lang="en-US" sz="3000"/>
+              <a:t>Citation graph is very sparse</a:t>
+            </a:r>
+          </a:p>
+          <a:p>
+            <a:pPr indent="-381000" lvl="0" marL="914400" rtl="0">
+              <a:spcBef>
+                <a:spcPts val="0"/>
+              </a:spcBef>
+              <a:buSzPct val="100000"/>
+            </a:pPr>
+            <a:r>
+              <a:rPr lang="en-US" sz="2400"/>
+              <a:t>~300 edges in all of H04 from 2002 to 2015</a:t>
+            </a:r>
+          </a:p>
+        </p:txBody>
+      </p:sp>
+    </p:spTree>
+  </p:cSld>
+  <p:clrMapOvr>
+    <a:masterClrMapping/>
+  </p:clrMapOvr>
+</p:sld>
+</file>
+
+<file path=ppt/slides/slide6.xml><?xml version="1.0" encoding="utf-8"?>
+<p:sld xmlns:a="http://schemas.openxmlformats.org/drawingml/2006/main" xmlns:r="http://schemas.openxmlformats.org/officeDocument/2006/relationships" xmlns:mc="http://schemas.openxmlformats.org/markup-compatibility/2006" xmlns:mv="urn:schemas-microsoft-com:mac:vml" xmlns:p="http://schemas.openxmlformats.org/presentationml/2006/main" xmlns:c="http://schemas.openxmlformats.org/drawingml/2006/chart" xmlns:dgm="http://schemas.openxmlformats.org/drawingml/2006/diagram" xmlns:o="urn:schemas-microsoft-com:office:office" xmlns:v="urn:schemas-microsoft-com:vml" xmlns:pvml="urn:schemas-microsoft-com:office:powerpoint" xmlns:com="http://schemas.openxmlformats.org/drawingml/2006/compatibility" xmlns:p14="http://schemas.microsoft.com/office/powerpoint/2010/main">
+  <p:cSld>
+    <p:spTree>
+      <p:nvGrpSpPr>
+        <p:cNvPr id="169" name="Shape 169"/>
+        <p:cNvGrpSpPr/>
+        <p:nvPr/>
+      </p:nvGrpSpPr>
+      <p:grpSpPr>
+        <a:xfrm>
+          <a:off x="0" y="0"/>
+          <a:ext cx="0" cy="0"/>
+          <a:chOff x="0" y="0"/>
+          <a:chExt cx="0" cy="0"/>
+        </a:xfrm>
+      </p:grpSpPr>
+      <p:sp>
+        <p:nvSpPr>
+          <p:cNvPr id="170" name="Shape 170"/>
+          <p:cNvSpPr txBox="1"/>
+          <p:nvPr>
+            <p:ph type="title"/>
+          </p:nvPr>
+        </p:nvSpPr>
+        <p:spPr>
+          <a:xfrm>
+            <a:off x="990600" y="46037"/>
+            <a:ext cx="7696200" cy="1143000"/>
+          </a:xfrm>
+          <a:prstGeom prst="rect">
+            <a:avLst/>
+          </a:prstGeom>
+        </p:spPr>
+        <p:txBody>
+          <a:bodyPr anchorCtr="0" anchor="ctr" bIns="91425" lIns="91425" rIns="91425" tIns="91425">
+            <a:noAutofit/>
+          </a:bodyPr>
+          <a:lstStyle/>
+          <a:p>
+            <a:pPr lvl="0" rtl="0">
+              <a:spcBef>
+                <a:spcPts val="0"/>
+              </a:spcBef>
+              <a:buNone/>
+            </a:pPr>
+            <a:r>
+              <a:rPr lang="en-US"/>
+              <a:t>(Partial) Solutions</a:t>
+            </a:r>
+          </a:p>
+        </p:txBody>
+      </p:sp>
+      <p:sp>
+        <p:nvSpPr>
+          <p:cNvPr id="171" name="Shape 171"/>
+          <p:cNvSpPr txBox="1"/>
+          <p:nvPr>
+            <p:ph idx="1" type="body"/>
+          </p:nvPr>
+        </p:nvSpPr>
+        <p:spPr>
+          <a:xfrm>
+            <a:off x="457200" y="1600200"/>
+            <a:ext cx="8229600" cy="3811200"/>
+          </a:xfrm>
+          <a:prstGeom prst="rect">
+            <a:avLst/>
+          </a:prstGeom>
+        </p:spPr>
+        <p:txBody>
+          <a:bodyPr anchorCtr="0" anchor="t" bIns="91425" lIns="91425" rIns="91425" tIns="91425">
+            <a:noAutofit/>
+          </a:bodyPr>
+          <a:lstStyle/>
+          <a:p>
+            <a:pPr indent="0" lvl="0" marL="0" rtl="0">
+              <a:spcBef>
+                <a:spcPts val="0"/>
+              </a:spcBef>
+              <a:buNone/>
+            </a:pPr>
+            <a:r>
+              <a:rPr lang="en-US" sz="3000"/>
+              <a:t>Cleaning the data:</a:t>
+            </a:r>
+          </a:p>
+          <a:p>
+            <a:pPr indent="-381000" lvl="0" marL="914400" rtl="0">
+              <a:spcBef>
+                <a:spcPts val="0"/>
+              </a:spcBef>
+              <a:buSzPct val="100000"/>
+            </a:pPr>
+            <a:r>
+              <a:rPr lang="en-US" sz="2400"/>
+              <a:t>Normalize patent numbers (e.g., remove punctuation)</a:t>
+            </a:r>
+          </a:p>
+          <a:p>
+            <a:pPr indent="-381000" lvl="0" marL="914400" rtl="0">
+              <a:spcBef>
+                <a:spcPts val="0"/>
+              </a:spcBef>
+              <a:buSzPct val="100000"/>
+            </a:pPr>
+            <a:r>
+              <a:rPr lang="en-US" sz="2400"/>
+              <a:t>Creates new set of collisions</a:t>
+            </a:r>
+          </a:p>
+          <a:p>
+            <a:pPr indent="0" lvl="0" marL="0" rtl="0">
+              <a:spcBef>
+                <a:spcPts val="0"/>
+              </a:spcBef>
+              <a:buNone/>
+            </a:pPr>
+            <a:r>
+              <a:rPr lang="en-US" sz="3000"/>
+              <a:t>Desparsify citation graph:</a:t>
+            </a:r>
+          </a:p>
+          <a:p>
+            <a:pPr indent="-381000" lvl="0" marL="914400" rtl="0">
+              <a:spcBef>
+                <a:spcPts val="0"/>
+              </a:spcBef>
+              <a:buSzPct val="100000"/>
+            </a:pPr>
+            <a:r>
+              <a:rPr lang="en-US" sz="2400"/>
+              <a:t>Join patents/applications that cite the same document</a:t>
+            </a:r>
+          </a:p>
+          <a:p>
+            <a:pPr indent="-381000" lvl="0" marL="914400" rtl="0">
+              <a:spcBef>
+                <a:spcPts val="0"/>
+              </a:spcBef>
+              <a:buSzPct val="100000"/>
+            </a:pPr>
+            <a:r>
+              <a:rPr lang="en-US" sz="2400"/>
+              <a:t>~33M edges for 670K nodes in all of category H</a:t>
+            </a:r>
+          </a:p>
+          <a:p>
+            <a:pPr indent="-381000" lvl="0" marL="914400" rtl="0">
+              <a:spcBef>
+                <a:spcPts val="0"/>
+              </a:spcBef>
+              <a:buSzPct val="100000"/>
+            </a:pPr>
+            <a:r>
+              <a:rPr lang="en-US" sz="2400"/>
+              <a:t>1e-4 sparsity factor-- still </a:t>
+            </a:r>
+            <a:r>
+              <a:rPr b="1" lang="en-US" sz="2400"/>
+              <a:t>very</a:t>
+            </a:r>
+            <a:r>
+              <a:rPr lang="en-US" sz="2400"/>
+              <a:t> sparse!</a:t>
+            </a:r>
+          </a:p>
+          <a:p>
+            <a:pPr indent="0" lvl="0" marL="0" rtl="0">
+              <a:spcBef>
+                <a:spcPts val="0"/>
+              </a:spcBef>
+              <a:buNone/>
+            </a:pPr>
+            <a:r>
+              <a:rPr lang="en-US" sz="3000"/>
+              <a:t>Vast majority of effort went into data cleaning</a:t>
+            </a:r>
+          </a:p>
+        </p:txBody>
+      </p:sp>
+    </p:spTree>
+  </p:cSld>
+  <p:clrMapOvr>
+    <a:masterClrMapping/>
+  </p:clrMapOvr>
+</p:sld>
+</file>
+
+<file path=ppt/slides/slide7.xml><?xml version="1.0" encoding="utf-8"?>
+<p:sld xmlns:a="http://schemas.openxmlformats.org/drawingml/2006/main" xmlns:r="http://schemas.openxmlformats.org/officeDocument/2006/relationships" xmlns:mc="http://schemas.openxmlformats.org/markup-compatibility/2006" xmlns:mv="urn:schemas-microsoft-com:mac:vml" xmlns:p="http://schemas.openxmlformats.org/presentationml/2006/main" xmlns:c="http://schemas.openxmlformats.org/drawingml/2006/chart" xmlns:dgm="http://schemas.openxmlformats.org/drawingml/2006/diagram" xmlns:o="urn:schemas-microsoft-com:office:office" xmlns:v="urn:schemas-microsoft-com:vml" xmlns:pvml="urn:schemas-microsoft-com:office:powerpoint" xmlns:com="http://schemas.openxmlformats.org/drawingml/2006/compatibility" xmlns:p14="http://schemas.microsoft.com/office/powerpoint/2010/main">
+  <p:cSld>
+    <p:spTree>
+      <p:nvGrpSpPr>
+        <p:cNvPr id="176" name="Shape 176"/>
+        <p:cNvGrpSpPr/>
+        <p:nvPr/>
+      </p:nvGrpSpPr>
+      <p:grpSpPr>
+        <a:xfrm>
+          <a:off x="0" y="0"/>
+          <a:ext cx="0" cy="0"/>
+          <a:chOff x="0" y="0"/>
+          <a:chExt cx="0" cy="0"/>
+        </a:xfrm>
+      </p:grpSpPr>
+      <p:sp>
+        <p:nvSpPr>
+          <p:cNvPr id="177" name="Shape 177"/>
+          <p:cNvSpPr txBox="1"/>
+          <p:nvPr>
+            <p:ph type="title"/>
+          </p:nvPr>
+        </p:nvSpPr>
+        <p:spPr>
+          <a:xfrm>
+            <a:off x="990600" y="46037"/>
+            <a:ext cx="7696200" cy="1143000"/>
+          </a:xfrm>
+          <a:prstGeom prst="rect">
+            <a:avLst/>
+          </a:prstGeom>
+        </p:spPr>
+        <p:txBody>
+          <a:bodyPr anchorCtr="0" anchor="ctr" bIns="91425" lIns="91425" rIns="91425" tIns="91425">
+            <a:noAutofit/>
+          </a:bodyPr>
+          <a:lstStyle/>
+          <a:p>
+            <a:pPr lvl="0" rtl="0">
+              <a:spcBef>
+                <a:spcPts val="0"/>
+              </a:spcBef>
+              <a:buNone/>
+            </a:pPr>
+            <a:r>
+              <a:rPr lang="en-US"/>
+              <a:t>Next Steps</a:t>
+            </a:r>
+          </a:p>
+        </p:txBody>
+      </p:sp>
+      <p:sp>
+        <p:nvSpPr>
+          <p:cNvPr id="178" name="Shape 178"/>
+          <p:cNvSpPr txBox="1"/>
+          <p:nvPr>
+            <p:ph idx="1" type="body"/>
+          </p:nvPr>
+        </p:nvSpPr>
+        <p:spPr>
+          <a:xfrm>
+            <a:off x="457200" y="1600200"/>
+            <a:ext cx="8229600" cy="3811200"/>
+          </a:xfrm>
+          <a:prstGeom prst="rect">
+            <a:avLst/>
+          </a:prstGeom>
+        </p:spPr>
+        <p:txBody>
+          <a:bodyPr anchorCtr="0" anchor="t" bIns="91425" lIns="91425" rIns="91425" tIns="91425">
+            <a:noAutofit/>
+          </a:bodyPr>
+          <a:lstStyle/>
+          <a:p>
+            <a:pPr indent="0" lvl="0" marL="0" rtl="0">
+              <a:spcBef>
+                <a:spcPts val="0"/>
+              </a:spcBef>
+              <a:buNone/>
+            </a:pPr>
+            <a:r>
+              <a:rPr lang="en-US" sz="3000"/>
+              <a:t>Construct train/dev/test split</a:t>
+            </a:r>
+          </a:p>
+          <a:p>
+            <a:pPr indent="-381000" lvl="0" marL="914400" rtl="0">
+              <a:spcBef>
+                <a:spcPts val="0"/>
+              </a:spcBef>
+              <a:buSzPct val="100000"/>
+            </a:pPr>
+            <a:r>
+              <a:rPr lang="en-US" sz="2400"/>
+              <a:t>and additional cleaning of data set</a:t>
+            </a:r>
+          </a:p>
+          <a:p>
+            <a:pPr indent="0" lvl="0" marL="0" rtl="0">
+              <a:spcBef>
+                <a:spcPts val="0"/>
+              </a:spcBef>
+              <a:buNone/>
+            </a:pPr>
+            <a:r>
+              <a:rPr lang="en-US" sz="3000"/>
+              <a:t>Train classifier and complete system</a:t>
+            </a:r>
+          </a:p>
+          <a:p>
+            <a:pPr indent="-381000" lvl="0" marL="914400" rtl="0">
+              <a:spcBef>
+                <a:spcPts val="0"/>
+              </a:spcBef>
+              <a:buSzPct val="100000"/>
+            </a:pPr>
+            <a:r>
+              <a:rPr lang="en-US" sz="2400"/>
+              <a:t>subsystems need to be chained together</a:t>
+            </a:r>
+          </a:p>
+        </p:txBody>
+      </p:sp>
+    </p:spTree>
+  </p:cSld>
+  <p:clrMapOvr>
+    <a:masterClrMapping/>
+  </p:clrMapOvr>
+</p:sld>
+</file>
+
 <file path=ppt/theme/theme1.xml><?xml version="1.0" encoding="utf-8"?>
+<a:theme xmlns:a="http://schemas.openxmlformats.org/drawingml/2006/main" xmlns:r="http://schemas.openxmlformats.org/officeDocument/2006/relationships" name="Custom Theme">
+  <a:themeElements>
+    <a:clrScheme name="Default">
+      <a:dk1>
+        <a:srgbClr val="000000"/>
+      </a:dk1>
+      <a:lt1>
+        <a:srgbClr val="FFFFFF"/>
+      </a:lt1>
+      <a:dk2>
+        <a:srgbClr val="158158"/>
+      </a:dk2>
+      <a:lt2>
+        <a:srgbClr val="F3F3F3"/>
+      </a:lt2>
+      <a:accent1>
+        <a:srgbClr val="058DC7"/>
+      </a:accent1>
+      <a:accent2>
+        <a:srgbClr val="50B432"/>
+      </a:accent2>
+      <a:accent3>
+        <a:srgbClr val="ED561B"/>
+      </a:accent3>
+      <a:accent4>
+        <a:srgbClr val="EDEF00"/>
+      </a:accent4>
+      <a:accent5>
+        <a:srgbClr val="24CBE5"/>
+      </a:accent5>
+      <a:accent6>
+        <a:srgbClr val="64E572"/>
+      </a:accent6>
+      <a:hlink>
+        <a:srgbClr val="2200CC"/>
+      </a:hlink>
+      <a:folHlink>
+        <a:srgbClr val="551A8B"/>
+      </a:folHlink>
+    </a:clrScheme>
+    <a:fontScheme name="Office">
+      <a:majorFont>
+        <a:latin typeface="Arial"/>
+        <a:ea typeface=""/>
+        <a:cs typeface=""/>
+        <a:font script="Jpan" typeface="ＭＳ Ｐゴシック"/>
+        <a:font script="Hang" typeface="맑은 고딕"/>
+        <a:font script="Hans" typeface="宋体"/>
+        <a:font script="Hant" typeface="新細明體"/>
+        <a:font script="Arab" typeface="Times New Roman"/>
+        <a:font script="Hebr" typeface="Times New Roman"/>
+        <a:font script="Thai" typeface="Angsana New"/>
+        <a:font script="Ethi" typeface="Nyala"/>
+        <a:font script="Beng" typeface="Vrinda"/>
+        <a:font script="Gujr" typeface="Shruti"/>
+        <a:font script="Khmr" typeface="MoolBoran"/>
+        <a:font script="Knda" typeface="Tunga"/>
+        <a:font script="Guru" typeface="Raavi"/>
+        <a:font script="Cans" typeface="Euphemia"/>
+        <a:font script="Cher" typeface="Plantagenet Cherokee"/>
+        <a:font script="Yiii" typeface="Microsoft Yi Baiti"/>
+        <a:font script="Tibt" typeface="Microsoft Himalaya"/>
+        <a:font script="Thaa" typeface="MV Boli"/>
+        <a:font script="Deva" typeface="Mangal"/>
+        <a:font script="Telu" typeface="Gautami"/>
+        <a:font script="Taml" typeface="Latha"/>
+        <a:font script="Syrc" typeface="Estrangelo Edessa"/>
+        <a:font script="Orya" typeface="Kalinga"/>
+        <a:font script="Mlym" typeface="Kartika"/>
+        <a:font script="Laoo" typeface="DokChampa"/>
+        <a:font script="Sinh" typeface="Iskoola Pota"/>
+        <a:font script="Mong" typeface="Mongolian Baiti"/>
+        <a:font script="Viet" typeface="Times New Roman"/>
+        <a:font script="Uigh" typeface="Microsoft Uighur"/>
+        <a:font script="Geor" typeface="Sylfaen"/>
+      </a:majorFont>
+      <a:minorFont>
+        <a:latin typeface="Arial"/>
+        <a:ea typeface=""/>
+        <a:cs typeface=""/>
+        <a:font script="Jpan" typeface="ＭＳ Ｐゴシック"/>
+        <a:font script="Hang" typeface="맑은 고딕"/>
+        <a:font script="Hans" typeface="宋体"/>
+        <a:font script="Hant" typeface="新細明體"/>
+        <a:font script="Arab" typeface="Arial"/>
+        <a:font script="Hebr" typeface="Arial"/>
+        <a:font script="Thai" typeface="Cordia New"/>
+        <a:font script="Ethi" typeface="Nyala"/>
+        <a:font script="Beng" typeface="Vrinda"/>
+        <a:font script="Gujr" typeface="Shruti"/>
+        <a:font script="Khmr" typeface="DaunPenh"/>
+        <a:font script="Knda" typeface="Tunga"/>
+        <a:font script="Guru" typeface="Raavi"/>
+        <a:font script="Cans" typeface="Euphemia"/>
+        <a:font script="Cher" typeface="Plantagenet Cherokee"/>
+        <a:font script="Yiii" typeface="Microsoft Yi Baiti"/>
+        <a:font script="Tibt" typeface="Microsoft Himalaya"/>
+        <a:font script="Thaa" typeface="MV Boli"/>
+        <a:font script="Deva" typeface="Mangal"/>
+        <a:font script="Telu" typeface="Gautami"/>
+        <a:font script="Taml" typeface="Latha"/>
+        <a:font script="Syrc" typeface="Estrangelo Edessa"/>
+        <a:font script="Orya" typeface="Kalinga"/>
+        <a:font script="Mlym" typeface="Kartika"/>
+        <a:font script="Laoo" typeface="DokChampa"/>
+        <a:font script="Sinh" typeface="Iskoola Pota"/>
+        <a:font script="Mong" typeface="Mongolian Baiti"/>
+        <a:font script="Viet" typeface="Arial"/>
+        <a:font script="Uigh" typeface="Microsoft Uighur"/>
+        <a:font script="Geor" typeface="Sylfaen"/>
+      </a:minorFont>
+    </a:fontScheme>
+    <a:fmtScheme name="Office">
+      <a:fillStyleLst>
+        <a:solidFill>
+          <a:schemeClr val="phClr"/>
+        </a:solidFill>
+        <a:gradFill rotWithShape="1">
+          <a:gsLst>
+            <a:gs pos="0">
+              <a:schemeClr val="phClr">
+                <a:tint val="50000"/>
+                <a:satMod val="300000"/>
+              </a:schemeClr>
+            </a:gs>
+            <a:gs pos="35000">
+              <a:schemeClr val="phClr">
+                <a:tint val="37000"/>
+                <a:satMod val="300000"/>
+              </a:schemeClr>
+            </a:gs>
+            <a:gs pos="100000">
+              <a:schemeClr val="phClr">
+                <a:tint val="15000"/>
+                <a:satMod val="350000"/>
+              </a:schemeClr>
+            </a:gs>
+          </a:gsLst>
+          <a:lin ang="16200000" scaled="1"/>
+        </a:gradFill>
+        <a:gradFill rotWithShape="1">
+          <a:gsLst>
+            <a:gs pos="0">
+              <a:schemeClr val="phClr">
+                <a:tint val="100000"/>
+                <a:shade val="100000"/>
+                <a:satMod val="130000"/>
+              </a:schemeClr>
+            </a:gs>
+            <a:gs pos="100000">
+              <a:schemeClr val="phClr">
+                <a:tint val="50000"/>
+                <a:shade val="100000"/>
+                <a:satMod val="350000"/>
+              </a:schemeClr>
+            </a:gs>
+          </a:gsLst>
+          <a:lin ang="16200000" scaled="0"/>
+        </a:gradFill>
+      </a:fillStyleLst>
+      <a:lnStyleLst>
+        <a:ln w="9525" cap="flat" cmpd="sng" algn="ctr">
+          <a:solidFill>
+            <a:schemeClr val="phClr">
+              <a:shade val="95000"/>
+              <a:satMod val="105000"/>
+            </a:schemeClr>
+          </a:solidFill>
+          <a:prstDash val="solid"/>
+        </a:ln>
+        <a:ln w="25400" cap="flat" cmpd="sng" algn="ctr">
+          <a:solidFill>
+            <a:schemeClr val="phClr"/>
+          </a:solidFill>
+          <a:prstDash val="solid"/>
+        </a:ln>
+        <a:ln w="38100" cap="flat" cmpd="sng" algn="ctr">
+          <a:solidFill>
+            <a:schemeClr val="phClr"/>
+          </a:solidFill>
+          <a:prstDash val="solid"/>
+        </a:ln>
+      </a:lnStyleLst>
+      <a:effectStyleLst>
+        <a:effectStyle>
+          <a:effectLst>
+            <a:outerShdw blurRad="40000" dist="20000" dir="5400000" rotWithShape="0">
+              <a:srgbClr val="000000">
+                <a:alpha val="38000"/>
+              </a:srgbClr>
+            </a:outerShdw>
+          </a:effectLst>
+        </a:effectStyle>
+        <a:effectStyle>
+          <a:effectLst>
+            <a:outerShdw blurRad="40000" dist="23000" dir="5400000" rotWithShape="0">
+              <a:srgbClr val="000000">
+                <a:alpha val="35000"/>
+              </a:srgbClr>
+            </a:outerShdw>
+          </a:effectLst>
+        </a:effectStyle>
+        <a:effectStyle>
+          <a:effectLst>
+            <a:outerShdw blurRad="40000" dist="23000" dir="5400000" rotWithShape="0">
+              <a:srgbClr val="000000">
+                <a:alpha val="35000"/>
+              </a:srgbClr>
+            </a:outerShdw>
+          </a:effectLst>
+          <a:scene3d>
+            <a:camera prst="orthographicFront">
+              <a:rot lat="0" lon="0" rev="0"/>
+            </a:camera>
+            <a:lightRig rig="threePt" dir="t">
+              <a:rot lat="0" lon="0" rev="1200000"/>
+            </a:lightRig>
+          </a:scene3d>
+          <a:sp3d>
+            <a:bevelT w="63500" h="25400"/>
+          </a:sp3d>
+        </a:effectStyle>
+      </a:effectStyleLst>
+      <a:bgFillStyleLst>
+        <a:solidFill>
+          <a:schemeClr val="phClr"/>
+        </a:solidFill>
+        <a:gradFill rotWithShape="1">
+          <a:gsLst>
+            <a:gs pos="0">
+              <a:schemeClr val="phClr">
+                <a:tint val="40000"/>
+                <a:satMod val="350000"/>
+              </a:schemeClr>
+            </a:gs>
+            <a:gs pos="40000">
+              <a:schemeClr val="phClr">
+                <a:tint val="45000"/>
+                <a:shade val="99000"/>
+                <a:satMod val="350000"/>
+              </a:schemeClr>
+            </a:gs>
+            <a:gs pos="100000">
+              <a:schemeClr val="phClr">
+                <a:shade val="20000"/>
+                <a:satMod val="255000"/>
+              </a:schemeClr>
+            </a:gs>
+          </a:gsLst>
+          <a:path path="circle">
+            <a:fillToRect l="50000" t="-80000" r="50000" b="180000"/>
+          </a:path>
+        </a:gradFill>
+        <a:gradFill rotWithShape="1">
+          <a:gsLst>
+            <a:gs pos="0">
+              <a:schemeClr val="phClr">
+                <a:tint val="80000"/>
+                <a:satMod val="300000"/>
+              </a:schemeClr>
+            </a:gs>
+            <a:gs pos="100000">
+              <a:schemeClr val="phClr">
+                <a:shade val="30000"/>
+                <a:satMod val="200000"/>
+              </a:schemeClr>
+            </a:gs>
+          </a:gsLst>
+          <a:path path="circle">
+            <a:fillToRect l="50000" t="50000" r="50000" b="50000"/>
+          </a:path>
+        </a:gradFill>
+      </a:bgFillStyleLst>
+    </a:fmtScheme>
+  </a:themeElements>
+</a:theme>
+</file>
+
+<file path=ppt/theme/theme2.xml><?xml version="1.0" encoding="utf-8"?>
 <a:theme xmlns:a="http://schemas.openxmlformats.org/drawingml/2006/main" xmlns:r="http://schemas.openxmlformats.org/officeDocument/2006/relationships" name="COE Template October 2010">
   <a:themeElements>
     <a:clrScheme name="Office">
@@ -13683,283 +14864,4 @@
     </a:fmtScheme>
   </a:themeElements>
 </a:theme>
-</file>
-
-<file path=ppt/theme/theme2.xml><?xml version="1.0" encoding="utf-8"?>
-<a:theme xmlns:a="http://schemas.openxmlformats.org/drawingml/2006/main" xmlns:r="http://schemas.openxmlformats.org/officeDocument/2006/relationships" name="Custom Theme">
-  <a:themeElements>
-    <a:clrScheme name="Default">
-      <a:dk1>
-        <a:srgbClr val="000000"/>
-      </a:dk1>
-      <a:lt1>
-        <a:srgbClr val="FFFFFF"/>
-      </a:lt1>
-      <a:dk2>
-        <a:srgbClr val="158158"/>
-      </a:dk2>
-      <a:lt2>
-        <a:srgbClr val="F3F3F3"/>
-      </a:lt2>
-      <a:accent1>
-        <a:srgbClr val="058DC7"/>
-      </a:accent1>
-      <a:accent2>
-        <a:srgbClr val="50B432"/>
-      </a:accent2>
-      <a:accent3>
-        <a:srgbClr val="ED561B"/>
-      </a:accent3>
-      <a:accent4>
-        <a:srgbClr val="EDEF00"/>
-      </a:accent4>
-      <a:accent5>
-        <a:srgbClr val="24CBE5"/>
-      </a:accent5>
-      <a:accent6>
-        <a:srgbClr val="64E572"/>
-      </a:accent6>
-      <a:hlink>
-        <a:srgbClr val="2200CC"/>
-      </a:hlink>
-      <a:folHlink>
-        <a:srgbClr val="551A8B"/>
-      </a:folHlink>
-    </a:clrScheme>
-    <a:fontScheme name="Office">
-      <a:majorFont>
-        <a:latin typeface="Arial"/>
-        <a:ea typeface=""/>
-        <a:cs typeface=""/>
-        <a:font script="Jpan" typeface="ＭＳ Ｐゴシック"/>
-        <a:font script="Hang" typeface="맑은 고딕"/>
-        <a:font script="Hans" typeface="宋体"/>
-        <a:font script="Hant" typeface="新細明體"/>
-        <a:font script="Arab" typeface="Times New Roman"/>
-        <a:font script="Hebr" typeface="Times New Roman"/>
-        <a:font script="Thai" typeface="Angsana New"/>
-        <a:font script="Ethi" typeface="Nyala"/>
-        <a:font script="Beng" typeface="Vrinda"/>
-        <a:font script="Gujr" typeface="Shruti"/>
-        <a:font script="Khmr" typeface="MoolBoran"/>
-        <a:font script="Knda" typeface="Tunga"/>
-        <a:font script="Guru" typeface="Raavi"/>
-        <a:font script="Cans" typeface="Euphemia"/>
-        <a:font script="Cher" typeface="Plantagenet Cherokee"/>
-        <a:font script="Yiii" typeface="Microsoft Yi Baiti"/>
-        <a:font script="Tibt" typeface="Microsoft Himalaya"/>
-        <a:font script="Thaa" typeface="MV Boli"/>
-        <a:font script="Deva" typeface="Mangal"/>
-        <a:font script="Telu" typeface="Gautami"/>
-        <a:font script="Taml" typeface="Latha"/>
-        <a:font script="Syrc" typeface="Estrangelo Edessa"/>
-        <a:font script="Orya" typeface="Kalinga"/>
-        <a:font script="Mlym" typeface="Kartika"/>
-        <a:font script="Laoo" typeface="DokChampa"/>
-        <a:font script="Sinh" typeface="Iskoola Pota"/>
-        <a:font script="Mong" typeface="Mongolian Baiti"/>
-        <a:font script="Viet" typeface="Times New Roman"/>
-        <a:font script="Uigh" typeface="Microsoft Uighur"/>
-        <a:font script="Geor" typeface="Sylfaen"/>
-      </a:majorFont>
-      <a:minorFont>
-        <a:latin typeface="Arial"/>
-        <a:ea typeface=""/>
-        <a:cs typeface=""/>
-        <a:font script="Jpan" typeface="ＭＳ Ｐゴシック"/>
-        <a:font script="Hang" typeface="맑은 고딕"/>
-        <a:font script="Hans" typeface="宋体"/>
-        <a:font script="Hant" typeface="新細明體"/>
-        <a:font script="Arab" typeface="Arial"/>
-        <a:font script="Hebr" typeface="Arial"/>
-        <a:font script="Thai" typeface="Cordia New"/>
-        <a:font script="Ethi" typeface="Nyala"/>
-        <a:font script="Beng" typeface="Vrinda"/>
-        <a:font script="Gujr" typeface="Shruti"/>
-        <a:font script="Khmr" typeface="DaunPenh"/>
-        <a:font script="Knda" typeface="Tunga"/>
-        <a:font script="Guru" typeface="Raavi"/>
-        <a:font script="Cans" typeface="Euphemia"/>
-        <a:font script="Cher" typeface="Plantagenet Cherokee"/>
-        <a:font script="Yiii" typeface="Microsoft Yi Baiti"/>
-        <a:font script="Tibt" typeface="Microsoft Himalaya"/>
-        <a:font script="Thaa" typeface="MV Boli"/>
-        <a:font script="Deva" typeface="Mangal"/>
-        <a:font script="Telu" typeface="Gautami"/>
-        <a:font script="Taml" typeface="Latha"/>
-        <a:font script="Syrc" typeface="Estrangelo Edessa"/>
-        <a:font script="Orya" typeface="Kalinga"/>
-        <a:font script="Mlym" typeface="Kartika"/>
-        <a:font script="Laoo" typeface="DokChampa"/>
-        <a:font script="Sinh" typeface="Iskoola Pota"/>
-        <a:font script="Mong" typeface="Mongolian Baiti"/>
-        <a:font script="Viet" typeface="Arial"/>
-        <a:font script="Uigh" typeface="Microsoft Uighur"/>
-        <a:font script="Geor" typeface="Sylfaen"/>
-      </a:minorFont>
-    </a:fontScheme>
-    <a:fmtScheme name="Office">
-      <a:fillStyleLst>
-        <a:solidFill>
-          <a:schemeClr val="phClr"/>
-        </a:solidFill>
-        <a:gradFill rotWithShape="1">
-          <a:gsLst>
-            <a:gs pos="0">
-              <a:schemeClr val="phClr">
-                <a:tint val="50000"/>
-                <a:satMod val="300000"/>
-              </a:schemeClr>
-            </a:gs>
-            <a:gs pos="35000">
-              <a:schemeClr val="phClr">
-                <a:tint val="37000"/>
-                <a:satMod val="300000"/>
-              </a:schemeClr>
-            </a:gs>
-            <a:gs pos="100000">
-              <a:schemeClr val="phClr">
-                <a:tint val="15000"/>
-                <a:satMod val="350000"/>
-              </a:schemeClr>
-            </a:gs>
-          </a:gsLst>
-          <a:lin ang="16200000" scaled="1"/>
-        </a:gradFill>
-        <a:gradFill rotWithShape="1">
-          <a:gsLst>
-            <a:gs pos="0">
-              <a:schemeClr val="phClr">
-                <a:tint val="100000"/>
-                <a:shade val="100000"/>
-                <a:satMod val="130000"/>
-              </a:schemeClr>
-            </a:gs>
-            <a:gs pos="100000">
-              <a:schemeClr val="phClr">
-                <a:tint val="50000"/>
-                <a:shade val="100000"/>
-                <a:satMod val="350000"/>
-              </a:schemeClr>
-            </a:gs>
-          </a:gsLst>
-          <a:lin ang="16200000" scaled="0"/>
-        </a:gradFill>
-      </a:fillStyleLst>
-      <a:lnStyleLst>
-        <a:ln w="9525" cap="flat" cmpd="sng" algn="ctr">
-          <a:solidFill>
-            <a:schemeClr val="phClr">
-              <a:shade val="95000"/>
-              <a:satMod val="105000"/>
-            </a:schemeClr>
-          </a:solidFill>
-          <a:prstDash val="solid"/>
-        </a:ln>
-        <a:ln w="25400" cap="flat" cmpd="sng" algn="ctr">
-          <a:solidFill>
-            <a:schemeClr val="phClr"/>
-          </a:solidFill>
-          <a:prstDash val="solid"/>
-        </a:ln>
-        <a:ln w="38100" cap="flat" cmpd="sng" algn="ctr">
-          <a:solidFill>
-            <a:schemeClr val="phClr"/>
-          </a:solidFill>
-          <a:prstDash val="solid"/>
-        </a:ln>
-      </a:lnStyleLst>
-      <a:effectStyleLst>
-        <a:effectStyle>
-          <a:effectLst>
-            <a:outerShdw blurRad="40000" dist="20000" dir="5400000" rotWithShape="0">
-              <a:srgbClr val="000000">
-                <a:alpha val="38000"/>
-              </a:srgbClr>
-            </a:outerShdw>
-          </a:effectLst>
-        </a:effectStyle>
-        <a:effectStyle>
-          <a:effectLst>
-            <a:outerShdw blurRad="40000" dist="23000" dir="5400000" rotWithShape="0">
-              <a:srgbClr val="000000">
-                <a:alpha val="35000"/>
-              </a:srgbClr>
-            </a:outerShdw>
-          </a:effectLst>
-        </a:effectStyle>
-        <a:effectStyle>
-          <a:effectLst>
-            <a:outerShdw blurRad="40000" dist="23000" dir="5400000" rotWithShape="0">
-              <a:srgbClr val="000000">
-                <a:alpha val="35000"/>
-              </a:srgbClr>
-            </a:outerShdw>
-          </a:effectLst>
-          <a:scene3d>
-            <a:camera prst="orthographicFront">
-              <a:rot lat="0" lon="0" rev="0"/>
-            </a:camera>
-            <a:lightRig rig="threePt" dir="t">
-              <a:rot lat="0" lon="0" rev="1200000"/>
-            </a:lightRig>
-          </a:scene3d>
-          <a:sp3d>
-            <a:bevelT w="63500" h="25400"/>
-          </a:sp3d>
-        </a:effectStyle>
-      </a:effectStyleLst>
-      <a:bgFillStyleLst>
-        <a:solidFill>
-          <a:schemeClr val="phClr"/>
-        </a:solidFill>
-        <a:gradFill rotWithShape="1">
-          <a:gsLst>
-            <a:gs pos="0">
-              <a:schemeClr val="phClr">
-                <a:tint val="40000"/>
-                <a:satMod val="350000"/>
-              </a:schemeClr>
-            </a:gs>
-            <a:gs pos="40000">
-              <a:schemeClr val="phClr">
-                <a:tint val="45000"/>
-                <a:shade val="99000"/>
-                <a:satMod val="350000"/>
-              </a:schemeClr>
-            </a:gs>
-            <a:gs pos="100000">
-              <a:schemeClr val="phClr">
-                <a:shade val="20000"/>
-                <a:satMod val="255000"/>
-              </a:schemeClr>
-            </a:gs>
-          </a:gsLst>
-          <a:path path="circle">
-            <a:fillToRect l="50000" t="-80000" r="50000" b="180000"/>
-          </a:path>
-        </a:gradFill>
-        <a:gradFill rotWithShape="1">
-          <a:gsLst>
-            <a:gs pos="0">
-              <a:schemeClr val="phClr">
-                <a:tint val="80000"/>
-                <a:satMod val="300000"/>
-              </a:schemeClr>
-            </a:gs>
-            <a:gs pos="100000">
-              <a:schemeClr val="phClr">
-                <a:shade val="30000"/>
-                <a:satMod val="200000"/>
-              </a:schemeClr>
-            </a:gs>
-          </a:gsLst>
-          <a:path path="circle">
-            <a:fillToRect l="50000" t="50000" r="50000" b="50000"/>
-          </a:path>
-        </a:gradFill>
-      </a:bgFillStyleLst>
-    </a:fmtScheme>
-  </a:themeElements>
-</a:theme>
 </file>
</xml_diff>

<commit_message>
Added plots of SBM embeddings, added more random discussion.
</commit_message>
<xml_diff>
--- a/XDATA_Sep2016_klevin_slides.pptx
+++ b/XDATA_Sep2016_klevin_slides.pptx
@@ -15,6 +15,9 @@
     <p:sldId id="260" r:id="rId9"/>
     <p:sldId id="261" r:id="rId10"/>
     <p:sldId id="262" r:id="rId11"/>
+    <p:sldId id="263" r:id="rId12"/>
+    <p:sldId id="264" r:id="rId13"/>
+    <p:sldId id="265" r:id="rId14"/>
   </p:sldIdLst>
   <p:sldSz cy="6858000" cx="9144000"/>
   <p:notesSz cx="6858000" cy="9144000"/>
@@ -1161,6 +1164,142 @@
 </p:notes>
 </file>
 
+<file path=ppt/notesSlides/notesSlide10.xml><?xml version="1.0" encoding="utf-8"?>
+<p:notes xmlns:a="http://schemas.openxmlformats.org/drawingml/2006/main" xmlns:r="http://schemas.openxmlformats.org/officeDocument/2006/relationships" xmlns:mc="http://schemas.openxmlformats.org/markup-compatibility/2006" xmlns:mv="urn:schemas-microsoft-com:mac:vml" xmlns:p="http://schemas.openxmlformats.org/presentationml/2006/main" xmlns:c="http://schemas.openxmlformats.org/drawingml/2006/chart" xmlns:dgm="http://schemas.openxmlformats.org/drawingml/2006/diagram" xmlns:o="urn:schemas-microsoft-com:office:office" xmlns:v="urn:schemas-microsoft-com:vml" xmlns:pvml="urn:schemas-microsoft-com:office:powerpoint" xmlns:com="http://schemas.openxmlformats.org/drawingml/2006/compatibility" xmlns:p14="http://schemas.microsoft.com/office/powerpoint/2010/main" showMasterPhAnim="0" showMasterSp="0">
+  <p:cSld>
+    <p:spTree>
+      <p:nvGrpSpPr>
+        <p:cNvPr id="197" name="Shape 197"/>
+        <p:cNvGrpSpPr/>
+        <p:nvPr/>
+      </p:nvGrpSpPr>
+      <p:grpSpPr>
+        <a:xfrm>
+          <a:off x="0" y="0"/>
+          <a:ext cx="0" cy="0"/>
+          <a:chOff x="0" y="0"/>
+          <a:chExt cx="0" cy="0"/>
+        </a:xfrm>
+      </p:grpSpPr>
+      <p:sp>
+        <p:nvSpPr>
+          <p:cNvPr id="198" name="Shape 198"/>
+          <p:cNvSpPr/>
+          <p:nvPr>
+            <p:ph idx="2" type="sldImg"/>
+          </p:nvPr>
+        </p:nvSpPr>
+        <p:spPr>
+          <a:xfrm>
+            <a:off x="1143000" y="685800"/>
+            <a:ext cx="4572000" cy="3429000"/>
+          </a:xfrm>
+          <a:custGeom>
+            <a:pathLst>
+              <a:path extrusionOk="0" h="120000" w="120000">
+                <a:moveTo>
+                  <a:pt x="0" y="0"/>
+                </a:moveTo>
+                <a:lnTo>
+                  <a:pt x="120000" y="0"/>
+                </a:lnTo>
+                <a:lnTo>
+                  <a:pt x="120000" y="120000"/>
+                </a:lnTo>
+                <a:lnTo>
+                  <a:pt x="0" y="120000"/>
+                </a:lnTo>
+                <a:close/>
+              </a:path>
+            </a:pathLst>
+          </a:custGeom>
+        </p:spPr>
+      </p:sp>
+      <p:sp>
+        <p:nvSpPr>
+          <p:cNvPr id="199" name="Shape 199"/>
+          <p:cNvSpPr txBox="1"/>
+          <p:nvPr>
+            <p:ph idx="1" type="body"/>
+          </p:nvPr>
+        </p:nvSpPr>
+        <p:spPr>
+          <a:xfrm>
+            <a:off x="685800" y="4343400"/>
+            <a:ext cx="5486400" cy="4114800"/>
+          </a:xfrm>
+          <a:prstGeom prst="rect">
+            <a:avLst/>
+          </a:prstGeom>
+        </p:spPr>
+        <p:txBody>
+          <a:bodyPr anchorCtr="0" anchor="t" bIns="91425" lIns="91425" rIns="91425" tIns="91425">
+            <a:noAutofit/>
+          </a:bodyPr>
+          <a:lstStyle/>
+          <a:p>
+            <a:pPr lvl="0" rtl="0">
+              <a:spcBef>
+                <a:spcPts val="0"/>
+              </a:spcBef>
+              <a:buNone/>
+            </a:pPr>
+            <a:r>
+              <a:t/>
+            </a:r>
+            <a:endParaRPr/>
+          </a:p>
+        </p:txBody>
+      </p:sp>
+      <p:sp>
+        <p:nvSpPr>
+          <p:cNvPr id="200" name="Shape 200"/>
+          <p:cNvSpPr txBox="1"/>
+          <p:nvPr>
+            <p:ph idx="12" type="sldNum"/>
+          </p:nvPr>
+        </p:nvSpPr>
+        <p:spPr>
+          <a:xfrm>
+            <a:off x="3884612" y="8685213"/>
+            <a:ext cx="2971800" cy="457200"/>
+          </a:xfrm>
+          <a:prstGeom prst="rect">
+            <a:avLst/>
+          </a:prstGeom>
+        </p:spPr>
+        <p:txBody>
+          <a:bodyPr anchorCtr="0" anchor="b" bIns="45700" lIns="91425" rIns="91425" tIns="45700">
+            <a:noAutofit/>
+          </a:bodyPr>
+          <a:lstStyle/>
+          <a:p>
+            <a:pPr lvl="0" rtl="0">
+              <a:spcBef>
+                <a:spcPts val="0"/>
+              </a:spcBef>
+              <a:buClr>
+                <a:srgbClr val="000000"/>
+              </a:buClr>
+              <a:buSzPct val="25000"/>
+              <a:buFont typeface="Arial"/>
+              <a:buNone/>
+            </a:pPr>
+            <a:fld id="{00000000-1234-1234-1234-123412341234}" type="slidenum">
+              <a:rPr lang="en-US"/>
+              <a:t>‹#›</a:t>
+            </a:fld>
+          </a:p>
+        </p:txBody>
+      </p:sp>
+    </p:spTree>
+  </p:cSld>
+  <p:clrMapOvr>
+    <a:masterClrMapping/>
+  </p:clrMapOvr>
+</p:notes>
+</file>
+
 <file path=ppt/notesSlides/notesSlide2.xml><?xml version="1.0" encoding="utf-8"?>
 <p:notes xmlns:a="http://schemas.openxmlformats.org/drawingml/2006/main" xmlns:r="http://schemas.openxmlformats.org/officeDocument/2006/relationships" xmlns:mc="http://schemas.openxmlformats.org/markup-compatibility/2006" xmlns:mv="urn:schemas-microsoft-com:mac:vml" xmlns:p="http://schemas.openxmlformats.org/presentationml/2006/main" xmlns:c="http://schemas.openxmlformats.org/drawingml/2006/chart" xmlns:dgm="http://schemas.openxmlformats.org/drawingml/2006/diagram" xmlns:o="urn:schemas-microsoft-com:office:office" xmlns:v="urn:schemas-microsoft-com:vml" xmlns:pvml="urn:schemas-microsoft-com:office:powerpoint" xmlns:com="http://schemas.openxmlformats.org/drawingml/2006/compatibility" xmlns:p14="http://schemas.microsoft.com/office/powerpoint/2010/main" showMasterPhAnim="0" showMasterSp="0">
   <p:cSld>
@@ -1931,6 +2070,278 @@
       <p:sp>
         <p:nvSpPr>
           <p:cNvPr id="175" name="Shape 175"/>
+          <p:cNvSpPr txBox="1"/>
+          <p:nvPr>
+            <p:ph idx="12" type="sldNum"/>
+          </p:nvPr>
+        </p:nvSpPr>
+        <p:spPr>
+          <a:xfrm>
+            <a:off x="3884612" y="8685213"/>
+            <a:ext cx="2971800" cy="457200"/>
+          </a:xfrm>
+          <a:prstGeom prst="rect">
+            <a:avLst/>
+          </a:prstGeom>
+        </p:spPr>
+        <p:txBody>
+          <a:bodyPr anchorCtr="0" anchor="b" bIns="45700" lIns="91425" rIns="91425" tIns="45700">
+            <a:noAutofit/>
+          </a:bodyPr>
+          <a:lstStyle/>
+          <a:p>
+            <a:pPr lvl="0" rtl="0">
+              <a:spcBef>
+                <a:spcPts val="0"/>
+              </a:spcBef>
+              <a:buClr>
+                <a:srgbClr val="000000"/>
+              </a:buClr>
+              <a:buSzPct val="25000"/>
+              <a:buFont typeface="Arial"/>
+              <a:buNone/>
+            </a:pPr>
+            <a:fld id="{00000000-1234-1234-1234-123412341234}" type="slidenum">
+              <a:rPr lang="en-US"/>
+              <a:t>‹#›</a:t>
+            </a:fld>
+          </a:p>
+        </p:txBody>
+      </p:sp>
+    </p:spTree>
+  </p:cSld>
+  <p:clrMapOvr>
+    <a:masterClrMapping/>
+  </p:clrMapOvr>
+</p:notes>
+</file>
+
+<file path=ppt/notesSlides/notesSlide8.xml><?xml version="1.0" encoding="utf-8"?>
+<p:notes xmlns:a="http://schemas.openxmlformats.org/drawingml/2006/main" xmlns:r="http://schemas.openxmlformats.org/officeDocument/2006/relationships" xmlns:mc="http://schemas.openxmlformats.org/markup-compatibility/2006" xmlns:mv="urn:schemas-microsoft-com:mac:vml" xmlns:p="http://schemas.openxmlformats.org/presentationml/2006/main" xmlns:c="http://schemas.openxmlformats.org/drawingml/2006/chart" xmlns:dgm="http://schemas.openxmlformats.org/drawingml/2006/diagram" xmlns:o="urn:schemas-microsoft-com:office:office" xmlns:v="urn:schemas-microsoft-com:vml" xmlns:pvml="urn:schemas-microsoft-com:office:powerpoint" xmlns:com="http://schemas.openxmlformats.org/drawingml/2006/compatibility" xmlns:p14="http://schemas.microsoft.com/office/powerpoint/2010/main" showMasterPhAnim="0" showMasterSp="0">
+  <p:cSld>
+    <p:spTree>
+      <p:nvGrpSpPr>
+        <p:cNvPr id="183" name="Shape 183"/>
+        <p:cNvGrpSpPr/>
+        <p:nvPr/>
+      </p:nvGrpSpPr>
+      <p:grpSpPr>
+        <a:xfrm>
+          <a:off x="0" y="0"/>
+          <a:ext cx="0" cy="0"/>
+          <a:chOff x="0" y="0"/>
+          <a:chExt cx="0" cy="0"/>
+        </a:xfrm>
+      </p:grpSpPr>
+      <p:sp>
+        <p:nvSpPr>
+          <p:cNvPr id="184" name="Shape 184"/>
+          <p:cNvSpPr/>
+          <p:nvPr>
+            <p:ph idx="2" type="sldImg"/>
+          </p:nvPr>
+        </p:nvSpPr>
+        <p:spPr>
+          <a:xfrm>
+            <a:off x="1143000" y="685800"/>
+            <a:ext cx="4572000" cy="3429000"/>
+          </a:xfrm>
+          <a:custGeom>
+            <a:pathLst>
+              <a:path extrusionOk="0" h="120000" w="120000">
+                <a:moveTo>
+                  <a:pt x="0" y="0"/>
+                </a:moveTo>
+                <a:lnTo>
+                  <a:pt x="120000" y="0"/>
+                </a:lnTo>
+                <a:lnTo>
+                  <a:pt x="120000" y="120000"/>
+                </a:lnTo>
+                <a:lnTo>
+                  <a:pt x="0" y="120000"/>
+                </a:lnTo>
+                <a:close/>
+              </a:path>
+            </a:pathLst>
+          </a:custGeom>
+        </p:spPr>
+      </p:sp>
+      <p:sp>
+        <p:nvSpPr>
+          <p:cNvPr id="185" name="Shape 185"/>
+          <p:cNvSpPr txBox="1"/>
+          <p:nvPr>
+            <p:ph idx="1" type="body"/>
+          </p:nvPr>
+        </p:nvSpPr>
+        <p:spPr>
+          <a:xfrm>
+            <a:off x="685800" y="4343400"/>
+            <a:ext cx="5486400" cy="4114800"/>
+          </a:xfrm>
+          <a:prstGeom prst="rect">
+            <a:avLst/>
+          </a:prstGeom>
+        </p:spPr>
+        <p:txBody>
+          <a:bodyPr anchorCtr="0" anchor="t" bIns="91425" lIns="91425" rIns="91425" tIns="91425">
+            <a:noAutofit/>
+          </a:bodyPr>
+          <a:lstStyle/>
+          <a:p>
+            <a:pPr lvl="0" rtl="0">
+              <a:spcBef>
+                <a:spcPts val="0"/>
+              </a:spcBef>
+              <a:buNone/>
+            </a:pPr>
+            <a:r>
+              <a:t/>
+            </a:r>
+            <a:endParaRPr/>
+          </a:p>
+        </p:txBody>
+      </p:sp>
+      <p:sp>
+        <p:nvSpPr>
+          <p:cNvPr id="186" name="Shape 186"/>
+          <p:cNvSpPr txBox="1"/>
+          <p:nvPr>
+            <p:ph idx="12" type="sldNum"/>
+          </p:nvPr>
+        </p:nvSpPr>
+        <p:spPr>
+          <a:xfrm>
+            <a:off x="3884612" y="8685213"/>
+            <a:ext cx="2971800" cy="457200"/>
+          </a:xfrm>
+          <a:prstGeom prst="rect">
+            <a:avLst/>
+          </a:prstGeom>
+        </p:spPr>
+        <p:txBody>
+          <a:bodyPr anchorCtr="0" anchor="b" bIns="45700" lIns="91425" rIns="91425" tIns="45700">
+            <a:noAutofit/>
+          </a:bodyPr>
+          <a:lstStyle/>
+          <a:p>
+            <a:pPr lvl="0" rtl="0">
+              <a:spcBef>
+                <a:spcPts val="0"/>
+              </a:spcBef>
+              <a:buClr>
+                <a:srgbClr val="000000"/>
+              </a:buClr>
+              <a:buSzPct val="25000"/>
+              <a:buFont typeface="Arial"/>
+              <a:buNone/>
+            </a:pPr>
+            <a:fld id="{00000000-1234-1234-1234-123412341234}" type="slidenum">
+              <a:rPr lang="en-US"/>
+              <a:t>‹#›</a:t>
+            </a:fld>
+          </a:p>
+        </p:txBody>
+      </p:sp>
+    </p:spTree>
+  </p:cSld>
+  <p:clrMapOvr>
+    <a:masterClrMapping/>
+  </p:clrMapOvr>
+</p:notes>
+</file>
+
+<file path=ppt/notesSlides/notesSlide9.xml><?xml version="1.0" encoding="utf-8"?>
+<p:notes xmlns:a="http://schemas.openxmlformats.org/drawingml/2006/main" xmlns:r="http://schemas.openxmlformats.org/officeDocument/2006/relationships" xmlns:mc="http://schemas.openxmlformats.org/markup-compatibility/2006" xmlns:mv="urn:schemas-microsoft-com:mac:vml" xmlns:p="http://schemas.openxmlformats.org/presentationml/2006/main" xmlns:c="http://schemas.openxmlformats.org/drawingml/2006/chart" xmlns:dgm="http://schemas.openxmlformats.org/drawingml/2006/diagram" xmlns:o="urn:schemas-microsoft-com:office:office" xmlns:v="urn:schemas-microsoft-com:vml" xmlns:pvml="urn:schemas-microsoft-com:office:powerpoint" xmlns:com="http://schemas.openxmlformats.org/drawingml/2006/compatibility" xmlns:p14="http://schemas.microsoft.com/office/powerpoint/2010/main" showMasterPhAnim="0" showMasterSp="0">
+  <p:cSld>
+    <p:spTree>
+      <p:nvGrpSpPr>
+        <p:cNvPr id="190" name="Shape 190"/>
+        <p:cNvGrpSpPr/>
+        <p:nvPr/>
+      </p:nvGrpSpPr>
+      <p:grpSpPr>
+        <a:xfrm>
+          <a:off x="0" y="0"/>
+          <a:ext cx="0" cy="0"/>
+          <a:chOff x="0" y="0"/>
+          <a:chExt cx="0" cy="0"/>
+        </a:xfrm>
+      </p:grpSpPr>
+      <p:sp>
+        <p:nvSpPr>
+          <p:cNvPr id="191" name="Shape 191"/>
+          <p:cNvSpPr/>
+          <p:nvPr>
+            <p:ph idx="2" type="sldImg"/>
+          </p:nvPr>
+        </p:nvSpPr>
+        <p:spPr>
+          <a:xfrm>
+            <a:off x="1143000" y="685800"/>
+            <a:ext cx="4572000" cy="3429000"/>
+          </a:xfrm>
+          <a:custGeom>
+            <a:pathLst>
+              <a:path extrusionOk="0" h="120000" w="120000">
+                <a:moveTo>
+                  <a:pt x="0" y="0"/>
+                </a:moveTo>
+                <a:lnTo>
+                  <a:pt x="120000" y="0"/>
+                </a:lnTo>
+                <a:lnTo>
+                  <a:pt x="120000" y="120000"/>
+                </a:lnTo>
+                <a:lnTo>
+                  <a:pt x="0" y="120000"/>
+                </a:lnTo>
+                <a:close/>
+              </a:path>
+            </a:pathLst>
+          </a:custGeom>
+        </p:spPr>
+      </p:sp>
+      <p:sp>
+        <p:nvSpPr>
+          <p:cNvPr id="192" name="Shape 192"/>
+          <p:cNvSpPr txBox="1"/>
+          <p:nvPr>
+            <p:ph idx="1" type="body"/>
+          </p:nvPr>
+        </p:nvSpPr>
+        <p:spPr>
+          <a:xfrm>
+            <a:off x="685800" y="4343400"/>
+            <a:ext cx="5486400" cy="4114800"/>
+          </a:xfrm>
+          <a:prstGeom prst="rect">
+            <a:avLst/>
+          </a:prstGeom>
+        </p:spPr>
+        <p:txBody>
+          <a:bodyPr anchorCtr="0" anchor="t" bIns="91425" lIns="91425" rIns="91425" tIns="91425">
+            <a:noAutofit/>
+          </a:bodyPr>
+          <a:lstStyle/>
+          <a:p>
+            <a:pPr lvl="0" rtl="0">
+              <a:spcBef>
+                <a:spcPts val="0"/>
+              </a:spcBef>
+              <a:buNone/>
+            </a:pPr>
+            <a:r>
+              <a:t/>
+            </a:r>
+            <a:endParaRPr/>
+          </a:p>
+        </p:txBody>
+      </p:sp>
+      <p:sp>
+        <p:nvSpPr>
+          <p:cNvPr id="193" name="Shape 193"/>
           <p:cNvSpPr txBox="1"/>
           <p:nvPr>
             <p:ph idx="12" type="sldNum"/>
@@ -11801,6 +12212,187 @@
 </p:sld>
 </file>
 
+<file path=ppt/slides/slide10.xml><?xml version="1.0" encoding="utf-8"?>
+<p:sld xmlns:a="http://schemas.openxmlformats.org/drawingml/2006/main" xmlns:r="http://schemas.openxmlformats.org/officeDocument/2006/relationships" xmlns:mc="http://schemas.openxmlformats.org/markup-compatibility/2006" xmlns:mv="urn:schemas-microsoft-com:mac:vml" xmlns:p="http://schemas.openxmlformats.org/presentationml/2006/main" xmlns:c="http://schemas.openxmlformats.org/drawingml/2006/chart" xmlns:dgm="http://schemas.openxmlformats.org/drawingml/2006/diagram" xmlns:o="urn:schemas-microsoft-com:office:office" xmlns:v="urn:schemas-microsoft-com:vml" xmlns:pvml="urn:schemas-microsoft-com:office:powerpoint" xmlns:com="http://schemas.openxmlformats.org/drawingml/2006/compatibility" xmlns:p14="http://schemas.microsoft.com/office/powerpoint/2010/main">
+  <p:cSld>
+    <p:spTree>
+      <p:nvGrpSpPr>
+        <p:cNvPr id="201" name="Shape 201"/>
+        <p:cNvGrpSpPr/>
+        <p:nvPr/>
+      </p:nvGrpSpPr>
+      <p:grpSpPr>
+        <a:xfrm>
+          <a:off x="0" y="0"/>
+          <a:ext cx="0" cy="0"/>
+          <a:chOff x="0" y="0"/>
+          <a:chExt cx="0" cy="0"/>
+        </a:xfrm>
+      </p:grpSpPr>
+      <p:sp>
+        <p:nvSpPr>
+          <p:cNvPr id="202" name="Shape 202"/>
+          <p:cNvSpPr txBox="1"/>
+          <p:nvPr>
+            <p:ph type="title"/>
+          </p:nvPr>
+        </p:nvSpPr>
+        <p:spPr>
+          <a:xfrm>
+            <a:off x="990600" y="46037"/>
+            <a:ext cx="7696200" cy="1143000"/>
+          </a:xfrm>
+          <a:prstGeom prst="rect">
+            <a:avLst/>
+          </a:prstGeom>
+        </p:spPr>
+        <p:txBody>
+          <a:bodyPr anchorCtr="0" anchor="ctr" bIns="91425" lIns="91425" rIns="91425" tIns="91425">
+            <a:noAutofit/>
+          </a:bodyPr>
+          <a:lstStyle/>
+          <a:p>
+            <a:pPr lvl="0" rtl="0">
+              <a:spcBef>
+                <a:spcPts val="0"/>
+              </a:spcBef>
+              <a:buNone/>
+            </a:pPr>
+            <a:r>
+              <a:rPr lang="en-US"/>
+              <a:t>Next Steps</a:t>
+            </a:r>
+          </a:p>
+        </p:txBody>
+      </p:sp>
+      <p:sp>
+        <p:nvSpPr>
+          <p:cNvPr id="203" name="Shape 203"/>
+          <p:cNvSpPr txBox="1"/>
+          <p:nvPr>
+            <p:ph idx="1" type="body"/>
+          </p:nvPr>
+        </p:nvSpPr>
+        <p:spPr>
+          <a:xfrm>
+            <a:off x="457200" y="1600200"/>
+            <a:ext cx="8229600" cy="3811200"/>
+          </a:xfrm>
+          <a:prstGeom prst="rect">
+            <a:avLst/>
+          </a:prstGeom>
+        </p:spPr>
+        <p:txBody>
+          <a:bodyPr anchorCtr="0" anchor="t" bIns="91425" lIns="91425" rIns="91425" tIns="91425">
+            <a:noAutofit/>
+          </a:bodyPr>
+          <a:lstStyle/>
+          <a:p>
+            <a:pPr indent="0" lvl="0" marL="0" rtl="0">
+              <a:spcBef>
+                <a:spcPts val="0"/>
+              </a:spcBef>
+              <a:buNone/>
+            </a:pPr>
+            <a:r>
+              <a:rPr lang="en-US" sz="3000"/>
+              <a:t>Construct train/dev/test split</a:t>
+            </a:r>
+          </a:p>
+          <a:p>
+            <a:pPr indent="-381000" lvl="0" marL="914400" rtl="0">
+              <a:spcBef>
+                <a:spcPts val="0"/>
+              </a:spcBef>
+              <a:buSzPct val="100000"/>
+            </a:pPr>
+            <a:r>
+              <a:rPr lang="en-US" sz="2400"/>
+              <a:t>and additional cleaning of data set</a:t>
+            </a:r>
+          </a:p>
+          <a:p>
+            <a:pPr indent="0" lvl="0" marL="0" rtl="0">
+              <a:spcBef>
+                <a:spcPts val="0"/>
+              </a:spcBef>
+              <a:buNone/>
+            </a:pPr>
+            <a:r>
+              <a:rPr lang="en-US" sz="3000"/>
+              <a:t>Train classifier and complete system</a:t>
+            </a:r>
+          </a:p>
+          <a:p>
+            <a:pPr indent="-381000" lvl="0" marL="914400" rtl="0">
+              <a:spcBef>
+                <a:spcPts val="0"/>
+              </a:spcBef>
+              <a:buSzPct val="100000"/>
+            </a:pPr>
+            <a:r>
+              <a:rPr lang="en-US" sz="2400"/>
+              <a:t>subsystems need to be chained together</a:t>
+            </a:r>
+          </a:p>
+          <a:p>
+            <a:pPr indent="0" lvl="0" marL="0" rtl="0">
+              <a:spcBef>
+                <a:spcPts val="0"/>
+              </a:spcBef>
+              <a:buNone/>
+            </a:pPr>
+            <a:r>
+              <a:rPr lang="en-US" sz="3000"/>
+              <a:t>Improve features</a:t>
+            </a:r>
+          </a:p>
+          <a:p>
+            <a:pPr indent="-381000" lvl="0" marL="914400" rtl="0">
+              <a:spcBef>
+                <a:spcPts val="0"/>
+              </a:spcBef>
+              <a:buSzPct val="100000"/>
+            </a:pPr>
+            <a:r>
+              <a:rPr lang="en-US" sz="2400"/>
+              <a:t>PLSA, topic modeling (e.g., R ‘stm’ package)</a:t>
+            </a:r>
+          </a:p>
+          <a:p>
+            <a:pPr indent="-381000" lvl="0" marL="914400" rtl="0">
+              <a:spcBef>
+                <a:spcPts val="0"/>
+              </a:spcBef>
+              <a:buSzPct val="100000"/>
+            </a:pPr>
+            <a:r>
+              <a:rPr lang="en-US" sz="2400"/>
+              <a:t>Additional features from citation graph</a:t>
+            </a:r>
+          </a:p>
+          <a:p>
+            <a:pPr indent="-342900" lvl="1" marL="1371600" rtl="0">
+              <a:spcBef>
+                <a:spcPts val="0"/>
+              </a:spcBef>
+              <a:buSzPct val="100000"/>
+            </a:pPr>
+            <a:r>
+              <a:rPr lang="en-US" sz="1800"/>
+              <a:t>e.g., spectral embedding</a:t>
+            </a:r>
+          </a:p>
+        </p:txBody>
+      </p:sp>
+    </p:spTree>
+  </p:cSld>
+  <p:clrMapOvr>
+    <a:masterClrMapping/>
+  </p:clrMapOvr>
+</p:sld>
+</file>
+
 <file path=ppt/slides/slide2.xml><?xml version="1.0" encoding="utf-8"?>
 <p:sld xmlns:a="http://schemas.openxmlformats.org/drawingml/2006/main" xmlns:r="http://schemas.openxmlformats.org/officeDocument/2006/relationships" xmlns:mc="http://schemas.openxmlformats.org/markup-compatibility/2006" xmlns:mv="urn:schemas-microsoft-com:mac:vml" xmlns:p="http://schemas.openxmlformats.org/presentationml/2006/main" xmlns:c="http://schemas.openxmlformats.org/drawingml/2006/chart" xmlns:dgm="http://schemas.openxmlformats.org/drawingml/2006/diagram" xmlns:o="urn:schemas-microsoft-com:office:office" xmlns:v="urn:schemas-microsoft-com:vml" xmlns:pvml="urn:schemas-microsoft-com:office:powerpoint" xmlns:com="http://schemas.openxmlformats.org/drawingml/2006/compatibility" xmlns:p14="http://schemas.microsoft.com/office/powerpoint/2010/main">
   <p:cSld>
@@ -13716,7 +14308,7 @@
             </a:pPr>
             <a:r>
               <a:rPr lang="en-US" sz="3000"/>
-              <a:t>First pass: LSH on feature vectors</a:t>
+              <a:t>First pass: LSH on feature vectors (using LLHash)</a:t>
             </a:r>
           </a:p>
           <a:p>
@@ -13877,7 +14469,7 @@
             </a:pPr>
             <a:r>
               <a:rPr lang="en-US"/>
-              <a:t>Issue: Data Wrangling</a:t>
+              <a:t>Detail: Featurization</a:t>
             </a:r>
           </a:p>
         </p:txBody>
@@ -13893,7 +14485,7 @@
         <p:spPr>
           <a:xfrm>
             <a:off x="457200" y="1600200"/>
-            <a:ext cx="8229600" cy="3617700"/>
+            <a:ext cx="8229600" cy="3992100"/>
           </a:xfrm>
           <a:prstGeom prst="rect">
             <a:avLst/>
@@ -13913,7 +14505,7 @@
             </a:pPr>
             <a:r>
               <a:rPr lang="en-US" sz="3000"/>
-              <a:t>Messy data!</a:t>
+              <a:t>Patent abstracts mapped to feature vectors</a:t>
             </a:r>
           </a:p>
           <a:p>
@@ -13925,7 +14517,19 @@
             </a:pPr>
             <a:r>
               <a:rPr lang="en-US" sz="2400"/>
-              <a:t>Numbers can appear with/without punctuation</a:t>
+              <a:t>Stemming, removal of stop-words, etc.</a:t>
+            </a:r>
+          </a:p>
+          <a:p>
+            <a:pPr indent="-342900" lvl="1" marL="1828800" rtl="0">
+              <a:spcBef>
+                <a:spcPts val="0"/>
+              </a:spcBef>
+              <a:buSzPct val="100000"/>
+            </a:pPr>
+            <a:r>
+              <a:rPr lang="en-US" sz="1800"/>
+              <a:t>code from January Hackathon</a:t>
             </a:r>
           </a:p>
           <a:p>
@@ -13937,43 +14541,7 @@
             </a:pPr>
             <a:r>
               <a:rPr lang="en-US" sz="2400"/>
-              <a:t>Collisions between different national systems</a:t>
-            </a:r>
-          </a:p>
-          <a:p>
-            <a:pPr indent="-381000" lvl="0" marL="914400" rtl="0">
-              <a:spcBef>
-                <a:spcPts val="0"/>
-              </a:spcBef>
-              <a:buSzPct val="100000"/>
-            </a:pPr>
-            <a:r>
-              <a:rPr lang="en-US" sz="2400"/>
-              <a:t>Many missing fields</a:t>
-            </a:r>
-          </a:p>
-          <a:p>
-            <a:pPr indent="0" lvl="0" marL="0" rtl="0">
-              <a:spcBef>
-                <a:spcPts val="0"/>
-              </a:spcBef>
-              <a:buNone/>
-            </a:pPr>
-            <a:r>
-              <a:rPr lang="en-US" sz="3000"/>
-              <a:t>Citation graph is very sparse</a:t>
-            </a:r>
-          </a:p>
-          <a:p>
-            <a:pPr indent="-381000" lvl="0" marL="914400" rtl="0">
-              <a:spcBef>
-                <a:spcPts val="0"/>
-              </a:spcBef>
-              <a:buSzPct val="100000"/>
-            </a:pPr>
-            <a:r>
-              <a:rPr lang="en-US" sz="2400"/>
-              <a:t>~300 edges in all of H04 from 2002 to 2015</a:t>
+              <a:t>Dimensionality reduction using lib-Skylark SVD</a:t>
             </a:r>
           </a:p>
         </p:txBody>
@@ -14034,7 +14602,7 @@
             </a:pPr>
             <a:r>
               <a:rPr lang="en-US"/>
-              <a:t>(Partial) Solutions</a:t>
+              <a:t>Stochastic Block Modeling </a:t>
             </a:r>
           </a:p>
         </p:txBody>
@@ -14050,7 +14618,7 @@
         <p:spPr>
           <a:xfrm>
             <a:off x="457200" y="1600200"/>
-            <a:ext cx="8229600" cy="3811200"/>
+            <a:ext cx="8229600" cy="3992100"/>
           </a:xfrm>
           <a:prstGeom prst="rect">
             <a:avLst/>
@@ -14070,7 +14638,7 @@
             </a:pPr>
             <a:r>
               <a:rPr lang="en-US" sz="3000"/>
-              <a:t>Cleaning the data:</a:t>
+              <a:t>Embeds graph into Euclidean space</a:t>
             </a:r>
           </a:p>
           <a:p>
@@ -14082,87 +14650,31 @@
             </a:pPr>
             <a:r>
               <a:rPr lang="en-US" sz="2400"/>
-              <a:t>Normalize patent numbers (e.g., remove punctuation)</a:t>
+              <a:t>Communities manifest as clusters in Euclidean space</a:t>
             </a:r>
           </a:p>
           <a:p>
-            <a:pPr indent="-381000" lvl="0" marL="914400" rtl="0">
+            <a:pPr indent="-342900" lvl="1" marL="1371600" rtl="0">
               <a:spcBef>
                 <a:spcPts val="0"/>
               </a:spcBef>
               <a:buSzPct val="100000"/>
             </a:pPr>
             <a:r>
-              <a:rPr lang="en-US" sz="2400"/>
-              <a:t>Creates new set of collisions</a:t>
+              <a:rPr lang="en-US" sz="1800"/>
+              <a:t>spokes suggest strong community structure</a:t>
             </a:r>
           </a:p>
           <a:p>
-            <a:pPr indent="0" lvl="0" marL="0" rtl="0">
-              <a:spcBef>
-                <a:spcPts val="0"/>
-              </a:spcBef>
-              <a:buNone/>
-            </a:pPr>
-            <a:r>
-              <a:rPr lang="en-US" sz="3000"/>
-              <a:t>Desparsify citation graph:</a:t>
-            </a:r>
-          </a:p>
-          <a:p>
-            <a:pPr indent="-381000" lvl="0" marL="914400" rtl="0">
+            <a:pPr indent="-342900" lvl="1" marL="1371600" rtl="0">
               <a:spcBef>
                 <a:spcPts val="0"/>
               </a:spcBef>
               <a:buSzPct val="100000"/>
             </a:pPr>
             <a:r>
-              <a:rPr lang="en-US" sz="2400"/>
-              <a:t>Join patents/applications that cite the same document</a:t>
-            </a:r>
-          </a:p>
-          <a:p>
-            <a:pPr indent="-381000" lvl="0" marL="914400" rtl="0">
-              <a:spcBef>
-                <a:spcPts val="0"/>
-              </a:spcBef>
-              <a:buSzPct val="100000"/>
-            </a:pPr>
-            <a:r>
-              <a:rPr lang="en-US" sz="2400"/>
-              <a:t>~33M edges for 670K nodes in all of category H</a:t>
-            </a:r>
-          </a:p>
-          <a:p>
-            <a:pPr indent="-381000" lvl="0" marL="914400" rtl="0">
-              <a:spcBef>
-                <a:spcPts val="0"/>
-              </a:spcBef>
-              <a:buSzPct val="100000"/>
-            </a:pPr>
-            <a:r>
-              <a:rPr lang="en-US" sz="2400"/>
-              <a:t>1e-4 sparsity factor-- still </a:t>
-            </a:r>
-            <a:r>
-              <a:rPr b="1" lang="en-US" sz="2400"/>
-              <a:t>very</a:t>
-            </a:r>
-            <a:r>
-              <a:rPr lang="en-US" sz="2400"/>
-              <a:t> sparse!</a:t>
-            </a:r>
-          </a:p>
-          <a:p>
-            <a:pPr indent="0" lvl="0" marL="0" rtl="0">
-              <a:spcBef>
-                <a:spcPts val="0"/>
-              </a:spcBef>
-              <a:buNone/>
-            </a:pPr>
-            <a:r>
-              <a:rPr lang="en-US" sz="3000"/>
-              <a:t>Vast majority of effort went into data cleaning</a:t>
+              <a:rPr lang="en-US" sz="1800"/>
+              <a:t>vertices with low degree mapped near origin</a:t>
             </a:r>
           </a:p>
         </p:txBody>
@@ -14223,14 +14735,223 @@
             </a:pPr>
             <a:r>
               <a:rPr lang="en-US"/>
-              <a:t>Next Steps</a:t>
+              <a:t>Stochastic Block Modeling </a:t>
+            </a:r>
+          </a:p>
+        </p:txBody>
+      </p:sp>
+      <p:pic>
+        <p:nvPicPr>
+          <p:cNvPr descr="sbm_eig_0_and_1.png" id="178" name="Shape 178"/>
+          <p:cNvPicPr preferRelativeResize="0"/>
+          <p:nvPr/>
+        </p:nvPicPr>
+        <p:blipFill>
+          <a:blip r:embed="rId3">
+            <a:alphaModFix/>
+          </a:blip>
+          <a:stretch>
+            <a:fillRect/>
+          </a:stretch>
+        </p:blipFill>
+        <p:spPr>
+          <a:xfrm>
+            <a:off x="656487" y="1193350"/>
+            <a:ext cx="3667125" cy="2438400"/>
+          </a:xfrm>
+          <a:prstGeom prst="rect">
+            <a:avLst/>
+          </a:prstGeom>
+          <a:noFill/>
+          <a:ln>
+            <a:noFill/>
+          </a:ln>
+        </p:spPr>
+      </p:pic>
+      <p:pic>
+        <p:nvPicPr>
+          <p:cNvPr descr="sbm_eig_2_and_3.png" id="179" name="Shape 179"/>
+          <p:cNvPicPr preferRelativeResize="0"/>
+          <p:nvPr/>
+        </p:nvPicPr>
+        <p:blipFill>
+          <a:blip r:embed="rId4">
+            <a:alphaModFix/>
+          </a:blip>
+          <a:stretch>
+            <a:fillRect/>
+          </a:stretch>
+        </p:blipFill>
+        <p:spPr>
+          <a:xfrm>
+            <a:off x="4681262" y="1193350"/>
+            <a:ext cx="3667125" cy="2438400"/>
+          </a:xfrm>
+          <a:prstGeom prst="rect">
+            <a:avLst/>
+          </a:prstGeom>
+          <a:noFill/>
+          <a:ln>
+            <a:noFill/>
+          </a:ln>
+        </p:spPr>
+      </p:pic>
+      <p:pic>
+        <p:nvPicPr>
+          <p:cNvPr descr="sbm_eig_5_and_7.png" id="180" name="Shape 180"/>
+          <p:cNvPicPr preferRelativeResize="0"/>
+          <p:nvPr/>
+        </p:nvPicPr>
+        <p:blipFill>
+          <a:blip r:embed="rId5">
+            <a:alphaModFix/>
+          </a:blip>
+          <a:stretch>
+            <a:fillRect/>
+          </a:stretch>
+        </p:blipFill>
+        <p:spPr>
+          <a:xfrm>
+            <a:off x="656487" y="3631750"/>
+            <a:ext cx="3667125" cy="2438400"/>
+          </a:xfrm>
+          <a:prstGeom prst="rect">
+            <a:avLst/>
+          </a:prstGeom>
+          <a:noFill/>
+          <a:ln>
+            <a:noFill/>
+          </a:ln>
+        </p:spPr>
+      </p:pic>
+      <p:pic>
+        <p:nvPicPr>
+          <p:cNvPr descr="sbm_eig_8_and_6.png" id="181" name="Shape 181"/>
+          <p:cNvPicPr preferRelativeResize="0"/>
+          <p:nvPr/>
+        </p:nvPicPr>
+        <p:blipFill>
+          <a:blip r:embed="rId6">
+            <a:alphaModFix/>
+          </a:blip>
+          <a:stretch>
+            <a:fillRect/>
+          </a:stretch>
+        </p:blipFill>
+        <p:spPr>
+          <a:xfrm>
+            <a:off x="4681262" y="3631750"/>
+            <a:ext cx="3667125" cy="2438400"/>
+          </a:xfrm>
+          <a:prstGeom prst="rect">
+            <a:avLst/>
+          </a:prstGeom>
+          <a:noFill/>
+          <a:ln>
+            <a:noFill/>
+          </a:ln>
+        </p:spPr>
+      </p:pic>
+      <p:sp>
+        <p:nvSpPr>
+          <p:cNvPr id="182" name="Shape 182"/>
+          <p:cNvSpPr txBox="1"/>
+          <p:nvPr>
+            <p:ph type="title"/>
+          </p:nvPr>
+        </p:nvSpPr>
+        <p:spPr>
+          <a:xfrm>
+            <a:off x="3099600" y="5851450"/>
+            <a:ext cx="2944800" cy="1143000"/>
+          </a:xfrm>
+          <a:prstGeom prst="rect">
+            <a:avLst/>
+          </a:prstGeom>
+        </p:spPr>
+        <p:txBody>
+          <a:bodyPr anchorCtr="0" anchor="ctr" bIns="91425" lIns="91425" rIns="91425" tIns="91425">
+            <a:noAutofit/>
+          </a:bodyPr>
+          <a:lstStyle/>
+          <a:p>
+            <a:pPr lvl="0" rtl="0">
+              <a:spcBef>
+                <a:spcPts val="0"/>
+              </a:spcBef>
+              <a:buNone/>
+            </a:pPr>
+            <a:r>
+              <a:rPr lang="en-US" sz="1800"/>
+              <a:t>Projections of k=10 blocks </a:t>
+            </a:r>
+          </a:p>
+        </p:txBody>
+      </p:sp>
+    </p:spTree>
+  </p:cSld>
+  <p:clrMapOvr>
+    <a:masterClrMapping/>
+  </p:clrMapOvr>
+</p:sld>
+</file>
+
+<file path=ppt/slides/slide8.xml><?xml version="1.0" encoding="utf-8"?>
+<p:sld xmlns:a="http://schemas.openxmlformats.org/drawingml/2006/main" xmlns:r="http://schemas.openxmlformats.org/officeDocument/2006/relationships" xmlns:mc="http://schemas.openxmlformats.org/markup-compatibility/2006" xmlns:mv="urn:schemas-microsoft-com:mac:vml" xmlns:p="http://schemas.openxmlformats.org/presentationml/2006/main" xmlns:c="http://schemas.openxmlformats.org/drawingml/2006/chart" xmlns:dgm="http://schemas.openxmlformats.org/drawingml/2006/diagram" xmlns:o="urn:schemas-microsoft-com:office:office" xmlns:v="urn:schemas-microsoft-com:vml" xmlns:pvml="urn:schemas-microsoft-com:office:powerpoint" xmlns:com="http://schemas.openxmlformats.org/drawingml/2006/compatibility" xmlns:p14="http://schemas.microsoft.com/office/powerpoint/2010/main">
+  <p:cSld>
+    <p:spTree>
+      <p:nvGrpSpPr>
+        <p:cNvPr id="187" name="Shape 187"/>
+        <p:cNvGrpSpPr/>
+        <p:nvPr/>
+      </p:nvGrpSpPr>
+      <p:grpSpPr>
+        <a:xfrm>
+          <a:off x="0" y="0"/>
+          <a:ext cx="0" cy="0"/>
+          <a:chOff x="0" y="0"/>
+          <a:chExt cx="0" cy="0"/>
+        </a:xfrm>
+      </p:grpSpPr>
+      <p:sp>
+        <p:nvSpPr>
+          <p:cNvPr id="188" name="Shape 188"/>
+          <p:cNvSpPr txBox="1"/>
+          <p:nvPr>
+            <p:ph type="title"/>
+          </p:nvPr>
+        </p:nvSpPr>
+        <p:spPr>
+          <a:xfrm>
+            <a:off x="990600" y="46037"/>
+            <a:ext cx="7696200" cy="1143000"/>
+          </a:xfrm>
+          <a:prstGeom prst="rect">
+            <a:avLst/>
+          </a:prstGeom>
+        </p:spPr>
+        <p:txBody>
+          <a:bodyPr anchorCtr="0" anchor="ctr" bIns="91425" lIns="91425" rIns="91425" tIns="91425">
+            <a:noAutofit/>
+          </a:bodyPr>
+          <a:lstStyle/>
+          <a:p>
+            <a:pPr lvl="0" rtl="0">
+              <a:spcBef>
+                <a:spcPts val="0"/>
+              </a:spcBef>
+              <a:buNone/>
+            </a:pPr>
+            <a:r>
+              <a:rPr lang="en-US"/>
+              <a:t>Issue: Data Wrangling</a:t>
             </a:r>
           </a:p>
         </p:txBody>
       </p:sp>
       <p:sp>
         <p:nvSpPr>
-          <p:cNvPr id="178" name="Shape 178"/>
+          <p:cNvPr id="189" name="Shape 189"/>
           <p:cNvSpPr txBox="1"/>
           <p:nvPr>
             <p:ph idx="1" type="body"/>
@@ -14239,7 +14960,7 @@
         <p:spPr>
           <a:xfrm>
             <a:off x="457200" y="1600200"/>
-            <a:ext cx="8229600" cy="3811200"/>
+            <a:ext cx="8229600" cy="3617700"/>
           </a:xfrm>
           <a:prstGeom prst="rect">
             <a:avLst/>
@@ -14259,7 +14980,7 @@
             </a:pPr>
             <a:r>
               <a:rPr lang="en-US" sz="3000"/>
-              <a:t>Construct train/dev/test split</a:t>
+              <a:t>Messy data!</a:t>
             </a:r>
           </a:p>
           <a:p>
@@ -14271,7 +14992,31 @@
             </a:pPr>
             <a:r>
               <a:rPr lang="en-US" sz="2400"/>
-              <a:t>and additional cleaning of data set</a:t>
+              <a:t>Numbers can appear with/without punctuation</a:t>
+            </a:r>
+          </a:p>
+          <a:p>
+            <a:pPr indent="-381000" lvl="0" marL="914400" rtl="0">
+              <a:spcBef>
+                <a:spcPts val="0"/>
+              </a:spcBef>
+              <a:buSzPct val="100000"/>
+            </a:pPr>
+            <a:r>
+              <a:rPr lang="en-US" sz="2400"/>
+              <a:t>Collisions between different national systems</a:t>
+            </a:r>
+          </a:p>
+          <a:p>
+            <a:pPr indent="-381000" lvl="0" marL="914400" rtl="0">
+              <a:spcBef>
+                <a:spcPts val="0"/>
+              </a:spcBef>
+              <a:buSzPct val="100000"/>
+            </a:pPr>
+            <a:r>
+              <a:rPr lang="en-US" sz="2400"/>
+              <a:t>Many missing fields</a:t>
             </a:r>
           </a:p>
           <a:p>
@@ -14283,7 +15028,7 @@
             </a:pPr>
             <a:r>
               <a:rPr lang="en-US" sz="3000"/>
-              <a:t>Train classifier and complete system</a:t>
+              <a:t>Citation graph is very sparse</a:t>
             </a:r>
           </a:p>
           <a:p>
@@ -14295,7 +15040,196 @@
             </a:pPr>
             <a:r>
               <a:rPr lang="en-US" sz="2400"/>
-              <a:t>subsystems need to be chained together</a:t>
+              <a:t>~300 edges in all of H04 from 2002 to 2015</a:t>
+            </a:r>
+          </a:p>
+        </p:txBody>
+      </p:sp>
+    </p:spTree>
+  </p:cSld>
+  <p:clrMapOvr>
+    <a:masterClrMapping/>
+  </p:clrMapOvr>
+</p:sld>
+</file>
+
+<file path=ppt/slides/slide9.xml><?xml version="1.0" encoding="utf-8"?>
+<p:sld xmlns:a="http://schemas.openxmlformats.org/drawingml/2006/main" xmlns:r="http://schemas.openxmlformats.org/officeDocument/2006/relationships" xmlns:mc="http://schemas.openxmlformats.org/markup-compatibility/2006" xmlns:mv="urn:schemas-microsoft-com:mac:vml" xmlns:p="http://schemas.openxmlformats.org/presentationml/2006/main" xmlns:c="http://schemas.openxmlformats.org/drawingml/2006/chart" xmlns:dgm="http://schemas.openxmlformats.org/drawingml/2006/diagram" xmlns:o="urn:schemas-microsoft-com:office:office" xmlns:v="urn:schemas-microsoft-com:vml" xmlns:pvml="urn:schemas-microsoft-com:office:powerpoint" xmlns:com="http://schemas.openxmlformats.org/drawingml/2006/compatibility" xmlns:p14="http://schemas.microsoft.com/office/powerpoint/2010/main">
+  <p:cSld>
+    <p:spTree>
+      <p:nvGrpSpPr>
+        <p:cNvPr id="194" name="Shape 194"/>
+        <p:cNvGrpSpPr/>
+        <p:nvPr/>
+      </p:nvGrpSpPr>
+      <p:grpSpPr>
+        <a:xfrm>
+          <a:off x="0" y="0"/>
+          <a:ext cx="0" cy="0"/>
+          <a:chOff x="0" y="0"/>
+          <a:chExt cx="0" cy="0"/>
+        </a:xfrm>
+      </p:grpSpPr>
+      <p:sp>
+        <p:nvSpPr>
+          <p:cNvPr id="195" name="Shape 195"/>
+          <p:cNvSpPr txBox="1"/>
+          <p:nvPr>
+            <p:ph type="title"/>
+          </p:nvPr>
+        </p:nvSpPr>
+        <p:spPr>
+          <a:xfrm>
+            <a:off x="990600" y="46037"/>
+            <a:ext cx="7696200" cy="1143000"/>
+          </a:xfrm>
+          <a:prstGeom prst="rect">
+            <a:avLst/>
+          </a:prstGeom>
+        </p:spPr>
+        <p:txBody>
+          <a:bodyPr anchorCtr="0" anchor="ctr" bIns="91425" lIns="91425" rIns="91425" tIns="91425">
+            <a:noAutofit/>
+          </a:bodyPr>
+          <a:lstStyle/>
+          <a:p>
+            <a:pPr lvl="0" rtl="0">
+              <a:spcBef>
+                <a:spcPts val="0"/>
+              </a:spcBef>
+              <a:buNone/>
+            </a:pPr>
+            <a:r>
+              <a:rPr lang="en-US"/>
+              <a:t>(Partial) Solutions</a:t>
+            </a:r>
+          </a:p>
+        </p:txBody>
+      </p:sp>
+      <p:sp>
+        <p:nvSpPr>
+          <p:cNvPr id="196" name="Shape 196"/>
+          <p:cNvSpPr txBox="1"/>
+          <p:nvPr>
+            <p:ph idx="1" type="body"/>
+          </p:nvPr>
+        </p:nvSpPr>
+        <p:spPr>
+          <a:xfrm>
+            <a:off x="457200" y="1600200"/>
+            <a:ext cx="8229600" cy="3811200"/>
+          </a:xfrm>
+          <a:prstGeom prst="rect">
+            <a:avLst/>
+          </a:prstGeom>
+        </p:spPr>
+        <p:txBody>
+          <a:bodyPr anchorCtr="0" anchor="t" bIns="91425" lIns="91425" rIns="91425" tIns="91425">
+            <a:noAutofit/>
+          </a:bodyPr>
+          <a:lstStyle/>
+          <a:p>
+            <a:pPr indent="0" lvl="0" marL="0" rtl="0">
+              <a:spcBef>
+                <a:spcPts val="0"/>
+              </a:spcBef>
+              <a:buNone/>
+            </a:pPr>
+            <a:r>
+              <a:rPr lang="en-US" sz="3000"/>
+              <a:t>Cleaning the data:</a:t>
+            </a:r>
+          </a:p>
+          <a:p>
+            <a:pPr indent="-381000" lvl="0" marL="914400" rtl="0">
+              <a:spcBef>
+                <a:spcPts val="0"/>
+              </a:spcBef>
+              <a:buSzPct val="100000"/>
+            </a:pPr>
+            <a:r>
+              <a:rPr lang="en-US" sz="2400"/>
+              <a:t>Normalize patent numbers (e.g., remove punctuation)</a:t>
+            </a:r>
+          </a:p>
+          <a:p>
+            <a:pPr indent="-381000" lvl="0" marL="914400" rtl="0">
+              <a:spcBef>
+                <a:spcPts val="0"/>
+              </a:spcBef>
+              <a:buSzPct val="100000"/>
+            </a:pPr>
+            <a:r>
+              <a:rPr lang="en-US" sz="2400"/>
+              <a:t>Creates new set of collisions</a:t>
+            </a:r>
+          </a:p>
+          <a:p>
+            <a:pPr indent="0" lvl="0" marL="0" rtl="0">
+              <a:spcBef>
+                <a:spcPts val="0"/>
+              </a:spcBef>
+              <a:buNone/>
+            </a:pPr>
+            <a:r>
+              <a:rPr lang="en-US" sz="3000"/>
+              <a:t>Desparsify citation graph:</a:t>
+            </a:r>
+          </a:p>
+          <a:p>
+            <a:pPr indent="-381000" lvl="0" marL="914400" rtl="0">
+              <a:spcBef>
+                <a:spcPts val="0"/>
+              </a:spcBef>
+              <a:buSzPct val="100000"/>
+            </a:pPr>
+            <a:r>
+              <a:rPr lang="en-US" sz="2400"/>
+              <a:t>Join patents/applications that cite the same document</a:t>
+            </a:r>
+          </a:p>
+          <a:p>
+            <a:pPr indent="-381000" lvl="0" marL="914400" rtl="0">
+              <a:spcBef>
+                <a:spcPts val="0"/>
+              </a:spcBef>
+              <a:buSzPct val="100000"/>
+            </a:pPr>
+            <a:r>
+              <a:rPr lang="en-US" sz="2400"/>
+              <a:t>~33M edges for 670K nodes in all of category H</a:t>
+            </a:r>
+          </a:p>
+          <a:p>
+            <a:pPr indent="-381000" lvl="0" marL="914400" rtl="0">
+              <a:spcBef>
+                <a:spcPts val="0"/>
+              </a:spcBef>
+              <a:buSzPct val="100000"/>
+            </a:pPr>
+            <a:r>
+              <a:rPr lang="en-US" sz="2400"/>
+              <a:t>1e-4 sparsity factor-- still </a:t>
+            </a:r>
+            <a:r>
+              <a:rPr b="1" lang="en-US" sz="2400"/>
+              <a:t>very</a:t>
+            </a:r>
+            <a:r>
+              <a:rPr lang="en-US" sz="2400"/>
+              <a:t> sparse!</a:t>
+            </a:r>
+          </a:p>
+          <a:p>
+            <a:pPr indent="0" lvl="0" marL="0" rtl="0">
+              <a:spcBef>
+                <a:spcPts val="0"/>
+              </a:spcBef>
+              <a:buNone/>
+            </a:pPr>
+            <a:r>
+              <a:rPr lang="en-US" sz="3000"/>
+              <a:t>Vast majority of effort went into data cleaning</a:t>
             </a:r>
           </a:p>
         </p:txBody>

</xml_diff>

<commit_message>
SMall formatting changes-- rearranged some bullets.
</commit_message>
<xml_diff>
--- a/XDATA_Sep2016_klevin_slides.pptx
+++ b/XDATA_Sep2016_klevin_slides.pptx
@@ -7286,18 +7286,6 @@
               <a:buNone/>
             </a:pPr>
             <a:r>
-              <a:t/>
-            </a:r>
-            <a:endParaRPr sz="3000"/>
-          </a:p>
-          <a:p>
-            <a:pPr indent="0" lvl="0" marL="0" rtl="0">
-              <a:spcBef>
-                <a:spcPts val="0"/>
-              </a:spcBef>
-              <a:buNone/>
-            </a:pPr>
-            <a:r>
               <a:rPr lang="en-US" sz="3600"/>
               <a:t>Current search capabilities are limited</a:t>
             </a:r>
@@ -9315,19 +9303,7 @@
             </a:pPr>
             <a:r>
               <a:rPr lang="en-US" sz="2400"/>
-              <a:t>Metric learning to rank (MLR)</a:t>
-            </a:r>
-          </a:p>
-          <a:p>
-            <a:pPr indent="-381000" lvl="0" marL="914400" rtl="0">
-              <a:spcBef>
-                <a:spcPts val="0"/>
-              </a:spcBef>
-              <a:buSzPct val="100000"/>
-            </a:pPr>
-            <a:r>
-              <a:rPr lang="en-US" sz="2400"/>
-              <a:t>Link prediction</a:t>
+              <a:t>Metric learning to rank (MLR); link prediction</a:t>
             </a:r>
           </a:p>
           <a:p>
@@ -9589,23 +9565,11 @@
             </a:r>
           </a:p>
           <a:p>
-            <a:pPr indent="0" lvl="0" marL="0" rtl="0">
-              <a:spcBef>
-                <a:spcPts val="0"/>
-              </a:spcBef>
-              <a:buNone/>
-            </a:pPr>
-            <a:r>
-              <a:t/>
-            </a:r>
-            <a:endParaRPr sz="3000"/>
-          </a:p>
-          <a:p>
-            <a:pPr indent="0" lvl="0" marL="0" rtl="0">
-              <a:spcBef>
-                <a:spcPts val="0"/>
-              </a:spcBef>
-              <a:buNone/>
+            <a:pPr indent="-419100" lvl="0" marL="457200" rtl="0">
+              <a:spcBef>
+                <a:spcPts val="0"/>
+              </a:spcBef>
+              <a:buSzPct val="100000"/>
             </a:pPr>
             <a:r>
               <a:rPr lang="en-US" sz="3000"/>
@@ -9637,11 +9601,11 @@
             </a:r>
           </a:p>
           <a:p>
-            <a:pPr indent="0" lvl="0" marL="0" rtl="0">
-              <a:spcBef>
-                <a:spcPts val="0"/>
-              </a:spcBef>
-              <a:buNone/>
+            <a:pPr indent="-419100" lvl="0" marL="457200" rtl="0">
+              <a:spcBef>
+                <a:spcPts val="0"/>
+              </a:spcBef>
+              <a:buSzPct val="100000"/>
             </a:pPr>
             <a:r>
               <a:rPr lang="en-US" sz="3000"/>
@@ -9657,7 +9621,7 @@
             </a:pPr>
             <a:r>
               <a:rPr lang="en-US" sz="2400"/>
-              <a:t>83% accuracy</a:t>
+              <a:t>83% link prediction accuracy</a:t>
             </a:r>
           </a:p>
         </p:txBody>
@@ -10013,6 +9977,285 @@
 </file>
 
 <file path=ppt/theme/theme1.xml><?xml version="1.0" encoding="utf-8"?>
+<a:theme xmlns:a="http://schemas.openxmlformats.org/drawingml/2006/main" xmlns:r="http://schemas.openxmlformats.org/officeDocument/2006/relationships" name="simple-light-2">
+  <a:themeElements>
+    <a:clrScheme name="Simple Light">
+      <a:dk1>
+        <a:srgbClr val="000000"/>
+      </a:dk1>
+      <a:lt1>
+        <a:srgbClr val="FFFFFF"/>
+      </a:lt1>
+      <a:dk2>
+        <a:srgbClr val="595959"/>
+      </a:dk2>
+      <a:lt2>
+        <a:srgbClr val="EEEEEE"/>
+      </a:lt2>
+      <a:accent1>
+        <a:srgbClr val="FFAB40"/>
+      </a:accent1>
+      <a:accent2>
+        <a:srgbClr val="212121"/>
+      </a:accent2>
+      <a:accent3>
+        <a:srgbClr val="78909C"/>
+      </a:accent3>
+      <a:accent4>
+        <a:srgbClr val="FFAB40"/>
+      </a:accent4>
+      <a:accent5>
+        <a:srgbClr val="0097A7"/>
+      </a:accent5>
+      <a:accent6>
+        <a:srgbClr val="EEFF41"/>
+      </a:accent6>
+      <a:hlink>
+        <a:srgbClr val="0097A7"/>
+      </a:hlink>
+      <a:folHlink>
+        <a:srgbClr val="0097A7"/>
+      </a:folHlink>
+    </a:clrScheme>
+    <a:fontScheme name="Office">
+      <a:majorFont>
+        <a:latin typeface="Arial"/>
+        <a:ea typeface=""/>
+        <a:cs typeface=""/>
+        <a:font script="Jpan" typeface="ＭＳ Ｐゴシック"/>
+        <a:font script="Hang" typeface="맑은 고딕"/>
+        <a:font script="Hans" typeface="宋体"/>
+        <a:font script="Hant" typeface="新細明體"/>
+        <a:font script="Arab" typeface="Times New Roman"/>
+        <a:font script="Hebr" typeface="Times New Roman"/>
+        <a:font script="Thai" typeface="Angsana New"/>
+        <a:font script="Ethi" typeface="Nyala"/>
+        <a:font script="Beng" typeface="Vrinda"/>
+        <a:font script="Gujr" typeface="Shruti"/>
+        <a:font script="Khmr" typeface="MoolBoran"/>
+        <a:font script="Knda" typeface="Tunga"/>
+        <a:font script="Guru" typeface="Raavi"/>
+        <a:font script="Cans" typeface="Euphemia"/>
+        <a:font script="Cher" typeface="Plantagenet Cherokee"/>
+        <a:font script="Yiii" typeface="Microsoft Yi Baiti"/>
+        <a:font script="Tibt" typeface="Microsoft Himalaya"/>
+        <a:font script="Thaa" typeface="MV Boli"/>
+        <a:font script="Deva" typeface="Mangal"/>
+        <a:font script="Telu" typeface="Gautami"/>
+        <a:font script="Taml" typeface="Latha"/>
+        <a:font script="Syrc" typeface="Estrangelo Edessa"/>
+        <a:font script="Orya" typeface="Kalinga"/>
+        <a:font script="Mlym" typeface="Kartika"/>
+        <a:font script="Laoo" typeface="DokChampa"/>
+        <a:font script="Sinh" typeface="Iskoola Pota"/>
+        <a:font script="Mong" typeface="Mongolian Baiti"/>
+        <a:font script="Viet" typeface="Times New Roman"/>
+        <a:font script="Uigh" typeface="Microsoft Uighur"/>
+        <a:font script="Geor" typeface="Sylfaen"/>
+      </a:majorFont>
+      <a:minorFont>
+        <a:latin typeface="Arial"/>
+        <a:ea typeface=""/>
+        <a:cs typeface=""/>
+        <a:font script="Jpan" typeface="ＭＳ Ｐゴシック"/>
+        <a:font script="Hang" typeface="맑은 고딕"/>
+        <a:font script="Hans" typeface="宋体"/>
+        <a:font script="Hant" typeface="新細明體"/>
+        <a:font script="Arab" typeface="Arial"/>
+        <a:font script="Hebr" typeface="Arial"/>
+        <a:font script="Thai" typeface="Cordia New"/>
+        <a:font script="Ethi" typeface="Nyala"/>
+        <a:font script="Beng" typeface="Vrinda"/>
+        <a:font script="Gujr" typeface="Shruti"/>
+        <a:font script="Khmr" typeface="DaunPenh"/>
+        <a:font script="Knda" typeface="Tunga"/>
+        <a:font script="Guru" typeface="Raavi"/>
+        <a:font script="Cans" typeface="Euphemia"/>
+        <a:font script="Cher" typeface="Plantagenet Cherokee"/>
+        <a:font script="Yiii" typeface="Microsoft Yi Baiti"/>
+        <a:font script="Tibt" typeface="Microsoft Himalaya"/>
+        <a:font script="Thaa" typeface="MV Boli"/>
+        <a:font script="Deva" typeface="Mangal"/>
+        <a:font script="Telu" typeface="Gautami"/>
+        <a:font script="Taml" typeface="Latha"/>
+        <a:font script="Syrc" typeface="Estrangelo Edessa"/>
+        <a:font script="Orya" typeface="Kalinga"/>
+        <a:font script="Mlym" typeface="Kartika"/>
+        <a:font script="Laoo" typeface="DokChampa"/>
+        <a:font script="Sinh" typeface="Iskoola Pota"/>
+        <a:font script="Mong" typeface="Mongolian Baiti"/>
+        <a:font script="Viet" typeface="Arial"/>
+        <a:font script="Uigh" typeface="Microsoft Uighur"/>
+        <a:font script="Geor" typeface="Sylfaen"/>
+      </a:minorFont>
+    </a:fontScheme>
+    <a:fmtScheme name="Office">
+      <a:fillStyleLst>
+        <a:solidFill>
+          <a:schemeClr val="phClr"/>
+        </a:solidFill>
+        <a:gradFill rotWithShape="1">
+          <a:gsLst>
+            <a:gs pos="0">
+              <a:schemeClr val="phClr">
+                <a:tint val="50000"/>
+                <a:satMod val="300000"/>
+              </a:schemeClr>
+            </a:gs>
+            <a:gs pos="35000">
+              <a:schemeClr val="phClr">
+                <a:tint val="37000"/>
+                <a:satMod val="300000"/>
+              </a:schemeClr>
+            </a:gs>
+            <a:gs pos="100000">
+              <a:schemeClr val="phClr">
+                <a:tint val="15000"/>
+                <a:satMod val="350000"/>
+              </a:schemeClr>
+            </a:gs>
+          </a:gsLst>
+          <a:lin ang="16200000" scaled="1"/>
+        </a:gradFill>
+        <a:gradFill rotWithShape="1">
+          <a:gsLst>
+            <a:gs pos="0">
+              <a:schemeClr val="phClr">
+                <a:tint val="100000"/>
+                <a:shade val="100000"/>
+                <a:satMod val="130000"/>
+              </a:schemeClr>
+            </a:gs>
+            <a:gs pos="100000">
+              <a:schemeClr val="phClr">
+                <a:tint val="50000"/>
+                <a:shade val="100000"/>
+                <a:satMod val="350000"/>
+              </a:schemeClr>
+            </a:gs>
+          </a:gsLst>
+          <a:lin ang="16200000" scaled="0"/>
+        </a:gradFill>
+      </a:fillStyleLst>
+      <a:lnStyleLst>
+        <a:ln w="9525" cap="flat" cmpd="sng" algn="ctr">
+          <a:solidFill>
+            <a:schemeClr val="phClr">
+              <a:shade val="95000"/>
+              <a:satMod val="105000"/>
+            </a:schemeClr>
+          </a:solidFill>
+          <a:prstDash val="solid"/>
+        </a:ln>
+        <a:ln w="25400" cap="flat" cmpd="sng" algn="ctr">
+          <a:solidFill>
+            <a:schemeClr val="phClr"/>
+          </a:solidFill>
+          <a:prstDash val="solid"/>
+        </a:ln>
+        <a:ln w="38100" cap="flat" cmpd="sng" algn="ctr">
+          <a:solidFill>
+            <a:schemeClr val="phClr"/>
+          </a:solidFill>
+          <a:prstDash val="solid"/>
+        </a:ln>
+      </a:lnStyleLst>
+      <a:effectStyleLst>
+        <a:effectStyle>
+          <a:effectLst>
+            <a:outerShdw blurRad="40000" dist="20000" dir="5400000" rotWithShape="0">
+              <a:srgbClr val="000000">
+                <a:alpha val="38000"/>
+              </a:srgbClr>
+            </a:outerShdw>
+          </a:effectLst>
+        </a:effectStyle>
+        <a:effectStyle>
+          <a:effectLst>
+            <a:outerShdw blurRad="40000" dist="23000" dir="5400000" rotWithShape="0">
+              <a:srgbClr val="000000">
+                <a:alpha val="35000"/>
+              </a:srgbClr>
+            </a:outerShdw>
+          </a:effectLst>
+        </a:effectStyle>
+        <a:effectStyle>
+          <a:effectLst>
+            <a:outerShdw blurRad="40000" dist="23000" dir="5400000" rotWithShape="0">
+              <a:srgbClr val="000000">
+                <a:alpha val="35000"/>
+              </a:srgbClr>
+            </a:outerShdw>
+          </a:effectLst>
+          <a:scene3d>
+            <a:camera prst="orthographicFront">
+              <a:rot lat="0" lon="0" rev="0"/>
+            </a:camera>
+            <a:lightRig rig="threePt" dir="t">
+              <a:rot lat="0" lon="0" rev="1200000"/>
+            </a:lightRig>
+          </a:scene3d>
+          <a:sp3d>
+            <a:bevelT w="63500" h="25400"/>
+          </a:sp3d>
+        </a:effectStyle>
+      </a:effectStyleLst>
+      <a:bgFillStyleLst>
+        <a:solidFill>
+          <a:schemeClr val="phClr"/>
+        </a:solidFill>
+        <a:gradFill rotWithShape="1">
+          <a:gsLst>
+            <a:gs pos="0">
+              <a:schemeClr val="phClr">
+                <a:tint val="40000"/>
+                <a:satMod val="350000"/>
+              </a:schemeClr>
+            </a:gs>
+            <a:gs pos="40000">
+              <a:schemeClr val="phClr">
+                <a:tint val="45000"/>
+                <a:shade val="99000"/>
+                <a:satMod val="350000"/>
+              </a:schemeClr>
+            </a:gs>
+            <a:gs pos="100000">
+              <a:schemeClr val="phClr">
+                <a:shade val="20000"/>
+                <a:satMod val="255000"/>
+              </a:schemeClr>
+            </a:gs>
+          </a:gsLst>
+          <a:path path="circle">
+            <a:fillToRect l="50000" t="-80000" r="50000" b="180000"/>
+          </a:path>
+        </a:gradFill>
+        <a:gradFill rotWithShape="1">
+          <a:gsLst>
+            <a:gs pos="0">
+              <a:schemeClr val="phClr">
+                <a:tint val="80000"/>
+                <a:satMod val="300000"/>
+              </a:schemeClr>
+            </a:gs>
+            <a:gs pos="100000">
+              <a:schemeClr val="phClr">
+                <a:shade val="30000"/>
+                <a:satMod val="200000"/>
+              </a:schemeClr>
+            </a:gs>
+          </a:gsLst>
+          <a:path path="circle">
+            <a:fillToRect l="50000" t="50000" r="50000" b="50000"/>
+          </a:path>
+        </a:gradFill>
+      </a:bgFillStyleLst>
+    </a:fmtScheme>
+  </a:themeElements>
+</a:theme>
+</file>
+
+<file path=ppt/theme/theme2.xml><?xml version="1.0" encoding="utf-8"?>
 <a:theme xmlns:a="http://schemas.openxmlformats.org/drawingml/2006/main" xmlns:r="http://schemas.openxmlformats.org/officeDocument/2006/relationships" name="Custom Theme">
   <a:themeElements>
     <a:clrScheme name="Default">
@@ -10289,283 +10532,4 @@
     </a:fmtScheme>
   </a:themeElements>
 </a:theme>
-</file>
-
-<file path=ppt/theme/theme2.xml><?xml version="1.0" encoding="utf-8"?>
-<a:theme xmlns:a="http://schemas.openxmlformats.org/drawingml/2006/main" xmlns:r="http://schemas.openxmlformats.org/officeDocument/2006/relationships" name="simple-light-2">
-  <a:themeElements>
-    <a:clrScheme name="Simple Light">
-      <a:dk1>
-        <a:srgbClr val="000000"/>
-      </a:dk1>
-      <a:lt1>
-        <a:srgbClr val="FFFFFF"/>
-      </a:lt1>
-      <a:dk2>
-        <a:srgbClr val="595959"/>
-      </a:dk2>
-      <a:lt2>
-        <a:srgbClr val="EEEEEE"/>
-      </a:lt2>
-      <a:accent1>
-        <a:srgbClr val="FFAB40"/>
-      </a:accent1>
-      <a:accent2>
-        <a:srgbClr val="212121"/>
-      </a:accent2>
-      <a:accent3>
-        <a:srgbClr val="78909C"/>
-      </a:accent3>
-      <a:accent4>
-        <a:srgbClr val="FFAB40"/>
-      </a:accent4>
-      <a:accent5>
-        <a:srgbClr val="0097A7"/>
-      </a:accent5>
-      <a:accent6>
-        <a:srgbClr val="EEFF41"/>
-      </a:accent6>
-      <a:hlink>
-        <a:srgbClr val="0097A7"/>
-      </a:hlink>
-      <a:folHlink>
-        <a:srgbClr val="0097A7"/>
-      </a:folHlink>
-    </a:clrScheme>
-    <a:fontScheme name="Office">
-      <a:majorFont>
-        <a:latin typeface="Arial"/>
-        <a:ea typeface=""/>
-        <a:cs typeface=""/>
-        <a:font script="Jpan" typeface="ＭＳ Ｐゴシック"/>
-        <a:font script="Hang" typeface="맑은 고딕"/>
-        <a:font script="Hans" typeface="宋体"/>
-        <a:font script="Hant" typeface="新細明體"/>
-        <a:font script="Arab" typeface="Times New Roman"/>
-        <a:font script="Hebr" typeface="Times New Roman"/>
-        <a:font script="Thai" typeface="Angsana New"/>
-        <a:font script="Ethi" typeface="Nyala"/>
-        <a:font script="Beng" typeface="Vrinda"/>
-        <a:font script="Gujr" typeface="Shruti"/>
-        <a:font script="Khmr" typeface="MoolBoran"/>
-        <a:font script="Knda" typeface="Tunga"/>
-        <a:font script="Guru" typeface="Raavi"/>
-        <a:font script="Cans" typeface="Euphemia"/>
-        <a:font script="Cher" typeface="Plantagenet Cherokee"/>
-        <a:font script="Yiii" typeface="Microsoft Yi Baiti"/>
-        <a:font script="Tibt" typeface="Microsoft Himalaya"/>
-        <a:font script="Thaa" typeface="MV Boli"/>
-        <a:font script="Deva" typeface="Mangal"/>
-        <a:font script="Telu" typeface="Gautami"/>
-        <a:font script="Taml" typeface="Latha"/>
-        <a:font script="Syrc" typeface="Estrangelo Edessa"/>
-        <a:font script="Orya" typeface="Kalinga"/>
-        <a:font script="Mlym" typeface="Kartika"/>
-        <a:font script="Laoo" typeface="DokChampa"/>
-        <a:font script="Sinh" typeface="Iskoola Pota"/>
-        <a:font script="Mong" typeface="Mongolian Baiti"/>
-        <a:font script="Viet" typeface="Times New Roman"/>
-        <a:font script="Uigh" typeface="Microsoft Uighur"/>
-        <a:font script="Geor" typeface="Sylfaen"/>
-      </a:majorFont>
-      <a:minorFont>
-        <a:latin typeface="Arial"/>
-        <a:ea typeface=""/>
-        <a:cs typeface=""/>
-        <a:font script="Jpan" typeface="ＭＳ Ｐゴシック"/>
-        <a:font script="Hang" typeface="맑은 고딕"/>
-        <a:font script="Hans" typeface="宋体"/>
-        <a:font script="Hant" typeface="新細明體"/>
-        <a:font script="Arab" typeface="Arial"/>
-        <a:font script="Hebr" typeface="Arial"/>
-        <a:font script="Thai" typeface="Cordia New"/>
-        <a:font script="Ethi" typeface="Nyala"/>
-        <a:font script="Beng" typeface="Vrinda"/>
-        <a:font script="Gujr" typeface="Shruti"/>
-        <a:font script="Khmr" typeface="DaunPenh"/>
-        <a:font script="Knda" typeface="Tunga"/>
-        <a:font script="Guru" typeface="Raavi"/>
-        <a:font script="Cans" typeface="Euphemia"/>
-        <a:font script="Cher" typeface="Plantagenet Cherokee"/>
-        <a:font script="Yiii" typeface="Microsoft Yi Baiti"/>
-        <a:font script="Tibt" typeface="Microsoft Himalaya"/>
-        <a:font script="Thaa" typeface="MV Boli"/>
-        <a:font script="Deva" typeface="Mangal"/>
-        <a:font script="Telu" typeface="Gautami"/>
-        <a:font script="Taml" typeface="Latha"/>
-        <a:font script="Syrc" typeface="Estrangelo Edessa"/>
-        <a:font script="Orya" typeface="Kalinga"/>
-        <a:font script="Mlym" typeface="Kartika"/>
-        <a:font script="Laoo" typeface="DokChampa"/>
-        <a:font script="Sinh" typeface="Iskoola Pota"/>
-        <a:font script="Mong" typeface="Mongolian Baiti"/>
-        <a:font script="Viet" typeface="Arial"/>
-        <a:font script="Uigh" typeface="Microsoft Uighur"/>
-        <a:font script="Geor" typeface="Sylfaen"/>
-      </a:minorFont>
-    </a:fontScheme>
-    <a:fmtScheme name="Office">
-      <a:fillStyleLst>
-        <a:solidFill>
-          <a:schemeClr val="phClr"/>
-        </a:solidFill>
-        <a:gradFill rotWithShape="1">
-          <a:gsLst>
-            <a:gs pos="0">
-              <a:schemeClr val="phClr">
-                <a:tint val="50000"/>
-                <a:satMod val="300000"/>
-              </a:schemeClr>
-            </a:gs>
-            <a:gs pos="35000">
-              <a:schemeClr val="phClr">
-                <a:tint val="37000"/>
-                <a:satMod val="300000"/>
-              </a:schemeClr>
-            </a:gs>
-            <a:gs pos="100000">
-              <a:schemeClr val="phClr">
-                <a:tint val="15000"/>
-                <a:satMod val="350000"/>
-              </a:schemeClr>
-            </a:gs>
-          </a:gsLst>
-          <a:lin ang="16200000" scaled="1"/>
-        </a:gradFill>
-        <a:gradFill rotWithShape="1">
-          <a:gsLst>
-            <a:gs pos="0">
-              <a:schemeClr val="phClr">
-                <a:tint val="100000"/>
-                <a:shade val="100000"/>
-                <a:satMod val="130000"/>
-              </a:schemeClr>
-            </a:gs>
-            <a:gs pos="100000">
-              <a:schemeClr val="phClr">
-                <a:tint val="50000"/>
-                <a:shade val="100000"/>
-                <a:satMod val="350000"/>
-              </a:schemeClr>
-            </a:gs>
-          </a:gsLst>
-          <a:lin ang="16200000" scaled="0"/>
-        </a:gradFill>
-      </a:fillStyleLst>
-      <a:lnStyleLst>
-        <a:ln w="9525" cap="flat" cmpd="sng" algn="ctr">
-          <a:solidFill>
-            <a:schemeClr val="phClr">
-              <a:shade val="95000"/>
-              <a:satMod val="105000"/>
-            </a:schemeClr>
-          </a:solidFill>
-          <a:prstDash val="solid"/>
-        </a:ln>
-        <a:ln w="25400" cap="flat" cmpd="sng" algn="ctr">
-          <a:solidFill>
-            <a:schemeClr val="phClr"/>
-          </a:solidFill>
-          <a:prstDash val="solid"/>
-        </a:ln>
-        <a:ln w="38100" cap="flat" cmpd="sng" algn="ctr">
-          <a:solidFill>
-            <a:schemeClr val="phClr"/>
-          </a:solidFill>
-          <a:prstDash val="solid"/>
-        </a:ln>
-      </a:lnStyleLst>
-      <a:effectStyleLst>
-        <a:effectStyle>
-          <a:effectLst>
-            <a:outerShdw blurRad="40000" dist="20000" dir="5400000" rotWithShape="0">
-              <a:srgbClr val="000000">
-                <a:alpha val="38000"/>
-              </a:srgbClr>
-            </a:outerShdw>
-          </a:effectLst>
-        </a:effectStyle>
-        <a:effectStyle>
-          <a:effectLst>
-            <a:outerShdw blurRad="40000" dist="23000" dir="5400000" rotWithShape="0">
-              <a:srgbClr val="000000">
-                <a:alpha val="35000"/>
-              </a:srgbClr>
-            </a:outerShdw>
-          </a:effectLst>
-        </a:effectStyle>
-        <a:effectStyle>
-          <a:effectLst>
-            <a:outerShdw blurRad="40000" dist="23000" dir="5400000" rotWithShape="0">
-              <a:srgbClr val="000000">
-                <a:alpha val="35000"/>
-              </a:srgbClr>
-            </a:outerShdw>
-          </a:effectLst>
-          <a:scene3d>
-            <a:camera prst="orthographicFront">
-              <a:rot lat="0" lon="0" rev="0"/>
-            </a:camera>
-            <a:lightRig rig="threePt" dir="t">
-              <a:rot lat="0" lon="0" rev="1200000"/>
-            </a:lightRig>
-          </a:scene3d>
-          <a:sp3d>
-            <a:bevelT w="63500" h="25400"/>
-          </a:sp3d>
-        </a:effectStyle>
-      </a:effectStyleLst>
-      <a:bgFillStyleLst>
-        <a:solidFill>
-          <a:schemeClr val="phClr"/>
-        </a:solidFill>
-        <a:gradFill rotWithShape="1">
-          <a:gsLst>
-            <a:gs pos="0">
-              <a:schemeClr val="phClr">
-                <a:tint val="40000"/>
-                <a:satMod val="350000"/>
-              </a:schemeClr>
-            </a:gs>
-            <a:gs pos="40000">
-              <a:schemeClr val="phClr">
-                <a:tint val="45000"/>
-                <a:shade val="99000"/>
-                <a:satMod val="350000"/>
-              </a:schemeClr>
-            </a:gs>
-            <a:gs pos="100000">
-              <a:schemeClr val="phClr">
-                <a:shade val="20000"/>
-                <a:satMod val="255000"/>
-              </a:schemeClr>
-            </a:gs>
-          </a:gsLst>
-          <a:path path="circle">
-            <a:fillToRect l="50000" t="-80000" r="50000" b="180000"/>
-          </a:path>
-        </a:gradFill>
-        <a:gradFill rotWithShape="1">
-          <a:gsLst>
-            <a:gs pos="0">
-              <a:schemeClr val="phClr">
-                <a:tint val="80000"/>
-                <a:satMod val="300000"/>
-              </a:schemeClr>
-            </a:gs>
-            <a:gs pos="100000">
-              <a:schemeClr val="phClr">
-                <a:shade val="30000"/>
-                <a:satMod val="200000"/>
-              </a:schemeClr>
-            </a:gs>
-          </a:gsLst>
-          <a:path path="circle">
-            <a:fillToRect l="50000" t="50000" r="50000" b="50000"/>
-          </a:path>
-        </a:gradFill>
-      </a:bgFillStyleLst>
-    </a:fmtScheme>
-  </a:themeElements>
-</a:theme>
 </file>
</xml_diff>

<commit_message>
Added adjacency matrix plots.
</commit_message>
<xml_diff>
--- a/XDATA_Sep2016_klevin_slides.pptx
+++ b/XDATA_Sep2016_klevin_slides.pptx
@@ -20,6 +20,8 @@
     <p:sldId id="265" r:id="rId14"/>
     <p:sldId id="266" r:id="rId15"/>
     <p:sldId id="267" r:id="rId16"/>
+    <p:sldId id="268" r:id="rId17"/>
+    <p:sldId id="269" r:id="rId18"/>
   </p:sldIdLst>
   <p:sldSz cy="6858000" cx="9144000"/>
   <p:notesSz cx="6858000" cy="9144000"/>
@@ -1171,7 +1173,7 @@
   <p:cSld>
     <p:spTree>
       <p:nvGrpSpPr>
-        <p:cNvPr id="175" name="Shape 175"/>
+        <p:cNvPr id="172" name="Shape 172"/>
         <p:cNvGrpSpPr/>
         <p:nvPr/>
       </p:nvGrpSpPr>
@@ -1185,7 +1187,7 @@
       </p:grpSpPr>
       <p:sp>
         <p:nvSpPr>
-          <p:cNvPr id="176" name="Shape 176"/>
+          <p:cNvPr id="173" name="Shape 173"/>
           <p:cNvSpPr/>
           <p:nvPr>
             <p:ph idx="2" type="sldImg"/>
@@ -1219,7 +1221,7 @@
       </p:sp>
       <p:sp>
         <p:nvSpPr>
-          <p:cNvPr id="177" name="Shape 177"/>
+          <p:cNvPr id="174" name="Shape 174"/>
           <p:cNvSpPr txBox="1"/>
           <p:nvPr>
             <p:ph idx="1" type="body"/>
@@ -1255,7 +1257,7 @@
       </p:sp>
       <p:sp>
         <p:nvSpPr>
-          <p:cNvPr id="178" name="Shape 178"/>
+          <p:cNvPr id="175" name="Shape 175"/>
           <p:cNvSpPr txBox="1"/>
           <p:nvPr>
             <p:ph idx="12" type="sldNum"/>
@@ -1307,7 +1309,7 @@
   <p:cSld>
     <p:spTree>
       <p:nvGrpSpPr>
-        <p:cNvPr id="182" name="Shape 182"/>
+        <p:cNvPr id="180" name="Shape 180"/>
         <p:cNvGrpSpPr/>
         <p:nvPr/>
       </p:nvGrpSpPr>
@@ -1321,7 +1323,7 @@
       </p:grpSpPr>
       <p:sp>
         <p:nvSpPr>
-          <p:cNvPr id="183" name="Shape 183"/>
+          <p:cNvPr id="181" name="Shape 181"/>
           <p:cNvSpPr/>
           <p:nvPr>
             <p:ph idx="2" type="sldImg"/>
@@ -1355,7 +1357,7 @@
       </p:sp>
       <p:sp>
         <p:nvSpPr>
-          <p:cNvPr id="184" name="Shape 184"/>
+          <p:cNvPr id="182" name="Shape 182"/>
           <p:cNvSpPr txBox="1"/>
           <p:nvPr>
             <p:ph idx="1" type="body"/>
@@ -1391,7 +1393,7 @@
       </p:sp>
       <p:sp>
         <p:nvSpPr>
-          <p:cNvPr id="185" name="Shape 185"/>
+          <p:cNvPr id="183" name="Shape 183"/>
           <p:cNvSpPr txBox="1"/>
           <p:nvPr>
             <p:ph idx="12" type="sldNum"/>
@@ -1443,7 +1445,7 @@
   <p:cSld>
     <p:spTree>
       <p:nvGrpSpPr>
-        <p:cNvPr id="189" name="Shape 189"/>
+        <p:cNvPr id="191" name="Shape 191"/>
         <p:cNvGrpSpPr/>
         <p:nvPr/>
       </p:nvGrpSpPr>
@@ -1457,7 +1459,7 @@
       </p:grpSpPr>
       <p:sp>
         <p:nvSpPr>
-          <p:cNvPr id="190" name="Shape 190"/>
+          <p:cNvPr id="192" name="Shape 192"/>
           <p:cNvSpPr/>
           <p:nvPr>
             <p:ph idx="2" type="sldImg"/>
@@ -1491,7 +1493,7 @@
       </p:sp>
       <p:sp>
         <p:nvSpPr>
-          <p:cNvPr id="191" name="Shape 191"/>
+          <p:cNvPr id="193" name="Shape 193"/>
           <p:cNvSpPr txBox="1"/>
           <p:nvPr>
             <p:ph idx="1" type="body"/>
@@ -1527,7 +1529,279 @@
       </p:sp>
       <p:sp>
         <p:nvSpPr>
-          <p:cNvPr id="192" name="Shape 192"/>
+          <p:cNvPr id="194" name="Shape 194"/>
+          <p:cNvSpPr txBox="1"/>
+          <p:nvPr>
+            <p:ph idx="12" type="sldNum"/>
+          </p:nvPr>
+        </p:nvSpPr>
+        <p:spPr>
+          <a:xfrm>
+            <a:off x="3884612" y="8685213"/>
+            <a:ext cx="2971800" cy="457200"/>
+          </a:xfrm>
+          <a:prstGeom prst="rect">
+            <a:avLst/>
+          </a:prstGeom>
+        </p:spPr>
+        <p:txBody>
+          <a:bodyPr anchorCtr="0" anchor="b" bIns="45700" lIns="91425" rIns="91425" tIns="45700">
+            <a:noAutofit/>
+          </a:bodyPr>
+          <a:lstStyle/>
+          <a:p>
+            <a:pPr lvl="0" rtl="0">
+              <a:spcBef>
+                <a:spcPts val="0"/>
+              </a:spcBef>
+              <a:buClr>
+                <a:srgbClr val="000000"/>
+              </a:buClr>
+              <a:buSzPct val="25000"/>
+              <a:buFont typeface="Arial"/>
+              <a:buNone/>
+            </a:pPr>
+            <a:fld id="{00000000-1234-1234-1234-123412341234}" type="slidenum">
+              <a:rPr lang="en-US"/>
+              <a:t>‹#›</a:t>
+            </a:fld>
+          </a:p>
+        </p:txBody>
+      </p:sp>
+    </p:spTree>
+  </p:cSld>
+  <p:clrMapOvr>
+    <a:masterClrMapping/>
+  </p:clrMapOvr>
+</p:notes>
+</file>
+
+<file path=ppt/notesSlides/notesSlide13.xml><?xml version="1.0" encoding="utf-8"?>
+<p:notes xmlns:a="http://schemas.openxmlformats.org/drawingml/2006/main" xmlns:r="http://schemas.openxmlformats.org/officeDocument/2006/relationships" xmlns:mc="http://schemas.openxmlformats.org/markup-compatibility/2006" xmlns:mv="urn:schemas-microsoft-com:mac:vml" xmlns:p="http://schemas.openxmlformats.org/presentationml/2006/main" xmlns:c="http://schemas.openxmlformats.org/drawingml/2006/chart" xmlns:dgm="http://schemas.openxmlformats.org/drawingml/2006/diagram" xmlns:o="urn:schemas-microsoft-com:office:office" xmlns:v="urn:schemas-microsoft-com:vml" xmlns:pvml="urn:schemas-microsoft-com:office:powerpoint" xmlns:com="http://schemas.openxmlformats.org/drawingml/2006/compatibility" xmlns:p14="http://schemas.microsoft.com/office/powerpoint/2010/main" showMasterPhAnim="0" showMasterSp="0">
+  <p:cSld>
+    <p:spTree>
+      <p:nvGrpSpPr>
+        <p:cNvPr id="198" name="Shape 198"/>
+        <p:cNvGrpSpPr/>
+        <p:nvPr/>
+      </p:nvGrpSpPr>
+      <p:grpSpPr>
+        <a:xfrm>
+          <a:off x="0" y="0"/>
+          <a:ext cx="0" cy="0"/>
+          <a:chOff x="0" y="0"/>
+          <a:chExt cx="0" cy="0"/>
+        </a:xfrm>
+      </p:grpSpPr>
+      <p:sp>
+        <p:nvSpPr>
+          <p:cNvPr id="199" name="Shape 199"/>
+          <p:cNvSpPr/>
+          <p:nvPr>
+            <p:ph idx="2" type="sldImg"/>
+          </p:nvPr>
+        </p:nvSpPr>
+        <p:spPr>
+          <a:xfrm>
+            <a:off x="1143000" y="685800"/>
+            <a:ext cx="4572000" cy="3429000"/>
+          </a:xfrm>
+          <a:custGeom>
+            <a:pathLst>
+              <a:path extrusionOk="0" h="120000" w="120000">
+                <a:moveTo>
+                  <a:pt x="0" y="0"/>
+                </a:moveTo>
+                <a:lnTo>
+                  <a:pt x="120000" y="0"/>
+                </a:lnTo>
+                <a:lnTo>
+                  <a:pt x="120000" y="120000"/>
+                </a:lnTo>
+                <a:lnTo>
+                  <a:pt x="0" y="120000"/>
+                </a:lnTo>
+                <a:close/>
+              </a:path>
+            </a:pathLst>
+          </a:custGeom>
+        </p:spPr>
+      </p:sp>
+      <p:sp>
+        <p:nvSpPr>
+          <p:cNvPr id="200" name="Shape 200"/>
+          <p:cNvSpPr txBox="1"/>
+          <p:nvPr>
+            <p:ph idx="1" type="body"/>
+          </p:nvPr>
+        </p:nvSpPr>
+        <p:spPr>
+          <a:xfrm>
+            <a:off x="685800" y="4343400"/>
+            <a:ext cx="5486400" cy="4114800"/>
+          </a:xfrm>
+          <a:prstGeom prst="rect">
+            <a:avLst/>
+          </a:prstGeom>
+        </p:spPr>
+        <p:txBody>
+          <a:bodyPr anchorCtr="0" anchor="t" bIns="91425" lIns="91425" rIns="91425" tIns="91425">
+            <a:noAutofit/>
+          </a:bodyPr>
+          <a:lstStyle/>
+          <a:p>
+            <a:pPr lvl="0" rtl="0">
+              <a:spcBef>
+                <a:spcPts val="0"/>
+              </a:spcBef>
+              <a:buNone/>
+            </a:pPr>
+            <a:r>
+              <a:t/>
+            </a:r>
+            <a:endParaRPr/>
+          </a:p>
+        </p:txBody>
+      </p:sp>
+      <p:sp>
+        <p:nvSpPr>
+          <p:cNvPr id="201" name="Shape 201"/>
+          <p:cNvSpPr txBox="1"/>
+          <p:nvPr>
+            <p:ph idx="12" type="sldNum"/>
+          </p:nvPr>
+        </p:nvSpPr>
+        <p:spPr>
+          <a:xfrm>
+            <a:off x="3884612" y="8685213"/>
+            <a:ext cx="2971800" cy="457200"/>
+          </a:xfrm>
+          <a:prstGeom prst="rect">
+            <a:avLst/>
+          </a:prstGeom>
+        </p:spPr>
+        <p:txBody>
+          <a:bodyPr anchorCtr="0" anchor="b" bIns="45700" lIns="91425" rIns="91425" tIns="45700">
+            <a:noAutofit/>
+          </a:bodyPr>
+          <a:lstStyle/>
+          <a:p>
+            <a:pPr lvl="0" rtl="0">
+              <a:spcBef>
+                <a:spcPts val="0"/>
+              </a:spcBef>
+              <a:buClr>
+                <a:srgbClr val="000000"/>
+              </a:buClr>
+              <a:buSzPct val="25000"/>
+              <a:buFont typeface="Arial"/>
+              <a:buNone/>
+            </a:pPr>
+            <a:fld id="{00000000-1234-1234-1234-123412341234}" type="slidenum">
+              <a:rPr lang="en-US"/>
+              <a:t>‹#›</a:t>
+            </a:fld>
+          </a:p>
+        </p:txBody>
+      </p:sp>
+    </p:spTree>
+  </p:cSld>
+  <p:clrMapOvr>
+    <a:masterClrMapping/>
+  </p:clrMapOvr>
+</p:notes>
+</file>
+
+<file path=ppt/notesSlides/notesSlide14.xml><?xml version="1.0" encoding="utf-8"?>
+<p:notes xmlns:a="http://schemas.openxmlformats.org/drawingml/2006/main" xmlns:r="http://schemas.openxmlformats.org/officeDocument/2006/relationships" xmlns:mc="http://schemas.openxmlformats.org/markup-compatibility/2006" xmlns:mv="urn:schemas-microsoft-com:mac:vml" xmlns:p="http://schemas.openxmlformats.org/presentationml/2006/main" xmlns:c="http://schemas.openxmlformats.org/drawingml/2006/chart" xmlns:dgm="http://schemas.openxmlformats.org/drawingml/2006/diagram" xmlns:o="urn:schemas-microsoft-com:office:office" xmlns:v="urn:schemas-microsoft-com:vml" xmlns:pvml="urn:schemas-microsoft-com:office:powerpoint" xmlns:com="http://schemas.openxmlformats.org/drawingml/2006/compatibility" xmlns:p14="http://schemas.microsoft.com/office/powerpoint/2010/main" showMasterPhAnim="0" showMasterSp="0">
+  <p:cSld>
+    <p:spTree>
+      <p:nvGrpSpPr>
+        <p:cNvPr id="205" name="Shape 205"/>
+        <p:cNvGrpSpPr/>
+        <p:nvPr/>
+      </p:nvGrpSpPr>
+      <p:grpSpPr>
+        <a:xfrm>
+          <a:off x="0" y="0"/>
+          <a:ext cx="0" cy="0"/>
+          <a:chOff x="0" y="0"/>
+          <a:chExt cx="0" cy="0"/>
+        </a:xfrm>
+      </p:grpSpPr>
+      <p:sp>
+        <p:nvSpPr>
+          <p:cNvPr id="206" name="Shape 206"/>
+          <p:cNvSpPr/>
+          <p:nvPr>
+            <p:ph idx="2" type="sldImg"/>
+          </p:nvPr>
+        </p:nvSpPr>
+        <p:spPr>
+          <a:xfrm>
+            <a:off x="1143000" y="685800"/>
+            <a:ext cx="4572000" cy="3429000"/>
+          </a:xfrm>
+          <a:custGeom>
+            <a:pathLst>
+              <a:path extrusionOk="0" h="120000" w="120000">
+                <a:moveTo>
+                  <a:pt x="0" y="0"/>
+                </a:moveTo>
+                <a:lnTo>
+                  <a:pt x="120000" y="0"/>
+                </a:lnTo>
+                <a:lnTo>
+                  <a:pt x="120000" y="120000"/>
+                </a:lnTo>
+                <a:lnTo>
+                  <a:pt x="0" y="120000"/>
+                </a:lnTo>
+                <a:close/>
+              </a:path>
+            </a:pathLst>
+          </a:custGeom>
+        </p:spPr>
+      </p:sp>
+      <p:sp>
+        <p:nvSpPr>
+          <p:cNvPr id="207" name="Shape 207"/>
+          <p:cNvSpPr txBox="1"/>
+          <p:nvPr>
+            <p:ph idx="1" type="body"/>
+          </p:nvPr>
+        </p:nvSpPr>
+        <p:spPr>
+          <a:xfrm>
+            <a:off x="685800" y="4343400"/>
+            <a:ext cx="5486400" cy="4114800"/>
+          </a:xfrm>
+          <a:prstGeom prst="rect">
+            <a:avLst/>
+          </a:prstGeom>
+        </p:spPr>
+        <p:txBody>
+          <a:bodyPr anchorCtr="0" anchor="t" bIns="91425" lIns="91425" rIns="91425" tIns="91425">
+            <a:noAutofit/>
+          </a:bodyPr>
+          <a:lstStyle/>
+          <a:p>
+            <a:pPr lvl="0" rtl="0">
+              <a:spcBef>
+                <a:spcPts val="0"/>
+              </a:spcBef>
+              <a:buNone/>
+            </a:pPr>
+            <a:r>
+              <a:t/>
+            </a:r>
+            <a:endParaRPr/>
+          </a:p>
+        </p:txBody>
+      </p:sp>
+      <p:sp>
+        <p:nvSpPr>
+          <p:cNvPr id="208" name="Shape 208"/>
           <p:cNvSpPr txBox="1"/>
           <p:nvPr>
             <p:ph idx="12" type="sldNum"/>
@@ -6645,7 +6919,7 @@
   <p:cSld>
     <p:spTree>
       <p:nvGrpSpPr>
-        <p:cNvPr id="179" name="Shape 179"/>
+        <p:cNvPr id="176" name="Shape 176"/>
         <p:cNvGrpSpPr/>
         <p:nvPr/>
       </p:nvGrpSpPr>
@@ -6659,7 +6933,7 @@
       </p:grpSpPr>
       <p:sp>
         <p:nvSpPr>
-          <p:cNvPr id="180" name="Shape 180"/>
+          <p:cNvPr id="177" name="Shape 177"/>
           <p:cNvSpPr txBox="1"/>
           <p:nvPr>
             <p:ph type="title"/>
@@ -6688,14 +6962,14 @@
             </a:pPr>
             <a:r>
               <a:rPr lang="en-US"/>
-              <a:t>Issue: Data Wrangling</a:t>
+              <a:t>Stochastic Block Modeling </a:t>
             </a:r>
           </a:p>
         </p:txBody>
       </p:sp>
       <p:sp>
         <p:nvSpPr>
-          <p:cNvPr id="181" name="Shape 181"/>
+          <p:cNvPr id="178" name="Shape 178"/>
           <p:cNvSpPr txBox="1"/>
           <p:nvPr>
             <p:ph idx="1" type="body"/>
@@ -6703,8 +6977,8 @@
         </p:nvSpPr>
         <p:spPr>
           <a:xfrm>
-            <a:off x="457200" y="1600200"/>
-            <a:ext cx="8229600" cy="3617700"/>
+            <a:off x="457200" y="5257800"/>
+            <a:ext cx="8229600" cy="724500"/>
           </a:xfrm>
           <a:prstGeom prst="rect">
             <a:avLst/>
@@ -6716,7 +6990,7 @@
           </a:bodyPr>
           <a:lstStyle/>
           <a:p>
-            <a:pPr indent="0" lvl="0" marL="0" rtl="0">
+            <a:pPr indent="0" lvl="0" marL="0" rtl="0" algn="ctr">
               <a:spcBef>
                 <a:spcPts val="0"/>
               </a:spcBef>
@@ -6724,71 +6998,57 @@
             </a:pPr>
             <a:r>
               <a:rPr lang="en-US" sz="3000"/>
-              <a:t>Messy data!</a:t>
+              <a:t>After fitting SBM (k=600  blocks)</a:t>
             </a:r>
           </a:p>
           <a:p>
-            <a:pPr indent="-381000" lvl="0" marL="914400" rtl="0">
-              <a:spcBef>
-                <a:spcPts val="0"/>
-              </a:spcBef>
-              <a:buSzPct val="100000"/>
+            <a:pPr indent="0" lvl="0" marL="0" marR="0" rtl="0" algn="ctr">
+              <a:lnSpc>
+                <a:spcPct val="115000"/>
+              </a:lnSpc>
+              <a:spcBef>
+                <a:spcPts val="640"/>
+              </a:spcBef>
+              <a:spcAft>
+                <a:spcPts val="0"/>
+              </a:spcAft>
+              <a:buNone/>
             </a:pPr>
             <a:r>
-              <a:rPr lang="en-US" sz="2400"/>
-              <a:t>Numbers can appear with/without punctuation</a:t>
+              <a:t/>
             </a:r>
-          </a:p>
-          <a:p>
-            <a:pPr indent="-381000" lvl="0" marL="914400" rtl="0">
-              <a:spcBef>
-                <a:spcPts val="0"/>
-              </a:spcBef>
-              <a:buSzPct val="100000"/>
-            </a:pPr>
-            <a:r>
-              <a:rPr lang="en-US" sz="2400"/>
-              <a:t>Collisions between different national systems</a:t>
-            </a:r>
-          </a:p>
-          <a:p>
-            <a:pPr indent="-381000" lvl="0" marL="914400" rtl="0">
-              <a:spcBef>
-                <a:spcPts val="0"/>
-              </a:spcBef>
-              <a:buSzPct val="100000"/>
-            </a:pPr>
-            <a:r>
-              <a:rPr lang="en-US" sz="2400"/>
-              <a:t>Many missing fields</a:t>
-            </a:r>
-          </a:p>
-          <a:p>
-            <a:pPr indent="0" lvl="0" marL="0" rtl="0">
-              <a:spcBef>
-                <a:spcPts val="0"/>
-              </a:spcBef>
-              <a:buNone/>
-            </a:pPr>
-            <a:r>
-              <a:rPr lang="en-US" sz="3000"/>
-              <a:t>Citation graph is very sparse</a:t>
-            </a:r>
-          </a:p>
-          <a:p>
-            <a:pPr indent="-381000" lvl="0" marL="914400" rtl="0">
-              <a:spcBef>
-                <a:spcPts val="0"/>
-              </a:spcBef>
-              <a:buSzPct val="100000"/>
-            </a:pPr>
-            <a:r>
-              <a:rPr lang="en-US" sz="2400"/>
-              <a:t>~300 edges in all of H04 from 2002 to 2015</a:t>
-            </a:r>
+            <a:endParaRPr sz="1800"/>
           </a:p>
         </p:txBody>
       </p:sp>
+      <p:pic>
+        <p:nvPicPr>
+          <p:cNvPr descr="permuted_adjacency_k_600.png" id="179" name="Shape 179"/>
+          <p:cNvPicPr preferRelativeResize="0"/>
+          <p:nvPr/>
+        </p:nvPicPr>
+        <p:blipFill>
+          <a:blip r:embed="rId3">
+            <a:alphaModFix/>
+          </a:blip>
+          <a:stretch>
+            <a:fillRect/>
+          </a:stretch>
+        </p:blipFill>
+        <p:spPr>
+          <a:xfrm>
+            <a:off x="2305375" y="1019000"/>
+            <a:ext cx="4422175" cy="4422175"/>
+          </a:xfrm>
+          <a:prstGeom prst="rect">
+            <a:avLst/>
+          </a:prstGeom>
+          <a:noFill/>
+          <a:ln>
+            <a:noFill/>
+          </a:ln>
+        </p:spPr>
+      </p:pic>
     </p:spTree>
   </p:cSld>
   <p:clrMapOvr>
@@ -6802,7 +7062,7 @@
   <p:cSld>
     <p:spTree>
       <p:nvGrpSpPr>
-        <p:cNvPr id="186" name="Shape 186"/>
+        <p:cNvPr id="184" name="Shape 184"/>
         <p:cNvGrpSpPr/>
         <p:nvPr/>
       </p:nvGrpSpPr>
@@ -6816,7 +7076,7 @@
       </p:grpSpPr>
       <p:sp>
         <p:nvSpPr>
-          <p:cNvPr id="187" name="Shape 187"/>
+          <p:cNvPr id="185" name="Shape 185"/>
           <p:cNvSpPr txBox="1"/>
           <p:nvPr>
             <p:ph type="title"/>
@@ -6845,135 +7105,155 @@
             </a:pPr>
             <a:r>
               <a:rPr lang="en-US"/>
-              <a:t>(Partial) Solutions</a:t>
+              <a:t>Stochastic Block Modeling </a:t>
             </a:r>
           </a:p>
         </p:txBody>
       </p:sp>
-      <p:sp>
-        <p:nvSpPr>
-          <p:cNvPr id="188" name="Shape 188"/>
+      <p:pic>
+        <p:nvPicPr>
+          <p:cNvPr descr="sbm_eig_0_and_1.png" id="186" name="Shape 186"/>
+          <p:cNvPicPr preferRelativeResize="0"/>
+          <p:nvPr/>
+        </p:nvPicPr>
+        <p:blipFill>
+          <a:blip r:embed="rId3">
+            <a:alphaModFix/>
+          </a:blip>
+          <a:stretch>
+            <a:fillRect/>
+          </a:stretch>
+        </p:blipFill>
+        <p:spPr>
+          <a:xfrm>
+            <a:off x="732687" y="1269550"/>
+            <a:ext cx="3667125" cy="2438400"/>
+          </a:xfrm>
+          <a:prstGeom prst="rect">
+            <a:avLst/>
+          </a:prstGeom>
+          <a:noFill/>
+          <a:ln>
+            <a:noFill/>
+          </a:ln>
+        </p:spPr>
+      </p:pic>
+      <p:pic>
+        <p:nvPicPr>
+          <p:cNvPr descr="sbm_eig_2_and_3.png" id="187" name="Shape 187"/>
+          <p:cNvPicPr preferRelativeResize="0"/>
+          <p:nvPr/>
+        </p:nvPicPr>
+        <p:blipFill>
+          <a:blip r:embed="rId4">
+            <a:alphaModFix/>
+          </a:blip>
+          <a:stretch>
+            <a:fillRect/>
+          </a:stretch>
+        </p:blipFill>
+        <p:spPr>
+          <a:xfrm>
+            <a:off x="4605062" y="1269550"/>
+            <a:ext cx="3667125" cy="2438400"/>
+          </a:xfrm>
+          <a:prstGeom prst="rect">
+            <a:avLst/>
+          </a:prstGeom>
+          <a:noFill/>
+          <a:ln>
+            <a:noFill/>
+          </a:ln>
+        </p:spPr>
+      </p:pic>
+      <p:pic>
+        <p:nvPicPr>
+          <p:cNvPr descr="sbm_eig_5_and_7.png" id="188" name="Shape 188"/>
+          <p:cNvPicPr preferRelativeResize="0"/>
+          <p:nvPr/>
+        </p:nvPicPr>
+        <p:blipFill>
+          <a:blip r:embed="rId5">
+            <a:alphaModFix/>
+          </a:blip>
+          <a:stretch>
+            <a:fillRect/>
+          </a:stretch>
+        </p:blipFill>
+        <p:spPr>
+          <a:xfrm>
+            <a:off x="732687" y="3707950"/>
+            <a:ext cx="3667125" cy="2438400"/>
+          </a:xfrm>
+          <a:prstGeom prst="rect">
+            <a:avLst/>
+          </a:prstGeom>
+          <a:noFill/>
+          <a:ln>
+            <a:noFill/>
+          </a:ln>
+        </p:spPr>
+      </p:pic>
+      <p:pic>
+        <p:nvPicPr>
+          <p:cNvPr descr="sbm_eig_8_and_6.png" id="189" name="Shape 189"/>
+          <p:cNvPicPr preferRelativeResize="0"/>
+          <p:nvPr/>
+        </p:nvPicPr>
+        <p:blipFill>
+          <a:blip r:embed="rId6">
+            <a:alphaModFix/>
+          </a:blip>
+          <a:stretch>
+            <a:fillRect/>
+          </a:stretch>
+        </p:blipFill>
+        <p:spPr>
+          <a:xfrm>
+            <a:off x="4605062" y="3707950"/>
+            <a:ext cx="3667125" cy="2438400"/>
+          </a:xfrm>
+          <a:prstGeom prst="rect">
+            <a:avLst/>
+          </a:prstGeom>
+          <a:noFill/>
+          <a:ln>
+            <a:noFill/>
+          </a:ln>
+        </p:spPr>
+      </p:pic>
+      <p:sp>
+        <p:nvSpPr>
+          <p:cNvPr id="190" name="Shape 190"/>
           <p:cNvSpPr txBox="1"/>
           <p:nvPr>
-            <p:ph idx="1" type="body"/>
+            <p:ph type="title"/>
           </p:nvPr>
         </p:nvSpPr>
         <p:spPr>
           <a:xfrm>
-            <a:off x="457200" y="1600200"/>
-            <a:ext cx="8229600" cy="3811200"/>
+            <a:off x="2285400" y="549125"/>
+            <a:ext cx="4573200" cy="1143000"/>
           </a:xfrm>
           <a:prstGeom prst="rect">
             <a:avLst/>
           </a:prstGeom>
         </p:spPr>
         <p:txBody>
-          <a:bodyPr anchorCtr="0" anchor="t" bIns="91425" lIns="91425" rIns="91425" tIns="91425">
+          <a:bodyPr anchorCtr="0" anchor="ctr" bIns="91425" lIns="91425" rIns="91425" tIns="91425">
             <a:noAutofit/>
           </a:bodyPr>
           <a:lstStyle/>
           <a:p>
-            <a:pPr indent="0" lvl="0" marL="0" rtl="0">
+            <a:pPr lvl="0" rtl="0">
               <a:spcBef>
                 <a:spcPts val="0"/>
               </a:spcBef>
               <a:buNone/>
             </a:pPr>
             <a:r>
-              <a:rPr lang="en-US" sz="3000"/>
-              <a:t>Cleaning the data:</a:t>
-            </a:r>
-          </a:p>
-          <a:p>
-            <a:pPr indent="-381000" lvl="0" marL="914400" rtl="0">
-              <a:spcBef>
-                <a:spcPts val="0"/>
-              </a:spcBef>
-              <a:buSzPct val="100000"/>
-            </a:pPr>
-            <a:r>
-              <a:rPr lang="en-US" sz="2400"/>
-              <a:t>Normalize patent numbers (e.g., remove punctuation)</a:t>
-            </a:r>
-          </a:p>
-          <a:p>
-            <a:pPr indent="-381000" lvl="0" marL="914400" rtl="0">
-              <a:spcBef>
-                <a:spcPts val="0"/>
-              </a:spcBef>
-              <a:buSzPct val="100000"/>
-            </a:pPr>
-            <a:r>
-              <a:rPr lang="en-US" sz="2400"/>
-              <a:t>Creates new set of collisions</a:t>
-            </a:r>
-          </a:p>
-          <a:p>
-            <a:pPr indent="0" lvl="0" marL="0" rtl="0">
-              <a:spcBef>
-                <a:spcPts val="0"/>
-              </a:spcBef>
-              <a:buNone/>
-            </a:pPr>
-            <a:r>
-              <a:rPr lang="en-US" sz="3000"/>
-              <a:t>Desparsify citation graph:</a:t>
-            </a:r>
-          </a:p>
-          <a:p>
-            <a:pPr indent="-381000" lvl="0" marL="914400" rtl="0">
-              <a:spcBef>
-                <a:spcPts val="0"/>
-              </a:spcBef>
-              <a:buSzPct val="100000"/>
-            </a:pPr>
-            <a:r>
-              <a:rPr lang="en-US" sz="2400"/>
-              <a:t>Join patents/applications that cite the same document</a:t>
-            </a:r>
-          </a:p>
-          <a:p>
-            <a:pPr indent="-381000" lvl="0" marL="914400" rtl="0">
-              <a:spcBef>
-                <a:spcPts val="0"/>
-              </a:spcBef>
-              <a:buSzPct val="100000"/>
-            </a:pPr>
-            <a:r>
-              <a:rPr lang="en-US" sz="2400"/>
-              <a:t>~33M edges for 670K nodes in all of category H</a:t>
-            </a:r>
-          </a:p>
-          <a:p>
-            <a:pPr indent="-381000" lvl="0" marL="914400" rtl="0">
-              <a:spcBef>
-                <a:spcPts val="0"/>
-              </a:spcBef>
-              <a:buSzPct val="100000"/>
-            </a:pPr>
-            <a:r>
-              <a:rPr lang="en-US" sz="2400"/>
-              <a:t>1e-4 sparsity factor-- still </a:t>
-            </a:r>
-            <a:r>
-              <a:rPr b="1" lang="en-US" sz="2400"/>
-              <a:t>very</a:t>
-            </a:r>
-            <a:r>
-              <a:rPr lang="en-US" sz="2400"/>
-              <a:t> sparse!</a:t>
-            </a:r>
-          </a:p>
-          <a:p>
-            <a:pPr indent="0" lvl="0" marL="0" rtl="0">
-              <a:spcBef>
-                <a:spcPts val="0"/>
-              </a:spcBef>
-              <a:buNone/>
-            </a:pPr>
-            <a:r>
-              <a:rPr lang="en-US" sz="3000"/>
-              <a:t>Vast majority of effort went into data cleaning</a:t>
+              <a:rPr lang="en-US" sz="1800"/>
+              <a:t>Projections of k=10 blocks in 10 dimensions</a:t>
             </a:r>
           </a:p>
         </p:txBody>
@@ -6991,7 +7271,7 @@
   <p:cSld>
     <p:spTree>
       <p:nvGrpSpPr>
-        <p:cNvPr id="193" name="Shape 193"/>
+        <p:cNvPr id="195" name="Shape 195"/>
         <p:cNvGrpSpPr/>
         <p:nvPr/>
       </p:nvGrpSpPr>
@@ -7005,7 +7285,7 @@
       </p:grpSpPr>
       <p:sp>
         <p:nvSpPr>
-          <p:cNvPr id="194" name="Shape 194"/>
+          <p:cNvPr id="196" name="Shape 196"/>
           <p:cNvSpPr txBox="1"/>
           <p:nvPr>
             <p:ph type="title"/>
@@ -7034,6 +7314,352 @@
             </a:pPr>
             <a:r>
               <a:rPr lang="en-US"/>
+              <a:t>Issue: Data Wrangling</a:t>
+            </a:r>
+          </a:p>
+        </p:txBody>
+      </p:sp>
+      <p:sp>
+        <p:nvSpPr>
+          <p:cNvPr id="197" name="Shape 197"/>
+          <p:cNvSpPr txBox="1"/>
+          <p:nvPr>
+            <p:ph idx="1" type="body"/>
+          </p:nvPr>
+        </p:nvSpPr>
+        <p:spPr>
+          <a:xfrm>
+            <a:off x="457200" y="1600200"/>
+            <a:ext cx="8229600" cy="3617700"/>
+          </a:xfrm>
+          <a:prstGeom prst="rect">
+            <a:avLst/>
+          </a:prstGeom>
+        </p:spPr>
+        <p:txBody>
+          <a:bodyPr anchorCtr="0" anchor="t" bIns="91425" lIns="91425" rIns="91425" tIns="91425">
+            <a:noAutofit/>
+          </a:bodyPr>
+          <a:lstStyle/>
+          <a:p>
+            <a:pPr indent="0" lvl="0" marL="0" rtl="0">
+              <a:spcBef>
+                <a:spcPts val="0"/>
+              </a:spcBef>
+              <a:buNone/>
+            </a:pPr>
+            <a:r>
+              <a:rPr lang="en-US" sz="3000"/>
+              <a:t>Messy data!</a:t>
+            </a:r>
+          </a:p>
+          <a:p>
+            <a:pPr indent="-381000" lvl="0" marL="914400" rtl="0">
+              <a:spcBef>
+                <a:spcPts val="0"/>
+              </a:spcBef>
+              <a:buSzPct val="100000"/>
+            </a:pPr>
+            <a:r>
+              <a:rPr lang="en-US" sz="2400"/>
+              <a:t>Numbers can appear with/without punctuation</a:t>
+            </a:r>
+          </a:p>
+          <a:p>
+            <a:pPr indent="-381000" lvl="0" marL="914400" rtl="0">
+              <a:spcBef>
+                <a:spcPts val="0"/>
+              </a:spcBef>
+              <a:buSzPct val="100000"/>
+            </a:pPr>
+            <a:r>
+              <a:rPr lang="en-US" sz="2400"/>
+              <a:t>Collisions between different national systems</a:t>
+            </a:r>
+          </a:p>
+          <a:p>
+            <a:pPr indent="-381000" lvl="0" marL="914400" rtl="0">
+              <a:spcBef>
+                <a:spcPts val="0"/>
+              </a:spcBef>
+              <a:buSzPct val="100000"/>
+            </a:pPr>
+            <a:r>
+              <a:rPr lang="en-US" sz="2400"/>
+              <a:t>Many missing fields</a:t>
+            </a:r>
+          </a:p>
+          <a:p>
+            <a:pPr indent="0" lvl="0" marL="0" rtl="0">
+              <a:spcBef>
+                <a:spcPts val="0"/>
+              </a:spcBef>
+              <a:buNone/>
+            </a:pPr>
+            <a:r>
+              <a:rPr lang="en-US" sz="3000"/>
+              <a:t>Citation graph is very sparse</a:t>
+            </a:r>
+          </a:p>
+          <a:p>
+            <a:pPr indent="-381000" lvl="0" marL="914400" rtl="0">
+              <a:spcBef>
+                <a:spcPts val="0"/>
+              </a:spcBef>
+              <a:buSzPct val="100000"/>
+            </a:pPr>
+            <a:r>
+              <a:rPr lang="en-US" sz="2400"/>
+              <a:t>~300 edges in all of H04 from 2002 to 2015</a:t>
+            </a:r>
+          </a:p>
+        </p:txBody>
+      </p:sp>
+    </p:spTree>
+  </p:cSld>
+  <p:clrMapOvr>
+    <a:masterClrMapping/>
+  </p:clrMapOvr>
+</p:sld>
+</file>
+
+<file path=ppt/slides/slide13.xml><?xml version="1.0" encoding="utf-8"?>
+<p:sld xmlns:a="http://schemas.openxmlformats.org/drawingml/2006/main" xmlns:r="http://schemas.openxmlformats.org/officeDocument/2006/relationships" xmlns:mc="http://schemas.openxmlformats.org/markup-compatibility/2006" xmlns:mv="urn:schemas-microsoft-com:mac:vml" xmlns:p="http://schemas.openxmlformats.org/presentationml/2006/main" xmlns:c="http://schemas.openxmlformats.org/drawingml/2006/chart" xmlns:dgm="http://schemas.openxmlformats.org/drawingml/2006/diagram" xmlns:o="urn:schemas-microsoft-com:office:office" xmlns:v="urn:schemas-microsoft-com:vml" xmlns:pvml="urn:schemas-microsoft-com:office:powerpoint" xmlns:com="http://schemas.openxmlformats.org/drawingml/2006/compatibility" xmlns:p14="http://schemas.microsoft.com/office/powerpoint/2010/main">
+  <p:cSld>
+    <p:spTree>
+      <p:nvGrpSpPr>
+        <p:cNvPr id="202" name="Shape 202"/>
+        <p:cNvGrpSpPr/>
+        <p:nvPr/>
+      </p:nvGrpSpPr>
+      <p:grpSpPr>
+        <a:xfrm>
+          <a:off x="0" y="0"/>
+          <a:ext cx="0" cy="0"/>
+          <a:chOff x="0" y="0"/>
+          <a:chExt cx="0" cy="0"/>
+        </a:xfrm>
+      </p:grpSpPr>
+      <p:sp>
+        <p:nvSpPr>
+          <p:cNvPr id="203" name="Shape 203"/>
+          <p:cNvSpPr txBox="1"/>
+          <p:nvPr>
+            <p:ph type="title"/>
+          </p:nvPr>
+        </p:nvSpPr>
+        <p:spPr>
+          <a:xfrm>
+            <a:off x="990600" y="46037"/>
+            <a:ext cx="7696200" cy="1143000"/>
+          </a:xfrm>
+          <a:prstGeom prst="rect">
+            <a:avLst/>
+          </a:prstGeom>
+        </p:spPr>
+        <p:txBody>
+          <a:bodyPr anchorCtr="0" anchor="ctr" bIns="91425" lIns="91425" rIns="91425" tIns="91425">
+            <a:noAutofit/>
+          </a:bodyPr>
+          <a:lstStyle/>
+          <a:p>
+            <a:pPr lvl="0" rtl="0">
+              <a:spcBef>
+                <a:spcPts val="0"/>
+              </a:spcBef>
+              <a:buNone/>
+            </a:pPr>
+            <a:r>
+              <a:rPr lang="en-US"/>
+              <a:t>(Partial) Solutions</a:t>
+            </a:r>
+          </a:p>
+        </p:txBody>
+      </p:sp>
+      <p:sp>
+        <p:nvSpPr>
+          <p:cNvPr id="204" name="Shape 204"/>
+          <p:cNvSpPr txBox="1"/>
+          <p:nvPr>
+            <p:ph idx="1" type="body"/>
+          </p:nvPr>
+        </p:nvSpPr>
+        <p:spPr>
+          <a:xfrm>
+            <a:off x="457200" y="1600200"/>
+            <a:ext cx="8229600" cy="3811200"/>
+          </a:xfrm>
+          <a:prstGeom prst="rect">
+            <a:avLst/>
+          </a:prstGeom>
+        </p:spPr>
+        <p:txBody>
+          <a:bodyPr anchorCtr="0" anchor="t" bIns="91425" lIns="91425" rIns="91425" tIns="91425">
+            <a:noAutofit/>
+          </a:bodyPr>
+          <a:lstStyle/>
+          <a:p>
+            <a:pPr indent="0" lvl="0" marL="0" rtl="0">
+              <a:spcBef>
+                <a:spcPts val="0"/>
+              </a:spcBef>
+              <a:buNone/>
+            </a:pPr>
+            <a:r>
+              <a:rPr lang="en-US" sz="3000"/>
+              <a:t>Cleaning the data:</a:t>
+            </a:r>
+          </a:p>
+          <a:p>
+            <a:pPr indent="-381000" lvl="0" marL="914400" rtl="0">
+              <a:spcBef>
+                <a:spcPts val="0"/>
+              </a:spcBef>
+              <a:buSzPct val="100000"/>
+            </a:pPr>
+            <a:r>
+              <a:rPr lang="en-US" sz="2400"/>
+              <a:t>Normalize patent numbers (e.g., remove punctuation)</a:t>
+            </a:r>
+          </a:p>
+          <a:p>
+            <a:pPr indent="-381000" lvl="0" marL="914400" rtl="0">
+              <a:spcBef>
+                <a:spcPts val="0"/>
+              </a:spcBef>
+              <a:buSzPct val="100000"/>
+            </a:pPr>
+            <a:r>
+              <a:rPr lang="en-US" sz="2400"/>
+              <a:t>Creates new set of collisions</a:t>
+            </a:r>
+          </a:p>
+          <a:p>
+            <a:pPr indent="0" lvl="0" marL="0" rtl="0">
+              <a:spcBef>
+                <a:spcPts val="0"/>
+              </a:spcBef>
+              <a:buNone/>
+            </a:pPr>
+            <a:r>
+              <a:rPr lang="en-US" sz="3000"/>
+              <a:t>Desparsify citation graph:</a:t>
+            </a:r>
+          </a:p>
+          <a:p>
+            <a:pPr indent="-381000" lvl="0" marL="914400" rtl="0">
+              <a:spcBef>
+                <a:spcPts val="0"/>
+              </a:spcBef>
+              <a:buSzPct val="100000"/>
+            </a:pPr>
+            <a:r>
+              <a:rPr lang="en-US" sz="2400"/>
+              <a:t>Join patents/applications that cite the same document</a:t>
+            </a:r>
+          </a:p>
+          <a:p>
+            <a:pPr indent="-381000" lvl="0" marL="914400" rtl="0">
+              <a:spcBef>
+                <a:spcPts val="0"/>
+              </a:spcBef>
+              <a:buSzPct val="100000"/>
+            </a:pPr>
+            <a:r>
+              <a:rPr lang="en-US" sz="2400"/>
+              <a:t>~33M edges for 670K nodes in all of category H</a:t>
+            </a:r>
+          </a:p>
+          <a:p>
+            <a:pPr indent="-381000" lvl="0" marL="914400" rtl="0">
+              <a:spcBef>
+                <a:spcPts val="0"/>
+              </a:spcBef>
+              <a:buSzPct val="100000"/>
+            </a:pPr>
+            <a:r>
+              <a:rPr lang="en-US" sz="2400"/>
+              <a:t>1e-4 sparsity factor-- still </a:t>
+            </a:r>
+            <a:r>
+              <a:rPr b="1" lang="en-US" sz="2400"/>
+              <a:t>very</a:t>
+            </a:r>
+            <a:r>
+              <a:rPr lang="en-US" sz="2400"/>
+              <a:t> sparse!</a:t>
+            </a:r>
+          </a:p>
+          <a:p>
+            <a:pPr indent="0" lvl="0" marL="0" rtl="0">
+              <a:spcBef>
+                <a:spcPts val="0"/>
+              </a:spcBef>
+              <a:buNone/>
+            </a:pPr>
+            <a:r>
+              <a:rPr lang="en-US" sz="3000"/>
+              <a:t>Vast majority of effort went into data cleaning</a:t>
+            </a:r>
+          </a:p>
+        </p:txBody>
+      </p:sp>
+    </p:spTree>
+  </p:cSld>
+  <p:clrMapOvr>
+    <a:masterClrMapping/>
+  </p:clrMapOvr>
+</p:sld>
+</file>
+
+<file path=ppt/slides/slide14.xml><?xml version="1.0" encoding="utf-8"?>
+<p:sld xmlns:a="http://schemas.openxmlformats.org/drawingml/2006/main" xmlns:r="http://schemas.openxmlformats.org/officeDocument/2006/relationships" xmlns:mc="http://schemas.openxmlformats.org/markup-compatibility/2006" xmlns:mv="urn:schemas-microsoft-com:mac:vml" xmlns:p="http://schemas.openxmlformats.org/presentationml/2006/main" xmlns:c="http://schemas.openxmlformats.org/drawingml/2006/chart" xmlns:dgm="http://schemas.openxmlformats.org/drawingml/2006/diagram" xmlns:o="urn:schemas-microsoft-com:office:office" xmlns:v="urn:schemas-microsoft-com:vml" xmlns:pvml="urn:schemas-microsoft-com:office:powerpoint" xmlns:com="http://schemas.openxmlformats.org/drawingml/2006/compatibility" xmlns:p14="http://schemas.microsoft.com/office/powerpoint/2010/main">
+  <p:cSld>
+    <p:spTree>
+      <p:nvGrpSpPr>
+        <p:cNvPr id="209" name="Shape 209"/>
+        <p:cNvGrpSpPr/>
+        <p:nvPr/>
+      </p:nvGrpSpPr>
+      <p:grpSpPr>
+        <a:xfrm>
+          <a:off x="0" y="0"/>
+          <a:ext cx="0" cy="0"/>
+          <a:chOff x="0" y="0"/>
+          <a:chExt cx="0" cy="0"/>
+        </a:xfrm>
+      </p:grpSpPr>
+      <p:sp>
+        <p:nvSpPr>
+          <p:cNvPr id="210" name="Shape 210"/>
+          <p:cNvSpPr txBox="1"/>
+          <p:nvPr>
+            <p:ph type="title"/>
+          </p:nvPr>
+        </p:nvSpPr>
+        <p:spPr>
+          <a:xfrm>
+            <a:off x="990600" y="46037"/>
+            <a:ext cx="7696200" cy="1143000"/>
+          </a:xfrm>
+          <a:prstGeom prst="rect">
+            <a:avLst/>
+          </a:prstGeom>
+        </p:spPr>
+        <p:txBody>
+          <a:bodyPr anchorCtr="0" anchor="ctr" bIns="91425" lIns="91425" rIns="91425" tIns="91425">
+            <a:noAutofit/>
+          </a:bodyPr>
+          <a:lstStyle/>
+          <a:p>
+            <a:pPr lvl="0" rtl="0">
+              <a:spcBef>
+                <a:spcPts val="0"/>
+              </a:spcBef>
+              <a:buNone/>
+            </a:pPr>
+            <a:r>
+              <a:rPr lang="en-US"/>
               <a:t>Next Steps</a:t>
             </a:r>
           </a:p>
@@ -7041,7 +7667,7 @@
       </p:sp>
       <p:sp>
         <p:nvSpPr>
-          <p:cNvPr id="195" name="Shape 195"/>
+          <p:cNvPr id="211" name="Shape 211"/>
           <p:cNvSpPr txBox="1"/>
           <p:nvPr>
             <p:ph idx="1" type="body"/>
@@ -9820,9 +10446,63 @@
           </a:p>
         </p:txBody>
       </p:sp>
+      <p:sp>
+        <p:nvSpPr>
+          <p:cNvPr id="170" name="Shape 170"/>
+          <p:cNvSpPr txBox="1"/>
+          <p:nvPr>
+            <p:ph idx="1" type="body"/>
+          </p:nvPr>
+        </p:nvSpPr>
+        <p:spPr>
+          <a:xfrm>
+            <a:off x="457200" y="5257800"/>
+            <a:ext cx="8229600" cy="724500"/>
+          </a:xfrm>
+          <a:prstGeom prst="rect">
+            <a:avLst/>
+          </a:prstGeom>
+        </p:spPr>
+        <p:txBody>
+          <a:bodyPr anchorCtr="0" anchor="t" bIns="91425" lIns="91425" rIns="91425" tIns="91425">
+            <a:noAutofit/>
+          </a:bodyPr>
+          <a:lstStyle/>
+          <a:p>
+            <a:pPr indent="0" lvl="0" marL="0" rtl="0" algn="ctr">
+              <a:spcBef>
+                <a:spcPts val="0"/>
+              </a:spcBef>
+              <a:buNone/>
+            </a:pPr>
+            <a:r>
+              <a:rPr lang="en-US" sz="3000"/>
+              <a:t>Full citation graph (~600K nodes)</a:t>
+            </a:r>
+          </a:p>
+          <a:p>
+            <a:pPr indent="0" lvl="0" marL="0" marR="0" rtl="0" algn="ctr">
+              <a:lnSpc>
+                <a:spcPct val="115000"/>
+              </a:lnSpc>
+              <a:spcBef>
+                <a:spcPts val="640"/>
+              </a:spcBef>
+              <a:spcAft>
+                <a:spcPts val="0"/>
+              </a:spcAft>
+              <a:buNone/>
+            </a:pPr>
+            <a:r>
+              <a:t/>
+            </a:r>
+            <a:endParaRPr sz="1800"/>
+          </a:p>
+        </p:txBody>
+      </p:sp>
       <p:pic>
         <p:nvPicPr>
-          <p:cNvPr descr="sbm_eig_0_and_1.png" id="170" name="Shape 170"/>
+          <p:cNvPr descr="orig_adjacency.png" id="171" name="Shape 171"/>
           <p:cNvPicPr preferRelativeResize="0"/>
           <p:nvPr/>
         </p:nvPicPr>
@@ -9836,8 +10516,8 @@
         </p:blipFill>
         <p:spPr>
           <a:xfrm>
-            <a:off x="732687" y="1269550"/>
-            <a:ext cx="3667125" cy="2438400"/>
+            <a:off x="2338325" y="1019000"/>
+            <a:ext cx="4422175" cy="4422175"/>
           </a:xfrm>
           <a:prstGeom prst="rect">
             <a:avLst/>
@@ -9848,126 +10528,6 @@
           </a:ln>
         </p:spPr>
       </p:pic>
-      <p:pic>
-        <p:nvPicPr>
-          <p:cNvPr descr="sbm_eig_2_and_3.png" id="171" name="Shape 171"/>
-          <p:cNvPicPr preferRelativeResize="0"/>
-          <p:nvPr/>
-        </p:nvPicPr>
-        <p:blipFill>
-          <a:blip r:embed="rId4">
-            <a:alphaModFix/>
-          </a:blip>
-          <a:stretch>
-            <a:fillRect/>
-          </a:stretch>
-        </p:blipFill>
-        <p:spPr>
-          <a:xfrm>
-            <a:off x="4605062" y="1269550"/>
-            <a:ext cx="3667125" cy="2438400"/>
-          </a:xfrm>
-          <a:prstGeom prst="rect">
-            <a:avLst/>
-          </a:prstGeom>
-          <a:noFill/>
-          <a:ln>
-            <a:noFill/>
-          </a:ln>
-        </p:spPr>
-      </p:pic>
-      <p:pic>
-        <p:nvPicPr>
-          <p:cNvPr descr="sbm_eig_5_and_7.png" id="172" name="Shape 172"/>
-          <p:cNvPicPr preferRelativeResize="0"/>
-          <p:nvPr/>
-        </p:nvPicPr>
-        <p:blipFill>
-          <a:blip r:embed="rId5">
-            <a:alphaModFix/>
-          </a:blip>
-          <a:stretch>
-            <a:fillRect/>
-          </a:stretch>
-        </p:blipFill>
-        <p:spPr>
-          <a:xfrm>
-            <a:off x="732687" y="3707950"/>
-            <a:ext cx="3667125" cy="2438400"/>
-          </a:xfrm>
-          <a:prstGeom prst="rect">
-            <a:avLst/>
-          </a:prstGeom>
-          <a:noFill/>
-          <a:ln>
-            <a:noFill/>
-          </a:ln>
-        </p:spPr>
-      </p:pic>
-      <p:pic>
-        <p:nvPicPr>
-          <p:cNvPr descr="sbm_eig_8_and_6.png" id="173" name="Shape 173"/>
-          <p:cNvPicPr preferRelativeResize="0"/>
-          <p:nvPr/>
-        </p:nvPicPr>
-        <p:blipFill>
-          <a:blip r:embed="rId6">
-            <a:alphaModFix/>
-          </a:blip>
-          <a:stretch>
-            <a:fillRect/>
-          </a:stretch>
-        </p:blipFill>
-        <p:spPr>
-          <a:xfrm>
-            <a:off x="4605062" y="3707950"/>
-            <a:ext cx="3667125" cy="2438400"/>
-          </a:xfrm>
-          <a:prstGeom prst="rect">
-            <a:avLst/>
-          </a:prstGeom>
-          <a:noFill/>
-          <a:ln>
-            <a:noFill/>
-          </a:ln>
-        </p:spPr>
-      </p:pic>
-      <p:sp>
-        <p:nvSpPr>
-          <p:cNvPr id="174" name="Shape 174"/>
-          <p:cNvSpPr txBox="1"/>
-          <p:nvPr>
-            <p:ph type="title"/>
-          </p:nvPr>
-        </p:nvSpPr>
-        <p:spPr>
-          <a:xfrm>
-            <a:off x="2285400" y="549125"/>
-            <a:ext cx="4573200" cy="1143000"/>
-          </a:xfrm>
-          <a:prstGeom prst="rect">
-            <a:avLst/>
-          </a:prstGeom>
-        </p:spPr>
-        <p:txBody>
-          <a:bodyPr anchorCtr="0" anchor="ctr" bIns="91425" lIns="91425" rIns="91425" tIns="91425">
-            <a:noAutofit/>
-          </a:bodyPr>
-          <a:lstStyle/>
-          <a:p>
-            <a:pPr lvl="0" rtl="0">
-              <a:spcBef>
-                <a:spcPts val="0"/>
-              </a:spcBef>
-              <a:buNone/>
-            </a:pPr>
-            <a:r>
-              <a:rPr lang="en-US" sz="1800"/>
-              <a:t>Projections of k=10 blocks in 10 dimensions</a:t>
-            </a:r>
-          </a:p>
-        </p:txBody>
-      </p:sp>
     </p:spTree>
   </p:cSld>
   <p:clrMapOvr>

</xml_diff>

<commit_message>
Edits to slides done in conference room.
</commit_message>
<xml_diff>
--- a/XDATA_Sep2016_klevin_slides.pptx
+++ b/XDATA_Sep2016_klevin_slides.pptx
@@ -7314,7 +7314,7 @@
             </a:pPr>
             <a:r>
               <a:rPr lang="en-US"/>
-              <a:t>Issue: Data Wrangling</a:t>
+              <a:t>Challenges: Data Wrangling</a:t>
             </a:r>
           </a:p>
         </p:txBody>
@@ -7695,23 +7695,33 @@
               <a:buNone/>
             </a:pPr>
             <a:r>
-              <a:rPr lang="en-US" sz="3000"/>
-              <a:t>Construct train/dev/test split</a:t>
-            </a:r>
-          </a:p>
-          <a:p>
-            <a:pPr indent="-381000" lvl="0" marL="914400" rtl="0">
-              <a:spcBef>
-                <a:spcPts val="0"/>
-              </a:spcBef>
-              <a:buSzPct val="100000"/>
-            </a:pPr>
-            <a:r>
               <a:rPr lang="en-US" sz="2400"/>
+              <a:t>Construct larger and better train/dev/test split</a:t>
+            </a:r>
+          </a:p>
+          <a:p>
+            <a:pPr indent="-228600" lvl="0" marL="914400" rtl="0">
+              <a:spcBef>
+                <a:spcPts val="0"/>
+              </a:spcBef>
+            </a:pPr>
+            <a:r>
+              <a:rPr lang="en-US" sz="1800"/>
               <a:t>and additional cleaning of data set</a:t>
             </a:r>
           </a:p>
           <a:p>
+            <a:pPr indent="-228600" lvl="0" marL="914400" rtl="0">
+              <a:spcBef>
+                <a:spcPts val="0"/>
+              </a:spcBef>
+            </a:pPr>
+            <a:r>
+              <a:rPr lang="en-US" sz="1800"/>
+              <a:t>Better negative example set?</a:t>
+            </a:r>
+          </a:p>
+          <a:p>
             <a:pPr indent="0" lvl="0" marL="0" rtl="0">
               <a:spcBef>
                 <a:spcPts val="0"/>
@@ -7719,19 +7729,18 @@
               <a:buNone/>
             </a:pPr>
             <a:r>
-              <a:rPr lang="en-US" sz="3000"/>
-              <a:t>Train classifier and complete system</a:t>
-            </a:r>
-          </a:p>
-          <a:p>
-            <a:pPr indent="-381000" lvl="0" marL="914400" rtl="0">
-              <a:spcBef>
-                <a:spcPts val="0"/>
-              </a:spcBef>
-              <a:buSzPct val="100000"/>
-            </a:pPr>
-            <a:r>
               <a:rPr lang="en-US" sz="2400"/>
+              <a:t>Test the filtering step (i.e. using LSH)</a:t>
+            </a:r>
+          </a:p>
+          <a:p>
+            <a:pPr indent="-228600" lvl="0" marL="914400" rtl="0">
+              <a:spcBef>
+                <a:spcPts val="0"/>
+              </a:spcBef>
+            </a:pPr>
+            <a:r>
+              <a:rPr lang="en-US" sz="1800"/>
               <a:t>subsystems need to be chained together</a:t>
             </a:r>
           </a:p>
@@ -7743,31 +7752,40 @@
               <a:buNone/>
             </a:pPr>
             <a:r>
-              <a:rPr lang="en-US" sz="3000"/>
+              <a:rPr lang="en-US" sz="2400"/>
               <a:t>Improve features</a:t>
             </a:r>
           </a:p>
           <a:p>
-            <a:pPr indent="-381000" lvl="0" marL="914400" rtl="0">
-              <a:spcBef>
-                <a:spcPts val="0"/>
-              </a:spcBef>
-              <a:buSzPct val="100000"/>
-            </a:pPr>
-            <a:r>
-              <a:rPr lang="en-US" sz="2400"/>
+            <a:pPr indent="-228600" lvl="0" marL="914400" rtl="0">
+              <a:spcBef>
+                <a:spcPts val="0"/>
+              </a:spcBef>
+            </a:pPr>
+            <a:r>
+              <a:rPr lang="en-US" sz="1800"/>
               <a:t>PLSA, topic modeling (e.g., R ‘stm’ package)</a:t>
             </a:r>
           </a:p>
           <a:p>
-            <a:pPr indent="-381000" lvl="0" marL="914400" rtl="0">
-              <a:spcBef>
-                <a:spcPts val="0"/>
-              </a:spcBef>
-              <a:buSzPct val="100000"/>
-            </a:pPr>
-            <a:r>
-              <a:rPr lang="en-US" sz="2400"/>
+            <a:pPr indent="-228600" lvl="0" marL="914400" rtl="0">
+              <a:spcBef>
+                <a:spcPts val="0"/>
+              </a:spcBef>
+            </a:pPr>
+            <a:r>
+              <a:rPr lang="en-US" sz="1800"/>
+              <a:t>Not just abstract</a:t>
+            </a:r>
+          </a:p>
+          <a:p>
+            <a:pPr indent="-228600" lvl="0" marL="914400" rtl="0">
+              <a:spcBef>
+                <a:spcPts val="0"/>
+              </a:spcBef>
+            </a:pPr>
+            <a:r>
+              <a:rPr lang="en-US" sz="1800"/>
               <a:t>Additional features from citation graph</a:t>
             </a:r>
           </a:p>
@@ -7782,6 +7800,18 @@
               <a:rPr lang="en-US" sz="1800"/>
               <a:t>e.g., spectral embedding</a:t>
             </a:r>
+          </a:p>
+          <a:p>
+            <a:pPr indent="0" lvl="0" marL="0" rtl="0">
+              <a:spcBef>
+                <a:spcPts val="0"/>
+              </a:spcBef>
+              <a:buNone/>
+            </a:pPr>
+            <a:r>
+              <a:t/>
+            </a:r>
+            <a:endParaRPr sz="1800"/>
           </a:p>
         </p:txBody>
       </p:sp>
@@ -7902,6 +7932,18 @@
             <a:r>
               <a:rPr lang="en-US" sz="3000"/>
               <a:t>supply additional citations</a:t>
+            </a:r>
+          </a:p>
+          <a:p>
+            <a:pPr indent="-419100" lvl="0" marL="914400" rtl="0">
+              <a:spcBef>
+                <a:spcPts val="0"/>
+              </a:spcBef>
+              <a:buSzPct val="100000"/>
+            </a:pPr>
+            <a:r>
+              <a:rPr lang="en-US" sz="3000"/>
+              <a:t>recall (much) more important than precision</a:t>
             </a:r>
           </a:p>
           <a:p>
@@ -9893,7 +9935,7 @@
             </a:pPr>
             <a:r>
               <a:rPr lang="en-US" sz="3000"/>
-              <a:t>Second pass: neighborhoods of LSH matches</a:t>
+              <a:t>Second pass: communities in citation graph</a:t>
             </a:r>
           </a:p>
           <a:p>
@@ -9905,7 +9947,7 @@
             </a:pPr>
             <a:r>
               <a:rPr lang="en-US" sz="2400"/>
-              <a:t>Incorporates citation information</a:t>
+              <a:t>Expands results using citation information</a:t>
             </a:r>
           </a:p>
           <a:p>
@@ -10086,7 +10128,38 @@
             </a:pPr>
             <a:r>
               <a:rPr lang="en-US" sz="2400"/>
-              <a:t>Dimensionality reduction using lib-Skylark SVD</a:t>
+              <a:t>Generate TF-IDF vectors</a:t>
+            </a:r>
+          </a:p>
+          <a:p>
+            <a:pPr indent="-381000" lvl="0" marL="914400" rtl="0">
+              <a:spcBef>
+                <a:spcPts val="0"/>
+              </a:spcBef>
+              <a:buSzPct val="100000"/>
+            </a:pPr>
+            <a:r>
+              <a:rPr lang="en-US" sz="2400"/>
+              <a:t>Latent Semantic Analysis using libSkylark SVD</a:t>
+            </a:r>
+          </a:p>
+          <a:p>
+            <a:pPr indent="-381000" lvl="0" marL="914400" rtl="0">
+              <a:spcBef>
+                <a:spcPts val="0"/>
+              </a:spcBef>
+              <a:buSzPct val="100000"/>
+            </a:pPr>
+            <a:r>
+              <a:rPr lang="en-US" sz="2400"/>
+              <a:t>Future work: more advanced methods</a:t>
+            </a:r>
+            <a:br>
+              <a:rPr lang="en-US" sz="2400"/>
+            </a:br>
+            <a:r>
+              <a:rPr lang="en-US" sz="2400"/>
+              <a:t>(word embedding, etc.)</a:t>
             </a:r>
           </a:p>
         </p:txBody>
@@ -10147,7 +10220,7 @@
             </a:pPr>
             <a:r>
               <a:rPr lang="en-US"/>
-              <a:t>Link Prediction: Baseline</a:t>
+              <a:t>Link Prediction: Proof-of-Concept</a:t>
             </a:r>
           </a:p>
         </p:txBody>
@@ -10187,7 +10260,7 @@
             </a:r>
             <a:r>
               <a:rPr lang="en-US" sz="3000"/>
-              <a:t>predict whether two patents share an edge</a:t>
+              <a:t>predict whether two patents are potentially relevant.</a:t>
             </a:r>
           </a:p>
           <a:p>
@@ -10248,6 +10321,18 @@
             <a:r>
               <a:rPr lang="en-US" sz="2400"/>
               <a:t>83% link prediction accuracy</a:t>
+            </a:r>
+          </a:p>
+          <a:p>
+            <a:pPr indent="-381000" lvl="0" marL="914400" rtl="0">
+              <a:spcBef>
+                <a:spcPts val="0"/>
+              </a:spcBef>
+              <a:buSzPct val="100000"/>
+            </a:pPr>
+            <a:r>
+              <a:rPr lang="en-US" sz="2400"/>
+              <a:t>Did not check precision/recall yet...</a:t>
             </a:r>
           </a:p>
         </p:txBody>
@@ -10477,7 +10562,7 @@
             </a:pPr>
             <a:r>
               <a:rPr lang="en-US" sz="3000"/>
-              <a:t>Full citation graph (~600K nodes)</a:t>
+              <a:t>Full citation graph for IPCR section H (~600K nodes)</a:t>
             </a:r>
           </a:p>
           <a:p>

</xml_diff>